<commit_message>
updated notes for class 2
</commit_message>
<xml_diff>
--- a/notes.pptx
+++ b/notes.pptx
@@ -17,6 +17,16 @@
     <p:sldId id="265" r:id="rId11"/>
     <p:sldId id="266" r:id="rId12"/>
     <p:sldId id="267" r:id="rId13"/>
+    <p:sldId id="270" r:id="rId14"/>
+    <p:sldId id="269" r:id="rId15"/>
+    <p:sldId id="271" r:id="rId16"/>
+    <p:sldId id="272" r:id="rId17"/>
+    <p:sldId id="273" r:id="rId18"/>
+    <p:sldId id="274" r:id="rId19"/>
+    <p:sldId id="275" r:id="rId20"/>
+    <p:sldId id="276" r:id="rId21"/>
+    <p:sldId id="277" r:id="rId22"/>
+    <p:sldId id="278" r:id="rId23"/>
   </p:sldIdLst>
   <p:sldSz cx="12192000" cy="6858000"/>
   <p:notesSz cx="6858000" cy="9144000"/>
@@ -270,7 +280,7 @@
           <a:p>
             <a:fld id="{DE176E02-7D44-4713-8078-8E0963CF8DDB}" type="datetimeFigureOut">
               <a:rPr lang="en-US" smtClean="0"/>
-              <a:t>9/2/19</a:t>
+              <a:t>9/3/2019</a:t>
             </a:fld>
             <a:endParaRPr lang="en-US"/>
           </a:p>
@@ -468,7 +478,7 @@
           <a:p>
             <a:fld id="{DE176E02-7D44-4713-8078-8E0963CF8DDB}" type="datetimeFigureOut">
               <a:rPr lang="en-US" smtClean="0"/>
-              <a:t>9/2/19</a:t>
+              <a:t>9/3/2019</a:t>
             </a:fld>
             <a:endParaRPr lang="en-US"/>
           </a:p>
@@ -676,7 +686,7 @@
           <a:p>
             <a:fld id="{DE176E02-7D44-4713-8078-8E0963CF8DDB}" type="datetimeFigureOut">
               <a:rPr lang="en-US" smtClean="0"/>
-              <a:t>9/2/19</a:t>
+              <a:t>9/3/2019</a:t>
             </a:fld>
             <a:endParaRPr lang="en-US"/>
           </a:p>
@@ -874,7 +884,7 @@
           <a:p>
             <a:fld id="{DE176E02-7D44-4713-8078-8E0963CF8DDB}" type="datetimeFigureOut">
               <a:rPr lang="en-US" smtClean="0"/>
-              <a:t>9/2/19</a:t>
+              <a:t>9/3/2019</a:t>
             </a:fld>
             <a:endParaRPr lang="en-US"/>
           </a:p>
@@ -1149,7 +1159,7 @@
           <a:p>
             <a:fld id="{DE176E02-7D44-4713-8078-8E0963CF8DDB}" type="datetimeFigureOut">
               <a:rPr lang="en-US" smtClean="0"/>
-              <a:t>9/2/19</a:t>
+              <a:t>9/3/2019</a:t>
             </a:fld>
             <a:endParaRPr lang="en-US"/>
           </a:p>
@@ -1414,7 +1424,7 @@
           <a:p>
             <a:fld id="{DE176E02-7D44-4713-8078-8E0963CF8DDB}" type="datetimeFigureOut">
               <a:rPr lang="en-US" smtClean="0"/>
-              <a:t>9/2/19</a:t>
+              <a:t>9/3/2019</a:t>
             </a:fld>
             <a:endParaRPr lang="en-US"/>
           </a:p>
@@ -1826,7 +1836,7 @@
           <a:p>
             <a:fld id="{DE176E02-7D44-4713-8078-8E0963CF8DDB}" type="datetimeFigureOut">
               <a:rPr lang="en-US" smtClean="0"/>
-              <a:t>9/2/19</a:t>
+              <a:t>9/3/2019</a:t>
             </a:fld>
             <a:endParaRPr lang="en-US"/>
           </a:p>
@@ -1967,7 +1977,7 @@
           <a:p>
             <a:fld id="{DE176E02-7D44-4713-8078-8E0963CF8DDB}" type="datetimeFigureOut">
               <a:rPr lang="en-US" smtClean="0"/>
-              <a:t>9/2/19</a:t>
+              <a:t>9/3/2019</a:t>
             </a:fld>
             <a:endParaRPr lang="en-US"/>
           </a:p>
@@ -2080,7 +2090,7 @@
           <a:p>
             <a:fld id="{DE176E02-7D44-4713-8078-8E0963CF8DDB}" type="datetimeFigureOut">
               <a:rPr lang="en-US" smtClean="0"/>
-              <a:t>9/2/19</a:t>
+              <a:t>9/3/2019</a:t>
             </a:fld>
             <a:endParaRPr lang="en-US"/>
           </a:p>
@@ -2391,7 +2401,7 @@
           <a:p>
             <a:fld id="{DE176E02-7D44-4713-8078-8E0963CF8DDB}" type="datetimeFigureOut">
               <a:rPr lang="en-US" smtClean="0"/>
-              <a:t>9/2/19</a:t>
+              <a:t>9/3/2019</a:t>
             </a:fld>
             <a:endParaRPr lang="en-US"/>
           </a:p>
@@ -2679,7 +2689,7 @@
           <a:p>
             <a:fld id="{DE176E02-7D44-4713-8078-8E0963CF8DDB}" type="datetimeFigureOut">
               <a:rPr lang="en-US" smtClean="0"/>
-              <a:t>9/2/19</a:t>
+              <a:t>9/3/2019</a:t>
             </a:fld>
             <a:endParaRPr lang="en-US"/>
           </a:p>
@@ -2920,7 +2930,7 @@
           <a:p>
             <a:fld id="{DE176E02-7D44-4713-8078-8E0963CF8DDB}" type="datetimeFigureOut">
               <a:rPr lang="en-US" smtClean="0"/>
-              <a:t>9/2/19</a:t>
+              <a:t>9/3/2019</a:t>
             </a:fld>
             <a:endParaRPr lang="en-US"/>
           </a:p>
@@ -3867,6 +3877,803 @@
 </p:sld>
 </file>
 
+<file path=ppt/slides/slide13.xml><?xml version="1.0" encoding="utf-8"?>
+<p:sld xmlns:a="http://schemas.openxmlformats.org/drawingml/2006/main" xmlns:r="http://schemas.openxmlformats.org/officeDocument/2006/relationships" xmlns:p="http://schemas.openxmlformats.org/presentationml/2006/main">
+  <p:cSld>
+    <p:spTree>
+      <p:nvGrpSpPr>
+        <p:cNvPr id="1" name=""/>
+        <p:cNvGrpSpPr/>
+        <p:nvPr/>
+      </p:nvGrpSpPr>
+      <p:grpSpPr>
+        <a:xfrm>
+          <a:off x="0" y="0"/>
+          <a:ext cx="0" cy="0"/>
+          <a:chOff x="0" y="0"/>
+          <a:chExt cx="0" cy="0"/>
+        </a:xfrm>
+      </p:grpSpPr>
+      <p:sp>
+        <p:nvSpPr>
+          <p:cNvPr id="2" name="Title 1">
+            <a:extLst>
+              <a:ext uri="{FF2B5EF4-FFF2-40B4-BE49-F238E27FC236}">
+                <a16:creationId xmlns:a16="http://schemas.microsoft.com/office/drawing/2014/main" id="{D88262F6-2AC3-4DD1-8882-CE82FC1EE2F2}"/>
+              </a:ext>
+            </a:extLst>
+          </p:cNvPr>
+          <p:cNvSpPr>
+            <a:spLocks noGrp="1"/>
+          </p:cNvSpPr>
+          <p:nvPr>
+            <p:ph type="title"/>
+          </p:nvPr>
+        </p:nvSpPr>
+        <p:spPr/>
+        <p:txBody>
+          <a:bodyPr/>
+          <a:lstStyle/>
+          <a:p>
+            <a:endParaRPr lang="en-US"/>
+          </a:p>
+        </p:txBody>
+      </p:sp>
+      <p:sp>
+        <p:nvSpPr>
+          <p:cNvPr id="3" name="Content Placeholder 2">
+            <a:extLst>
+              <a:ext uri="{FF2B5EF4-FFF2-40B4-BE49-F238E27FC236}">
+                <a16:creationId xmlns:a16="http://schemas.microsoft.com/office/drawing/2014/main" id="{7CE20302-4CBE-4CD2-B95F-EFD6C4B08CFA}"/>
+              </a:ext>
+            </a:extLst>
+          </p:cNvPr>
+          <p:cNvSpPr>
+            <a:spLocks noGrp="1"/>
+          </p:cNvSpPr>
+          <p:nvPr>
+            <p:ph idx="1"/>
+          </p:nvPr>
+        </p:nvSpPr>
+        <p:spPr/>
+        <p:txBody>
+          <a:bodyPr/>
+          <a:lstStyle/>
+          <a:p>
+            <a:r>
+              <a:rPr lang="en-US" dirty="0"/>
+              <a:t>Function- a mathematical function</a:t>
+            </a:r>
+          </a:p>
+          <a:p>
+            <a:pPr lvl="1"/>
+            <a:r>
+              <a:rPr lang="en-US" dirty="0"/>
+              <a:t>Positive inputs, positive output, increasing</a:t>
+            </a:r>
+          </a:p>
+          <a:p>
+            <a:endParaRPr lang="en-US" dirty="0"/>
+          </a:p>
+          <a:p>
+            <a:endParaRPr lang="en-US" dirty="0"/>
+          </a:p>
+          <a:p>
+            <a:endParaRPr lang="en-US" dirty="0"/>
+          </a:p>
+          <a:p>
+            <a:pPr marL="0" indent="0">
+              <a:buNone/>
+            </a:pPr>
+            <a:endParaRPr lang="en-US" dirty="0"/>
+          </a:p>
+        </p:txBody>
+      </p:sp>
+    </p:spTree>
+    <p:extLst>
+      <p:ext uri="{BB962C8B-B14F-4D97-AF65-F5344CB8AC3E}">
+        <p14:creationId xmlns:p14="http://schemas.microsoft.com/office/powerpoint/2010/main" val="167172012"/>
+      </p:ext>
+    </p:extLst>
+  </p:cSld>
+  <p:clrMapOvr>
+    <a:masterClrMapping/>
+  </p:clrMapOvr>
+</p:sld>
+</file>
+
+<file path=ppt/slides/slide14.xml><?xml version="1.0" encoding="utf-8"?>
+<p:sld xmlns:a="http://schemas.openxmlformats.org/drawingml/2006/main" xmlns:r="http://schemas.openxmlformats.org/officeDocument/2006/relationships" xmlns:p="http://schemas.openxmlformats.org/presentationml/2006/main">
+  <p:cSld>
+    <p:spTree>
+      <p:nvGrpSpPr>
+        <p:cNvPr id="1" name=""/>
+        <p:cNvGrpSpPr/>
+        <p:nvPr/>
+      </p:nvGrpSpPr>
+      <p:grpSpPr>
+        <a:xfrm>
+          <a:off x="0" y="0"/>
+          <a:ext cx="0" cy="0"/>
+          <a:chOff x="0" y="0"/>
+          <a:chExt cx="0" cy="0"/>
+        </a:xfrm>
+      </p:grpSpPr>
+      <p:sp>
+        <p:nvSpPr>
+          <p:cNvPr id="2" name="Title 1">
+            <a:extLst>
+              <a:ext uri="{FF2B5EF4-FFF2-40B4-BE49-F238E27FC236}">
+                <a16:creationId xmlns:a16="http://schemas.microsoft.com/office/drawing/2014/main" id="{4B35A7FF-DF39-4420-A431-5C9BDAA11D11}"/>
+              </a:ext>
+            </a:extLst>
+          </p:cNvPr>
+          <p:cNvSpPr>
+            <a:spLocks noGrp="1"/>
+          </p:cNvSpPr>
+          <p:nvPr>
+            <p:ph type="title"/>
+          </p:nvPr>
+        </p:nvSpPr>
+        <p:spPr/>
+        <p:txBody>
+          <a:bodyPr/>
+          <a:lstStyle/>
+          <a:p>
+            <a:r>
+              <a:rPr lang="en-US" dirty="0"/>
+              <a:t>Recursion</a:t>
+            </a:r>
+          </a:p>
+        </p:txBody>
+      </p:sp>
+      <p:sp>
+        <p:nvSpPr>
+          <p:cNvPr id="3" name="Content Placeholder 2">
+            <a:extLst>
+              <a:ext uri="{FF2B5EF4-FFF2-40B4-BE49-F238E27FC236}">
+                <a16:creationId xmlns:a16="http://schemas.microsoft.com/office/drawing/2014/main" id="{B3181758-222B-4A21-87BF-700926FD1DC4}"/>
+              </a:ext>
+            </a:extLst>
+          </p:cNvPr>
+          <p:cNvSpPr>
+            <a:spLocks noGrp="1"/>
+          </p:cNvSpPr>
+          <p:nvPr>
+            <p:ph idx="1"/>
+          </p:nvPr>
+        </p:nvSpPr>
+        <p:spPr/>
+        <p:txBody>
+          <a:bodyPr/>
+          <a:lstStyle/>
+          <a:p>
+            <a:r>
+              <a:rPr lang="en-US" dirty="0"/>
+              <a:t>1 or more base cases</a:t>
+            </a:r>
+          </a:p>
+          <a:p>
+            <a:r>
+              <a:rPr lang="en-US" dirty="0"/>
+              <a:t>1 or more recursive calls</a:t>
+            </a:r>
+          </a:p>
+        </p:txBody>
+      </p:sp>
+    </p:spTree>
+    <p:extLst>
+      <p:ext uri="{BB962C8B-B14F-4D97-AF65-F5344CB8AC3E}">
+        <p14:creationId xmlns:p14="http://schemas.microsoft.com/office/powerpoint/2010/main" val="1439495836"/>
+      </p:ext>
+    </p:extLst>
+  </p:cSld>
+  <p:clrMapOvr>
+    <a:masterClrMapping/>
+  </p:clrMapOvr>
+</p:sld>
+</file>
+
+<file path=ppt/slides/slide15.xml><?xml version="1.0" encoding="utf-8"?>
+<p:sld xmlns:a="http://schemas.openxmlformats.org/drawingml/2006/main" xmlns:r="http://schemas.openxmlformats.org/officeDocument/2006/relationships" xmlns:p="http://schemas.openxmlformats.org/presentationml/2006/main">
+  <p:cSld>
+    <p:spTree>
+      <p:nvGrpSpPr>
+        <p:cNvPr id="1" name=""/>
+        <p:cNvGrpSpPr/>
+        <p:nvPr/>
+      </p:nvGrpSpPr>
+      <p:grpSpPr>
+        <a:xfrm>
+          <a:off x="0" y="0"/>
+          <a:ext cx="0" cy="0"/>
+          <a:chOff x="0" y="0"/>
+          <a:chExt cx="0" cy="0"/>
+        </a:xfrm>
+      </p:grpSpPr>
+      <p:sp>
+        <p:nvSpPr>
+          <p:cNvPr id="2" name="Title 1">
+            <a:extLst>
+              <a:ext uri="{FF2B5EF4-FFF2-40B4-BE49-F238E27FC236}">
+                <a16:creationId xmlns:a16="http://schemas.microsoft.com/office/drawing/2014/main" id="{A1AF49BA-BF02-4494-B95D-7C5DE90AF10B}"/>
+              </a:ext>
+            </a:extLst>
+          </p:cNvPr>
+          <p:cNvSpPr>
+            <a:spLocks noGrp="1"/>
+          </p:cNvSpPr>
+          <p:nvPr>
+            <p:ph type="title"/>
+          </p:nvPr>
+        </p:nvSpPr>
+        <p:spPr/>
+        <p:txBody>
+          <a:bodyPr/>
+          <a:lstStyle/>
+          <a:p>
+            <a:r>
+              <a:rPr lang="en-US" dirty="0" err="1"/>
+              <a:t>CountX</a:t>
+            </a:r>
+            <a:endParaRPr lang="en-US" dirty="0"/>
+          </a:p>
+        </p:txBody>
+      </p:sp>
+      <p:sp>
+        <p:nvSpPr>
+          <p:cNvPr id="3" name="Content Placeholder 2">
+            <a:extLst>
+              <a:ext uri="{FF2B5EF4-FFF2-40B4-BE49-F238E27FC236}">
+                <a16:creationId xmlns:a16="http://schemas.microsoft.com/office/drawing/2014/main" id="{2476E292-B848-450E-B23C-E4FF34288291}"/>
+              </a:ext>
+            </a:extLst>
+          </p:cNvPr>
+          <p:cNvSpPr>
+            <a:spLocks noGrp="1"/>
+          </p:cNvSpPr>
+          <p:nvPr>
+            <p:ph idx="1"/>
+          </p:nvPr>
+        </p:nvSpPr>
+        <p:spPr/>
+        <p:txBody>
+          <a:bodyPr/>
+          <a:lstStyle/>
+          <a:p>
+            <a:pPr marL="0" indent="0">
+              <a:buNone/>
+            </a:pPr>
+            <a:r>
+              <a:rPr lang="en-US" dirty="0" err="1"/>
+              <a:t>countX</a:t>
+            </a:r>
+            <a:r>
+              <a:rPr lang="en-US" dirty="0"/>
+              <a:t>(s) =	Base Case(s):0 	if s is empty</a:t>
+            </a:r>
+          </a:p>
+          <a:p>
+            <a:pPr marL="0" indent="0">
+              <a:buNone/>
+            </a:pPr>
+            <a:r>
+              <a:rPr lang="en-US" dirty="0"/>
+              <a:t>	</a:t>
+            </a:r>
+            <a:r>
+              <a:rPr lang="en-US" dirty="0" err="1"/>
+              <a:t>Reccursive</a:t>
+            </a:r>
+            <a:r>
+              <a:rPr lang="en-US" dirty="0"/>
+              <a:t> Cases(s): 1 + </a:t>
+            </a:r>
+            <a:r>
+              <a:rPr lang="en-US" dirty="0" err="1"/>
+              <a:t>countX</a:t>
+            </a:r>
+            <a:r>
+              <a:rPr lang="en-US" dirty="0"/>
+              <a:t>(s - 1st char) 	if first char is ‘x’</a:t>
+            </a:r>
+          </a:p>
+          <a:p>
+            <a:pPr marL="0" indent="0">
+              <a:buNone/>
+            </a:pPr>
+            <a:r>
+              <a:rPr lang="en-US" dirty="0"/>
+              <a:t>				    </a:t>
+            </a:r>
+            <a:r>
+              <a:rPr lang="en-US" dirty="0" err="1"/>
+              <a:t>countX</a:t>
+            </a:r>
+            <a:r>
+              <a:rPr lang="en-US" dirty="0"/>
+              <a:t>(s - 1st char) if first char is not ‘x’ </a:t>
+            </a:r>
+          </a:p>
+          <a:p>
+            <a:endParaRPr lang="en-US" dirty="0"/>
+          </a:p>
+          <a:p>
+            <a:endParaRPr lang="en-US" dirty="0"/>
+          </a:p>
+          <a:p>
+            <a:endParaRPr lang="en-US" dirty="0"/>
+          </a:p>
+          <a:p>
+            <a:r>
+              <a:rPr lang="en-US" dirty="0"/>
+              <a:t>Theater time</a:t>
+            </a:r>
+          </a:p>
+          <a:p>
+            <a:r>
+              <a:rPr lang="en-US" dirty="0"/>
+              <a:t>Code time</a:t>
+            </a:r>
+          </a:p>
+        </p:txBody>
+      </p:sp>
+    </p:spTree>
+    <p:extLst>
+      <p:ext uri="{BB962C8B-B14F-4D97-AF65-F5344CB8AC3E}">
+        <p14:creationId xmlns:p14="http://schemas.microsoft.com/office/powerpoint/2010/main" val="45859203"/>
+      </p:ext>
+    </p:extLst>
+  </p:cSld>
+  <p:clrMapOvr>
+    <a:masterClrMapping/>
+  </p:clrMapOvr>
+</p:sld>
+</file>
+
+<file path=ppt/slides/slide16.xml><?xml version="1.0" encoding="utf-8"?>
+<p:sld xmlns:a="http://schemas.openxmlformats.org/drawingml/2006/main" xmlns:r="http://schemas.openxmlformats.org/officeDocument/2006/relationships" xmlns:p="http://schemas.openxmlformats.org/presentationml/2006/main">
+  <p:cSld>
+    <p:spTree>
+      <p:nvGrpSpPr>
+        <p:cNvPr id="1" name=""/>
+        <p:cNvGrpSpPr/>
+        <p:nvPr/>
+      </p:nvGrpSpPr>
+      <p:grpSpPr>
+        <a:xfrm>
+          <a:off x="0" y="0"/>
+          <a:ext cx="0" cy="0"/>
+          <a:chOff x="0" y="0"/>
+          <a:chExt cx="0" cy="0"/>
+        </a:xfrm>
+      </p:grpSpPr>
+      <p:sp>
+        <p:nvSpPr>
+          <p:cNvPr id="2" name="Title 1">
+            <a:extLst>
+              <a:ext uri="{FF2B5EF4-FFF2-40B4-BE49-F238E27FC236}">
+                <a16:creationId xmlns:a16="http://schemas.microsoft.com/office/drawing/2014/main" id="{7ADB2A6B-7CBD-431A-BBEA-49353E7575F7}"/>
+              </a:ext>
+            </a:extLst>
+          </p:cNvPr>
+          <p:cNvSpPr>
+            <a:spLocks noGrp="1"/>
+          </p:cNvSpPr>
+          <p:nvPr>
+            <p:ph type="title"/>
+          </p:nvPr>
+        </p:nvSpPr>
+        <p:spPr/>
+        <p:txBody>
+          <a:bodyPr/>
+          <a:lstStyle/>
+          <a:p>
+            <a:r>
+              <a:rPr lang="en-US" dirty="0"/>
+              <a:t>Important recursive algorithms</a:t>
+            </a:r>
+          </a:p>
+        </p:txBody>
+      </p:sp>
+      <p:sp>
+        <p:nvSpPr>
+          <p:cNvPr id="3" name="Content Placeholder 2">
+            <a:extLst>
+              <a:ext uri="{FF2B5EF4-FFF2-40B4-BE49-F238E27FC236}">
+                <a16:creationId xmlns:a16="http://schemas.microsoft.com/office/drawing/2014/main" id="{1CDEA2DF-A2F3-4477-B2E4-368488D80AC8}"/>
+              </a:ext>
+            </a:extLst>
+          </p:cNvPr>
+          <p:cNvSpPr>
+            <a:spLocks noGrp="1"/>
+          </p:cNvSpPr>
+          <p:nvPr>
+            <p:ph idx="1"/>
+          </p:nvPr>
+        </p:nvSpPr>
+        <p:spPr/>
+        <p:txBody>
+          <a:bodyPr/>
+          <a:lstStyle/>
+          <a:p>
+            <a:r>
+              <a:rPr lang="en-US" dirty="0"/>
+              <a:t>Generate permutations</a:t>
+            </a:r>
+          </a:p>
+          <a:p>
+            <a:r>
+              <a:rPr lang="en-US" dirty="0"/>
+              <a:t>Generate subsets</a:t>
+            </a:r>
+          </a:p>
+          <a:p>
+            <a:r>
+              <a:rPr lang="en-US" dirty="0"/>
+              <a:t>Generate combinations</a:t>
+            </a:r>
+          </a:p>
+          <a:p>
+            <a:endParaRPr lang="en-US" dirty="0"/>
+          </a:p>
+          <a:p>
+            <a:endParaRPr lang="en-US" dirty="0"/>
+          </a:p>
+        </p:txBody>
+      </p:sp>
+    </p:spTree>
+    <p:extLst>
+      <p:ext uri="{BB962C8B-B14F-4D97-AF65-F5344CB8AC3E}">
+        <p14:creationId xmlns:p14="http://schemas.microsoft.com/office/powerpoint/2010/main" val="3158292533"/>
+      </p:ext>
+    </p:extLst>
+  </p:cSld>
+  <p:clrMapOvr>
+    <a:masterClrMapping/>
+  </p:clrMapOvr>
+</p:sld>
+</file>
+
+<file path=ppt/slides/slide17.xml><?xml version="1.0" encoding="utf-8"?>
+<p:sld xmlns:a="http://schemas.openxmlformats.org/drawingml/2006/main" xmlns:r="http://schemas.openxmlformats.org/officeDocument/2006/relationships" xmlns:p="http://schemas.openxmlformats.org/presentationml/2006/main">
+  <p:cSld>
+    <p:spTree>
+      <p:nvGrpSpPr>
+        <p:cNvPr id="1" name=""/>
+        <p:cNvGrpSpPr/>
+        <p:nvPr/>
+      </p:nvGrpSpPr>
+      <p:grpSpPr>
+        <a:xfrm>
+          <a:off x="0" y="0"/>
+          <a:ext cx="0" cy="0"/>
+          <a:chOff x="0" y="0"/>
+          <a:chExt cx="0" cy="0"/>
+        </a:xfrm>
+      </p:grpSpPr>
+      <p:sp>
+        <p:nvSpPr>
+          <p:cNvPr id="2" name="Title 1">
+            <a:extLst>
+              <a:ext uri="{FF2B5EF4-FFF2-40B4-BE49-F238E27FC236}">
+                <a16:creationId xmlns:a16="http://schemas.microsoft.com/office/drawing/2014/main" id="{68C67571-74E9-4907-AF31-2AA9FFA8A586}"/>
+              </a:ext>
+            </a:extLst>
+          </p:cNvPr>
+          <p:cNvSpPr>
+            <a:spLocks noGrp="1"/>
+          </p:cNvSpPr>
+          <p:nvPr>
+            <p:ph type="title"/>
+          </p:nvPr>
+        </p:nvSpPr>
+        <p:spPr/>
+        <p:txBody>
+          <a:bodyPr/>
+          <a:lstStyle/>
+          <a:p>
+            <a:r>
+              <a:rPr lang="en-US" dirty="0"/>
+              <a:t>Permutations</a:t>
+            </a:r>
+          </a:p>
+        </p:txBody>
+      </p:sp>
+      <p:sp>
+        <p:nvSpPr>
+          <p:cNvPr id="3" name="Content Placeholder 2">
+            <a:extLst>
+              <a:ext uri="{FF2B5EF4-FFF2-40B4-BE49-F238E27FC236}">
+                <a16:creationId xmlns:a16="http://schemas.microsoft.com/office/drawing/2014/main" id="{84F37005-7360-486B-97D3-B40B3EB9D02A}"/>
+              </a:ext>
+            </a:extLst>
+          </p:cNvPr>
+          <p:cNvSpPr>
+            <a:spLocks noGrp="1"/>
+          </p:cNvSpPr>
+          <p:nvPr>
+            <p:ph idx="1"/>
+          </p:nvPr>
+        </p:nvSpPr>
+        <p:spPr/>
+        <p:txBody>
+          <a:bodyPr/>
+          <a:lstStyle/>
+          <a:p>
+            <a:pPr marL="0" indent="0">
+              <a:buNone/>
+            </a:pPr>
+            <a:r>
+              <a:rPr lang="en-US" dirty="0"/>
+              <a:t>Base Case(s): {””} if s is empty</a:t>
+            </a:r>
+          </a:p>
+          <a:p>
+            <a:pPr marL="0" indent="0">
+              <a:buNone/>
+            </a:pPr>
+            <a:r>
+              <a:rPr lang="en-US" dirty="0"/>
+              <a:t>Recursive Case(s):	for each char c in s</a:t>
+            </a:r>
+          </a:p>
+          <a:p>
+            <a:pPr marL="0" indent="0">
+              <a:buNone/>
+            </a:pPr>
+            <a:r>
+              <a:rPr lang="en-US" dirty="0"/>
+              <a:t>			     Add c prepended to permute(s-c)</a:t>
+            </a:r>
+          </a:p>
+          <a:p>
+            <a:endParaRPr lang="en-US" dirty="0"/>
+          </a:p>
+          <a:p>
+            <a:endParaRPr lang="en-US" dirty="0"/>
+          </a:p>
+        </p:txBody>
+      </p:sp>
+    </p:spTree>
+    <p:extLst>
+      <p:ext uri="{BB962C8B-B14F-4D97-AF65-F5344CB8AC3E}">
+        <p14:creationId xmlns:p14="http://schemas.microsoft.com/office/powerpoint/2010/main" val="2079353975"/>
+      </p:ext>
+    </p:extLst>
+  </p:cSld>
+  <p:clrMapOvr>
+    <a:masterClrMapping/>
+  </p:clrMapOvr>
+</p:sld>
+</file>
+
+<file path=ppt/slides/slide18.xml><?xml version="1.0" encoding="utf-8"?>
+<p:sld xmlns:a="http://schemas.openxmlformats.org/drawingml/2006/main" xmlns:r="http://schemas.openxmlformats.org/officeDocument/2006/relationships" xmlns:p="http://schemas.openxmlformats.org/presentationml/2006/main">
+  <p:cSld>
+    <p:spTree>
+      <p:nvGrpSpPr>
+        <p:cNvPr id="1" name=""/>
+        <p:cNvGrpSpPr/>
+        <p:nvPr/>
+      </p:nvGrpSpPr>
+      <p:grpSpPr>
+        <a:xfrm>
+          <a:off x="0" y="0"/>
+          <a:ext cx="0" cy="0"/>
+          <a:chOff x="0" y="0"/>
+          <a:chExt cx="0" cy="0"/>
+        </a:xfrm>
+      </p:grpSpPr>
+      <p:sp>
+        <p:nvSpPr>
+          <p:cNvPr id="2" name="Title 1">
+            <a:extLst>
+              <a:ext uri="{FF2B5EF4-FFF2-40B4-BE49-F238E27FC236}">
+                <a16:creationId xmlns:a16="http://schemas.microsoft.com/office/drawing/2014/main" id="{1BA994E3-20B0-49CF-84E5-575410F11713}"/>
+              </a:ext>
+            </a:extLst>
+          </p:cNvPr>
+          <p:cNvSpPr>
+            <a:spLocks noGrp="1"/>
+          </p:cNvSpPr>
+          <p:nvPr>
+            <p:ph type="title"/>
+          </p:nvPr>
+        </p:nvSpPr>
+        <p:spPr/>
+        <p:txBody>
+          <a:bodyPr/>
+          <a:lstStyle/>
+          <a:p>
+            <a:r>
+              <a:rPr lang="en-US" dirty="0" err="1"/>
+              <a:t>Identicons</a:t>
+            </a:r>
+            <a:endParaRPr lang="en-US" dirty="0"/>
+          </a:p>
+        </p:txBody>
+      </p:sp>
+      <p:sp>
+        <p:nvSpPr>
+          <p:cNvPr id="3" name="Content Placeholder 2">
+            <a:extLst>
+              <a:ext uri="{FF2B5EF4-FFF2-40B4-BE49-F238E27FC236}">
+                <a16:creationId xmlns:a16="http://schemas.microsoft.com/office/drawing/2014/main" id="{81437E11-398A-42AB-8ED7-4F85F8FDEFF2}"/>
+              </a:ext>
+            </a:extLst>
+          </p:cNvPr>
+          <p:cNvSpPr>
+            <a:spLocks noGrp="1"/>
+          </p:cNvSpPr>
+          <p:nvPr>
+            <p:ph idx="1"/>
+          </p:nvPr>
+        </p:nvSpPr>
+        <p:spPr/>
+        <p:txBody>
+          <a:bodyPr/>
+          <a:lstStyle/>
+          <a:p>
+            <a:endParaRPr lang="en-US"/>
+          </a:p>
+        </p:txBody>
+      </p:sp>
+    </p:spTree>
+    <p:extLst>
+      <p:ext uri="{BB962C8B-B14F-4D97-AF65-F5344CB8AC3E}">
+        <p14:creationId xmlns:p14="http://schemas.microsoft.com/office/powerpoint/2010/main" val="1484689044"/>
+      </p:ext>
+    </p:extLst>
+  </p:cSld>
+  <p:clrMapOvr>
+    <a:masterClrMapping/>
+  </p:clrMapOvr>
+</p:sld>
+</file>
+
+<file path=ppt/slides/slide19.xml><?xml version="1.0" encoding="utf-8"?>
+<p:sld xmlns:a="http://schemas.openxmlformats.org/drawingml/2006/main" xmlns:r="http://schemas.openxmlformats.org/officeDocument/2006/relationships" xmlns:p="http://schemas.openxmlformats.org/presentationml/2006/main">
+  <p:cSld>
+    <p:spTree>
+      <p:nvGrpSpPr>
+        <p:cNvPr id="1" name=""/>
+        <p:cNvGrpSpPr/>
+        <p:nvPr/>
+      </p:nvGrpSpPr>
+      <p:grpSpPr>
+        <a:xfrm>
+          <a:off x="0" y="0"/>
+          <a:ext cx="0" cy="0"/>
+          <a:chOff x="0" y="0"/>
+          <a:chExt cx="0" cy="0"/>
+        </a:xfrm>
+      </p:grpSpPr>
+      <p:sp>
+        <p:nvSpPr>
+          <p:cNvPr id="2" name="Title 1">
+            <a:extLst>
+              <a:ext uri="{FF2B5EF4-FFF2-40B4-BE49-F238E27FC236}">
+                <a16:creationId xmlns:a16="http://schemas.microsoft.com/office/drawing/2014/main" id="{4C0F0E57-E070-45EF-B1F8-6DB332229DA1}"/>
+              </a:ext>
+            </a:extLst>
+          </p:cNvPr>
+          <p:cNvSpPr>
+            <a:spLocks noGrp="1"/>
+          </p:cNvSpPr>
+          <p:nvPr>
+            <p:ph type="title"/>
+          </p:nvPr>
+        </p:nvSpPr>
+        <p:spPr/>
+        <p:txBody>
+          <a:bodyPr/>
+          <a:lstStyle/>
+          <a:p>
+            <a:r>
+              <a:rPr lang="en-US" dirty="0"/>
+              <a:t>Subsets</a:t>
+            </a:r>
+          </a:p>
+        </p:txBody>
+      </p:sp>
+      <p:sp>
+        <p:nvSpPr>
+          <p:cNvPr id="3" name="Content Placeholder 2">
+            <a:extLst>
+              <a:ext uri="{FF2B5EF4-FFF2-40B4-BE49-F238E27FC236}">
+                <a16:creationId xmlns:a16="http://schemas.microsoft.com/office/drawing/2014/main" id="{219EDF09-02C8-40BB-9A61-85E28D12D1CE}"/>
+              </a:ext>
+            </a:extLst>
+          </p:cNvPr>
+          <p:cNvSpPr>
+            <a:spLocks noGrp="1"/>
+          </p:cNvSpPr>
+          <p:nvPr>
+            <p:ph idx="1"/>
+          </p:nvPr>
+        </p:nvSpPr>
+        <p:spPr/>
+        <p:txBody>
+          <a:bodyPr>
+            <a:normAutofit/>
+          </a:bodyPr>
+          <a:lstStyle/>
+          <a:p>
+            <a:pPr marL="0" indent="0">
+              <a:buNone/>
+            </a:pPr>
+            <a:r>
+              <a:rPr lang="en-US" dirty="0"/>
+              <a:t>Base Case(s): if rest is empty-&gt; {prefix}</a:t>
+            </a:r>
+          </a:p>
+          <a:p>
+            <a:pPr marL="0" indent="0">
+              <a:buNone/>
+            </a:pPr>
+            <a:r>
+              <a:rPr lang="en-US" dirty="0"/>
+              <a:t>Recursive Case(s):	Move first char of rest into prefix.</a:t>
+            </a:r>
+          </a:p>
+          <a:p>
+            <a:pPr marL="0" indent="0">
+              <a:buNone/>
+            </a:pPr>
+            <a:r>
+              <a:rPr lang="en-US" dirty="0"/>
+              <a:t>			Add all subsets of rest prefixed by prefix.</a:t>
+            </a:r>
+          </a:p>
+          <a:p>
+            <a:pPr marL="0" indent="0">
+              <a:buNone/>
+            </a:pPr>
+            <a:r>
+              <a:rPr lang="en-US" dirty="0"/>
+              <a:t>AND</a:t>
+            </a:r>
+          </a:p>
+          <a:p>
+            <a:pPr marL="0" indent="0">
+              <a:buNone/>
+            </a:pPr>
+            <a:r>
+              <a:rPr lang="en-US" dirty="0"/>
+              <a:t>			Remove first char of rest.</a:t>
+            </a:r>
+          </a:p>
+          <a:p>
+            <a:pPr marL="0" indent="0">
+              <a:buNone/>
+            </a:pPr>
+            <a:r>
+              <a:rPr lang="en-US" dirty="0"/>
+              <a:t>			Add a subsets of rest prefixed by prefix.</a:t>
+            </a:r>
+          </a:p>
+          <a:p>
+            <a:pPr marL="0" indent="0">
+              <a:buNone/>
+            </a:pPr>
+            <a:endParaRPr lang="en-US" dirty="0"/>
+          </a:p>
+        </p:txBody>
+      </p:sp>
+    </p:spTree>
+    <p:extLst>
+      <p:ext uri="{BB962C8B-B14F-4D97-AF65-F5344CB8AC3E}">
+        <p14:creationId xmlns:p14="http://schemas.microsoft.com/office/powerpoint/2010/main" val="4125527948"/>
+      </p:ext>
+    </p:extLst>
+  </p:cSld>
+  <p:clrMapOvr>
+    <a:masterClrMapping/>
+  </p:clrMapOvr>
+</p:sld>
+</file>
+
 <file path=ppt/slides/slide2.xml><?xml version="1.0" encoding="utf-8"?>
 <p:sld xmlns:a="http://schemas.openxmlformats.org/drawingml/2006/main" xmlns:r="http://schemas.openxmlformats.org/officeDocument/2006/relationships" xmlns:p="http://schemas.openxmlformats.org/presentationml/2006/main">
   <p:cSld>
@@ -3935,6 +4742,347 @@
     <p:extLst>
       <p:ext uri="{BB962C8B-B14F-4D97-AF65-F5344CB8AC3E}">
         <p14:creationId xmlns:p14="http://schemas.microsoft.com/office/powerpoint/2010/main" val="11825554"/>
+      </p:ext>
+    </p:extLst>
+  </p:cSld>
+  <p:clrMapOvr>
+    <a:masterClrMapping/>
+  </p:clrMapOvr>
+</p:sld>
+</file>
+
+<file path=ppt/slides/slide20.xml><?xml version="1.0" encoding="utf-8"?>
+<p:sld xmlns:a="http://schemas.openxmlformats.org/drawingml/2006/main" xmlns:r="http://schemas.openxmlformats.org/officeDocument/2006/relationships" xmlns:p="http://schemas.openxmlformats.org/presentationml/2006/main">
+  <p:cSld>
+    <p:spTree>
+      <p:nvGrpSpPr>
+        <p:cNvPr id="1" name=""/>
+        <p:cNvGrpSpPr/>
+        <p:nvPr/>
+      </p:nvGrpSpPr>
+      <p:grpSpPr>
+        <a:xfrm>
+          <a:off x="0" y="0"/>
+          <a:ext cx="0" cy="0"/>
+          <a:chOff x="0" y="0"/>
+          <a:chExt cx="0" cy="0"/>
+        </a:xfrm>
+      </p:grpSpPr>
+      <p:sp>
+        <p:nvSpPr>
+          <p:cNvPr id="2" name="Title 1">
+            <a:extLst>
+              <a:ext uri="{FF2B5EF4-FFF2-40B4-BE49-F238E27FC236}">
+                <a16:creationId xmlns:a16="http://schemas.microsoft.com/office/drawing/2014/main" id="{E9EBC2A2-5223-4E7B-A28A-9104170F91E8}"/>
+              </a:ext>
+            </a:extLst>
+          </p:cNvPr>
+          <p:cNvSpPr>
+            <a:spLocks noGrp="1"/>
+          </p:cNvSpPr>
+          <p:nvPr>
+            <p:ph type="title"/>
+          </p:nvPr>
+        </p:nvSpPr>
+        <p:spPr/>
+        <p:txBody>
+          <a:bodyPr/>
+          <a:lstStyle/>
+          <a:p>
+            <a:r>
+              <a:rPr lang="en-US" dirty="0"/>
+              <a:t>Combinations</a:t>
+            </a:r>
+          </a:p>
+        </p:txBody>
+      </p:sp>
+      <p:sp>
+        <p:nvSpPr>
+          <p:cNvPr id="3" name="Content Placeholder 2">
+            <a:extLst>
+              <a:ext uri="{FF2B5EF4-FFF2-40B4-BE49-F238E27FC236}">
+                <a16:creationId xmlns:a16="http://schemas.microsoft.com/office/drawing/2014/main" id="{3D99E6A9-E8D6-46AE-A893-034B09E91BFE}"/>
+              </a:ext>
+            </a:extLst>
+          </p:cNvPr>
+          <p:cNvSpPr>
+            <a:spLocks noGrp="1"/>
+          </p:cNvSpPr>
+          <p:nvPr>
+            <p:ph idx="1"/>
+          </p:nvPr>
+        </p:nvSpPr>
+        <p:spPr/>
+        <p:txBody>
+          <a:bodyPr/>
+          <a:lstStyle/>
+          <a:p>
+            <a:endParaRPr lang="en-US"/>
+          </a:p>
+        </p:txBody>
+      </p:sp>
+    </p:spTree>
+    <p:extLst>
+      <p:ext uri="{BB962C8B-B14F-4D97-AF65-F5344CB8AC3E}">
+        <p14:creationId xmlns:p14="http://schemas.microsoft.com/office/powerpoint/2010/main" val="41245227"/>
+      </p:ext>
+    </p:extLst>
+  </p:cSld>
+  <p:clrMapOvr>
+    <a:masterClrMapping/>
+  </p:clrMapOvr>
+</p:sld>
+</file>
+
+<file path=ppt/slides/slide21.xml><?xml version="1.0" encoding="utf-8"?>
+<p:sld xmlns:a="http://schemas.openxmlformats.org/drawingml/2006/main" xmlns:r="http://schemas.openxmlformats.org/officeDocument/2006/relationships" xmlns:p="http://schemas.openxmlformats.org/presentationml/2006/main">
+  <p:cSld>
+    <p:spTree>
+      <p:nvGrpSpPr>
+        <p:cNvPr id="1" name=""/>
+        <p:cNvGrpSpPr/>
+        <p:nvPr/>
+      </p:nvGrpSpPr>
+      <p:grpSpPr>
+        <a:xfrm>
+          <a:off x="0" y="0"/>
+          <a:ext cx="0" cy="0"/>
+          <a:chOff x="0" y="0"/>
+          <a:chExt cx="0" cy="0"/>
+        </a:xfrm>
+      </p:grpSpPr>
+      <p:sp>
+        <p:nvSpPr>
+          <p:cNvPr id="2" name="Title 1">
+            <a:extLst>
+              <a:ext uri="{FF2B5EF4-FFF2-40B4-BE49-F238E27FC236}">
+                <a16:creationId xmlns:a16="http://schemas.microsoft.com/office/drawing/2014/main" id="{2718247E-E51B-4AEC-927B-8B7916F42968}"/>
+              </a:ext>
+            </a:extLst>
+          </p:cNvPr>
+          <p:cNvSpPr>
+            <a:spLocks noGrp="1"/>
+          </p:cNvSpPr>
+          <p:nvPr>
+            <p:ph type="title"/>
+          </p:nvPr>
+        </p:nvSpPr>
+        <p:spPr/>
+        <p:txBody>
+          <a:bodyPr/>
+          <a:lstStyle/>
+          <a:p>
+            <a:r>
+              <a:rPr lang="en-US" dirty="0"/>
+              <a:t>Recursive backtracking</a:t>
+            </a:r>
+          </a:p>
+        </p:txBody>
+      </p:sp>
+      <p:sp>
+        <p:nvSpPr>
+          <p:cNvPr id="3" name="Content Placeholder 2">
+            <a:extLst>
+              <a:ext uri="{FF2B5EF4-FFF2-40B4-BE49-F238E27FC236}">
+                <a16:creationId xmlns:a16="http://schemas.microsoft.com/office/drawing/2014/main" id="{D75858E6-EE6B-4ADF-86CD-F85F59D29711}"/>
+              </a:ext>
+            </a:extLst>
+          </p:cNvPr>
+          <p:cNvSpPr>
+            <a:spLocks noGrp="1"/>
+          </p:cNvSpPr>
+          <p:nvPr>
+            <p:ph idx="1"/>
+          </p:nvPr>
+        </p:nvSpPr>
+        <p:spPr/>
+        <p:txBody>
+          <a:bodyPr/>
+          <a:lstStyle/>
+          <a:p>
+            <a:r>
+              <a:rPr lang="en-US" dirty="0"/>
+              <a:t>Maze solving</a:t>
+            </a:r>
+          </a:p>
+        </p:txBody>
+      </p:sp>
+    </p:spTree>
+    <p:extLst>
+      <p:ext uri="{BB962C8B-B14F-4D97-AF65-F5344CB8AC3E}">
+        <p14:creationId xmlns:p14="http://schemas.microsoft.com/office/powerpoint/2010/main" val="318988732"/>
+      </p:ext>
+    </p:extLst>
+  </p:cSld>
+  <p:clrMapOvr>
+    <a:masterClrMapping/>
+  </p:clrMapOvr>
+</p:sld>
+</file>
+
+<file path=ppt/slides/slide22.xml><?xml version="1.0" encoding="utf-8"?>
+<p:sld xmlns:a="http://schemas.openxmlformats.org/drawingml/2006/main" xmlns:r="http://schemas.openxmlformats.org/officeDocument/2006/relationships" xmlns:p="http://schemas.openxmlformats.org/presentationml/2006/main">
+  <p:cSld>
+    <p:spTree>
+      <p:nvGrpSpPr>
+        <p:cNvPr id="1" name=""/>
+        <p:cNvGrpSpPr/>
+        <p:nvPr/>
+      </p:nvGrpSpPr>
+      <p:grpSpPr>
+        <a:xfrm>
+          <a:off x="0" y="0"/>
+          <a:ext cx="0" cy="0"/>
+          <a:chOff x="0" y="0"/>
+          <a:chExt cx="0" cy="0"/>
+        </a:xfrm>
+      </p:grpSpPr>
+      <p:sp>
+        <p:nvSpPr>
+          <p:cNvPr id="2" name="Title 1">
+            <a:extLst>
+              <a:ext uri="{FF2B5EF4-FFF2-40B4-BE49-F238E27FC236}">
+                <a16:creationId xmlns:a16="http://schemas.microsoft.com/office/drawing/2014/main" id="{E955ACA9-9B3B-498B-A523-078AD701DBDB}"/>
+              </a:ext>
+            </a:extLst>
+          </p:cNvPr>
+          <p:cNvSpPr>
+            <a:spLocks noGrp="1"/>
+          </p:cNvSpPr>
+          <p:nvPr>
+            <p:ph type="title"/>
+          </p:nvPr>
+        </p:nvSpPr>
+        <p:spPr/>
+        <p:txBody>
+          <a:bodyPr/>
+          <a:lstStyle/>
+          <a:p>
+            <a:endParaRPr lang="en-US"/>
+          </a:p>
+        </p:txBody>
+      </p:sp>
+      <p:sp>
+        <p:nvSpPr>
+          <p:cNvPr id="3" name="Content Placeholder 2">
+            <a:extLst>
+              <a:ext uri="{FF2B5EF4-FFF2-40B4-BE49-F238E27FC236}">
+                <a16:creationId xmlns:a16="http://schemas.microsoft.com/office/drawing/2014/main" id="{2E02E721-E8C7-48B0-B9DB-DA6042AB9C7B}"/>
+              </a:ext>
+            </a:extLst>
+          </p:cNvPr>
+          <p:cNvSpPr>
+            <a:spLocks noGrp="1"/>
+          </p:cNvSpPr>
+          <p:nvPr>
+            <p:ph idx="1"/>
+          </p:nvPr>
+        </p:nvSpPr>
+        <p:spPr/>
+        <p:txBody>
+          <a:bodyPr>
+            <a:normAutofit fontScale="92500" lnSpcReduction="20000"/>
+          </a:bodyPr>
+          <a:lstStyle/>
+          <a:p>
+            <a:pPr marL="0" indent="0">
+              <a:buNone/>
+            </a:pPr>
+            <a:r>
+              <a:rPr lang="en-US" dirty="0"/>
+              <a:t>Recursive Backtracking:</a:t>
+            </a:r>
+          </a:p>
+          <a:p>
+            <a:pPr marL="0" indent="0">
+              <a:buNone/>
+            </a:pPr>
+            <a:r>
+              <a:rPr lang="en-US" dirty="0"/>
+              <a:t>	Make a choice</a:t>
+            </a:r>
+          </a:p>
+          <a:p>
+            <a:pPr marL="0" indent="0">
+              <a:buNone/>
+            </a:pPr>
+            <a:r>
+              <a:rPr lang="en-US" dirty="0"/>
+              <a:t>	if (recursion can solve the remaining problem) </a:t>
+            </a:r>
+          </a:p>
+          <a:p>
+            <a:pPr marL="0" indent="0">
+              <a:buNone/>
+            </a:pPr>
+            <a:r>
+              <a:rPr lang="en-US" dirty="0"/>
+              <a:t>		Done!</a:t>
+            </a:r>
+          </a:p>
+          <a:p>
+            <a:pPr marL="0" indent="0">
+              <a:buNone/>
+            </a:pPr>
+            <a:r>
+              <a:rPr lang="en-US" dirty="0"/>
+              <a:t>	Undo the choice</a:t>
+            </a:r>
+          </a:p>
+          <a:p>
+            <a:pPr marL="0" indent="0">
+              <a:buNone/>
+            </a:pPr>
+            <a:endParaRPr lang="en-US" dirty="0"/>
+          </a:p>
+          <a:p>
+            <a:pPr marL="0" indent="0">
+              <a:buNone/>
+            </a:pPr>
+            <a:r>
+              <a:rPr lang="en-US" dirty="0"/>
+              <a:t>	Repeat with next choice…</a:t>
+            </a:r>
+          </a:p>
+          <a:p>
+            <a:pPr marL="0" indent="0">
+              <a:buNone/>
+            </a:pPr>
+            <a:r>
+              <a:rPr lang="en-US" dirty="0"/>
+              <a:t>	</a:t>
+            </a:r>
+          </a:p>
+          <a:p>
+            <a:pPr marL="0" indent="0">
+              <a:buNone/>
+            </a:pPr>
+            <a:r>
+              <a:rPr lang="en-US" dirty="0"/>
+              <a:t>	Out of choices?</a:t>
+            </a:r>
+          </a:p>
+          <a:p>
+            <a:pPr marL="0" indent="0">
+              <a:buNone/>
+            </a:pPr>
+            <a:r>
+              <a:rPr lang="en-US" dirty="0"/>
+              <a:t>		No solution.</a:t>
+            </a:r>
+          </a:p>
+          <a:p>
+            <a:pPr marL="0" indent="0">
+              <a:buNone/>
+            </a:pPr>
+            <a:endParaRPr lang="en-US" dirty="0"/>
+          </a:p>
+        </p:txBody>
+      </p:sp>
+    </p:spTree>
+    <p:extLst>
+      <p:ext uri="{BB962C8B-B14F-4D97-AF65-F5344CB8AC3E}">
+        <p14:creationId xmlns:p14="http://schemas.microsoft.com/office/powerpoint/2010/main" val="3612617668"/>
       </p:ext>
     </p:extLst>
   </p:cSld>

</xml_diff>

<commit_message>
added more day 2 notes
</commit_message>
<xml_diff>
--- a/notes.pptx
+++ b/notes.pptx
@@ -27,6 +27,7 @@
     <p:sldId id="276" r:id="rId21"/>
     <p:sldId id="277" r:id="rId22"/>
     <p:sldId id="278" r:id="rId23"/>
+    <p:sldId id="279" r:id="rId24"/>
   </p:sldIdLst>
   <p:sldSz cx="12192000" cy="6858000"/>
   <p:notesSz cx="6858000" cy="9144000"/>
@@ -5092,6 +5093,89 @@
 </p:sld>
 </file>
 
+<file path=ppt/slides/slide23.xml><?xml version="1.0" encoding="utf-8"?>
+<p:sld xmlns:a="http://schemas.openxmlformats.org/drawingml/2006/main" xmlns:r="http://schemas.openxmlformats.org/officeDocument/2006/relationships" xmlns:p="http://schemas.openxmlformats.org/presentationml/2006/main">
+  <p:cSld>
+    <p:spTree>
+      <p:nvGrpSpPr>
+        <p:cNvPr id="1" name=""/>
+        <p:cNvGrpSpPr/>
+        <p:nvPr/>
+      </p:nvGrpSpPr>
+      <p:grpSpPr>
+        <a:xfrm>
+          <a:off x="0" y="0"/>
+          <a:ext cx="0" cy="0"/>
+          <a:chOff x="0" y="0"/>
+          <a:chExt cx="0" cy="0"/>
+        </a:xfrm>
+      </p:grpSpPr>
+      <p:sp>
+        <p:nvSpPr>
+          <p:cNvPr id="2" name="Title 1">
+            <a:extLst>
+              <a:ext uri="{FF2B5EF4-FFF2-40B4-BE49-F238E27FC236}">
+                <a16:creationId xmlns:a16="http://schemas.microsoft.com/office/drawing/2014/main" id="{6D8DD4CB-8C50-4BB0-91C0-5EC35291318B}"/>
+              </a:ext>
+            </a:extLst>
+          </p:cNvPr>
+          <p:cNvSpPr>
+            <a:spLocks noGrp="1"/>
+          </p:cNvSpPr>
+          <p:nvPr>
+            <p:ph type="title"/>
+          </p:nvPr>
+        </p:nvSpPr>
+        <p:spPr/>
+        <p:txBody>
+          <a:bodyPr/>
+          <a:lstStyle/>
+          <a:p>
+            <a:r>
+              <a:rPr lang="en-US" dirty="0"/>
+              <a:t>Maze</a:t>
+            </a:r>
+          </a:p>
+        </p:txBody>
+      </p:sp>
+      <p:sp>
+        <p:nvSpPr>
+          <p:cNvPr id="3" name="Content Placeholder 2">
+            <a:extLst>
+              <a:ext uri="{FF2B5EF4-FFF2-40B4-BE49-F238E27FC236}">
+                <a16:creationId xmlns:a16="http://schemas.microsoft.com/office/drawing/2014/main" id="{3FFD7ABE-9256-49CA-817D-7D7504AA3683}"/>
+              </a:ext>
+            </a:extLst>
+          </p:cNvPr>
+          <p:cNvSpPr>
+            <a:spLocks noGrp="1"/>
+          </p:cNvSpPr>
+          <p:nvPr>
+            <p:ph idx="1"/>
+          </p:nvPr>
+        </p:nvSpPr>
+        <p:spPr/>
+        <p:txBody>
+          <a:bodyPr/>
+          <a:lstStyle/>
+          <a:p>
+            <a:endParaRPr lang="en-US"/>
+          </a:p>
+        </p:txBody>
+      </p:sp>
+    </p:spTree>
+    <p:extLst>
+      <p:ext uri="{BB962C8B-B14F-4D97-AF65-F5344CB8AC3E}">
+        <p14:creationId xmlns:p14="http://schemas.microsoft.com/office/powerpoint/2010/main" val="1234248384"/>
+      </p:ext>
+    </p:extLst>
+  </p:cSld>
+  <p:clrMapOvr>
+    <a:masterClrMapping/>
+  </p:clrMapOvr>
+</p:sld>
+</file>
+
 <file path=ppt/slides/slide3.xml><?xml version="1.0" encoding="utf-8"?>
 <p:sld xmlns:a="http://schemas.openxmlformats.org/drawingml/2006/main" xmlns:r="http://schemas.openxmlformats.org/officeDocument/2006/relationships" xmlns:p="http://schemas.openxmlformats.org/presentationml/2006/main">
   <p:cSld>

</xml_diff>

<commit_message>
fixed notes on problem/algorithm/etc
</commit_message>
<xml_diff>
--- a/notes.pptx
+++ b/notes.pptx
@@ -15,19 +15,20 @@
     <p:sldId id="262" r:id="rId9"/>
     <p:sldId id="264" r:id="rId10"/>
     <p:sldId id="265" r:id="rId11"/>
-    <p:sldId id="266" r:id="rId12"/>
-    <p:sldId id="267" r:id="rId13"/>
-    <p:sldId id="270" r:id="rId14"/>
-    <p:sldId id="269" r:id="rId15"/>
-    <p:sldId id="271" r:id="rId16"/>
-    <p:sldId id="272" r:id="rId17"/>
-    <p:sldId id="273" r:id="rId18"/>
-    <p:sldId id="274" r:id="rId19"/>
-    <p:sldId id="275" r:id="rId20"/>
-    <p:sldId id="276" r:id="rId21"/>
-    <p:sldId id="277" r:id="rId22"/>
-    <p:sldId id="278" r:id="rId23"/>
-    <p:sldId id="279" r:id="rId24"/>
+    <p:sldId id="280" r:id="rId12"/>
+    <p:sldId id="266" r:id="rId13"/>
+    <p:sldId id="267" r:id="rId14"/>
+    <p:sldId id="270" r:id="rId15"/>
+    <p:sldId id="269" r:id="rId16"/>
+    <p:sldId id="271" r:id="rId17"/>
+    <p:sldId id="272" r:id="rId18"/>
+    <p:sldId id="273" r:id="rId19"/>
+    <p:sldId id="274" r:id="rId20"/>
+    <p:sldId id="275" r:id="rId21"/>
+    <p:sldId id="276" r:id="rId22"/>
+    <p:sldId id="277" r:id="rId23"/>
+    <p:sldId id="278" r:id="rId24"/>
+    <p:sldId id="279" r:id="rId25"/>
   </p:sldIdLst>
   <p:sldSz cx="12192000" cy="6858000"/>
   <p:notesSz cx="6858000" cy="9144000"/>
@@ -281,7 +282,7 @@
           <a:p>
             <a:fld id="{DE176E02-7D44-4713-8078-8E0963CF8DDB}" type="datetimeFigureOut">
               <a:rPr lang="en-US" smtClean="0"/>
-              <a:t>9/3/2019</a:t>
+              <a:t>9/4/2019</a:t>
             </a:fld>
             <a:endParaRPr lang="en-US"/>
           </a:p>
@@ -479,7 +480,7 @@
           <a:p>
             <a:fld id="{DE176E02-7D44-4713-8078-8E0963CF8DDB}" type="datetimeFigureOut">
               <a:rPr lang="en-US" smtClean="0"/>
-              <a:t>9/3/2019</a:t>
+              <a:t>9/4/2019</a:t>
             </a:fld>
             <a:endParaRPr lang="en-US"/>
           </a:p>
@@ -687,7 +688,7 @@
           <a:p>
             <a:fld id="{DE176E02-7D44-4713-8078-8E0963CF8DDB}" type="datetimeFigureOut">
               <a:rPr lang="en-US" smtClean="0"/>
-              <a:t>9/3/2019</a:t>
+              <a:t>9/4/2019</a:t>
             </a:fld>
             <a:endParaRPr lang="en-US"/>
           </a:p>
@@ -885,7 +886,7 @@
           <a:p>
             <a:fld id="{DE176E02-7D44-4713-8078-8E0963CF8DDB}" type="datetimeFigureOut">
               <a:rPr lang="en-US" smtClean="0"/>
-              <a:t>9/3/2019</a:t>
+              <a:t>9/4/2019</a:t>
             </a:fld>
             <a:endParaRPr lang="en-US"/>
           </a:p>
@@ -1160,7 +1161,7 @@
           <a:p>
             <a:fld id="{DE176E02-7D44-4713-8078-8E0963CF8DDB}" type="datetimeFigureOut">
               <a:rPr lang="en-US" smtClean="0"/>
-              <a:t>9/3/2019</a:t>
+              <a:t>9/4/2019</a:t>
             </a:fld>
             <a:endParaRPr lang="en-US"/>
           </a:p>
@@ -1425,7 +1426,7 @@
           <a:p>
             <a:fld id="{DE176E02-7D44-4713-8078-8E0963CF8DDB}" type="datetimeFigureOut">
               <a:rPr lang="en-US" smtClean="0"/>
-              <a:t>9/3/2019</a:t>
+              <a:t>9/4/2019</a:t>
             </a:fld>
             <a:endParaRPr lang="en-US"/>
           </a:p>
@@ -1837,7 +1838,7 @@
           <a:p>
             <a:fld id="{DE176E02-7D44-4713-8078-8E0963CF8DDB}" type="datetimeFigureOut">
               <a:rPr lang="en-US" smtClean="0"/>
-              <a:t>9/3/2019</a:t>
+              <a:t>9/4/2019</a:t>
             </a:fld>
             <a:endParaRPr lang="en-US"/>
           </a:p>
@@ -1978,7 +1979,7 @@
           <a:p>
             <a:fld id="{DE176E02-7D44-4713-8078-8E0963CF8DDB}" type="datetimeFigureOut">
               <a:rPr lang="en-US" smtClean="0"/>
-              <a:t>9/3/2019</a:t>
+              <a:t>9/4/2019</a:t>
             </a:fld>
             <a:endParaRPr lang="en-US"/>
           </a:p>
@@ -2091,7 +2092,7 @@
           <a:p>
             <a:fld id="{DE176E02-7D44-4713-8078-8E0963CF8DDB}" type="datetimeFigureOut">
               <a:rPr lang="en-US" smtClean="0"/>
-              <a:t>9/3/2019</a:t>
+              <a:t>9/4/2019</a:t>
             </a:fld>
             <a:endParaRPr lang="en-US"/>
           </a:p>
@@ -2402,7 +2403,7 @@
           <a:p>
             <a:fld id="{DE176E02-7D44-4713-8078-8E0963CF8DDB}" type="datetimeFigureOut">
               <a:rPr lang="en-US" smtClean="0"/>
-              <a:t>9/3/2019</a:t>
+              <a:t>9/4/2019</a:t>
             </a:fld>
             <a:endParaRPr lang="en-US"/>
           </a:p>
@@ -2690,7 +2691,7 @@
           <a:p>
             <a:fld id="{DE176E02-7D44-4713-8078-8E0963CF8DDB}" type="datetimeFigureOut">
               <a:rPr lang="en-US" smtClean="0"/>
-              <a:t>9/3/2019</a:t>
+              <a:t>9/4/2019</a:t>
             </a:fld>
             <a:endParaRPr lang="en-US"/>
           </a:p>
@@ -2931,7 +2932,7 @@
           <a:p>
             <a:fld id="{DE176E02-7D44-4713-8078-8E0963CF8DDB}" type="datetimeFigureOut">
               <a:rPr lang="en-US" smtClean="0"/>
-              <a:t>9/3/2019</a:t>
+              <a:t>9/4/2019</a:t>
             </a:fld>
             <a:endParaRPr lang="en-US"/>
           </a:p>
@@ -3630,7 +3631,7 @@
           <p:cNvPr id="2" name="Title 1">
             <a:extLst>
               <a:ext uri="{FF2B5EF4-FFF2-40B4-BE49-F238E27FC236}">
-                <a16:creationId xmlns:a16="http://schemas.microsoft.com/office/drawing/2014/main" id="{632B9A1C-3AEC-4AF3-8094-7DBDB2E5B4AA}"/>
+                <a16:creationId xmlns:a16="http://schemas.microsoft.com/office/drawing/2014/main" id="{D05B6C34-4B76-4825-9626-26ADA7D79F8A}"/>
               </a:ext>
             </a:extLst>
           </p:cNvPr>
@@ -3646,7 +3647,18 @@
           <a:bodyPr/>
           <a:lstStyle/>
           <a:p>
-            <a:endParaRPr lang="en-US" dirty="0"/>
+            <a:r>
+              <a:rPr lang="en-US" dirty="0"/>
+              <a:t>Demo </a:t>
+            </a:r>
+            <a:r>
+              <a:rPr lang="en-US" dirty="0" err="1"/>
+              <a:t>github</a:t>
+            </a:r>
+            <a:r>
+              <a:rPr lang="en-US" dirty="0"/>
+              <a:t> </a:t>
+            </a:r>
           </a:p>
         </p:txBody>
       </p:sp>
@@ -3655,7 +3667,7 @@
           <p:cNvPr id="3" name="Content Placeholder 2">
             <a:extLst>
               <a:ext uri="{FF2B5EF4-FFF2-40B4-BE49-F238E27FC236}">
-                <a16:creationId xmlns:a16="http://schemas.microsoft.com/office/drawing/2014/main" id="{FD403C14-2D19-443E-8934-AFF86C4B1AAC}"/>
+                <a16:creationId xmlns:a16="http://schemas.microsoft.com/office/drawing/2014/main" id="{0C757AD8-444A-4019-9968-1BEBA88A0F66}"/>
               </a:ext>
             </a:extLst>
           </p:cNvPr>
@@ -3671,49 +3683,14 @@
           <a:bodyPr/>
           <a:lstStyle/>
           <a:p>
-            <a:r>
-              <a:rPr lang="en-US" dirty="0"/>
-              <a:t>Problem</a:t>
-            </a:r>
-          </a:p>
-          <a:p>
-            <a:pPr lvl="1"/>
-            <a:r>
-              <a:rPr lang="en-US" dirty="0"/>
-              <a:t>What, not how </a:t>
-            </a:r>
-          </a:p>
-          <a:p>
-            <a:pPr lvl="1"/>
-            <a:r>
-              <a:rPr lang="en-US" dirty="0"/>
-              <a:t>Sorting- put elements in order</a:t>
-            </a:r>
-          </a:p>
-          <a:p>
-            <a:pPr lvl="1"/>
-            <a:r>
-              <a:rPr lang="en-US" dirty="0"/>
-              <a:t>Searching- find a specific element in a collection</a:t>
-            </a:r>
-          </a:p>
-          <a:p>
-            <a:pPr lvl="1"/>
-            <a:r>
-              <a:rPr lang="en-US" dirty="0"/>
-              <a:t>Find a path through a maze</a:t>
-            </a:r>
-          </a:p>
-          <a:p>
-            <a:pPr lvl="1"/>
-            <a:endParaRPr lang="en-US" dirty="0"/>
+            <a:endParaRPr lang="en-US"/>
           </a:p>
         </p:txBody>
       </p:sp>
     </p:spTree>
     <p:extLst>
       <p:ext uri="{BB962C8B-B14F-4D97-AF65-F5344CB8AC3E}">
-        <p14:creationId xmlns:p14="http://schemas.microsoft.com/office/powerpoint/2010/main" val="406340293"/>
+        <p14:creationId xmlns:p14="http://schemas.microsoft.com/office/powerpoint/2010/main" val="3570606073"/>
       </p:ext>
     </p:extLst>
   </p:cSld>
@@ -3745,7 +3722,7 @@
           <p:cNvPr id="2" name="Title 1">
             <a:extLst>
               <a:ext uri="{FF2B5EF4-FFF2-40B4-BE49-F238E27FC236}">
-                <a16:creationId xmlns:a16="http://schemas.microsoft.com/office/drawing/2014/main" id="{656C9E78-E976-4E60-8E97-C8670CE58C64}"/>
+                <a16:creationId xmlns:a16="http://schemas.microsoft.com/office/drawing/2014/main" id="{632B9A1C-3AEC-4AF3-8094-7DBDB2E5B4AA}"/>
               </a:ext>
             </a:extLst>
           </p:cNvPr>
@@ -3761,7 +3738,7 @@
           <a:bodyPr/>
           <a:lstStyle/>
           <a:p>
-            <a:endParaRPr lang="en-US"/>
+            <a:endParaRPr lang="en-US" dirty="0"/>
           </a:p>
         </p:txBody>
       </p:sp>
@@ -3770,7 +3747,7 @@
           <p:cNvPr id="3" name="Content Placeholder 2">
             <a:extLst>
               <a:ext uri="{FF2B5EF4-FFF2-40B4-BE49-F238E27FC236}">
-                <a16:creationId xmlns:a16="http://schemas.microsoft.com/office/drawing/2014/main" id="{E45D1639-842F-492B-B0F1-3EB4D39AC8CF}"/>
+                <a16:creationId xmlns:a16="http://schemas.microsoft.com/office/drawing/2014/main" id="{FD403C14-2D19-443E-8934-AFF86C4B1AAC}"/>
               </a:ext>
             </a:extLst>
           </p:cNvPr>
@@ -3788,79 +3765,59 @@
           <a:p>
             <a:r>
               <a:rPr lang="en-US" dirty="0"/>
-              <a:t>Algorithm </a:t>
+              <a:t>Problem</a:t>
             </a:r>
           </a:p>
           <a:p>
             <a:pPr lvl="1"/>
             <a:r>
               <a:rPr lang="en-US" dirty="0"/>
-              <a:t>How</a:t>
+              <a:t>What, not how </a:t>
             </a:r>
           </a:p>
           <a:p>
             <a:pPr lvl="1"/>
             <a:r>
               <a:rPr lang="en-US" dirty="0"/>
-              <a:t>Many algorithms for same problem (sorting)</a:t>
+              <a:t>Sorting- put elements in order</a:t>
             </a:r>
           </a:p>
           <a:p>
             <a:pPr lvl="1"/>
             <a:r>
               <a:rPr lang="en-US" dirty="0"/>
-              <a:t>Properties</a:t>
-            </a:r>
-          </a:p>
-          <a:p>
-            <a:pPr lvl="2"/>
-            <a:r>
-              <a:rPr lang="en-US" dirty="0"/>
-              <a:t>Correct</a:t>
-            </a:r>
-          </a:p>
-          <a:p>
-            <a:pPr lvl="2"/>
-            <a:r>
-              <a:rPr lang="en-US" dirty="0"/>
-              <a:t>Concrete steps (doable in finite time)</a:t>
-            </a:r>
-          </a:p>
-          <a:p>
-            <a:pPr lvl="2"/>
-            <a:r>
-              <a:rPr lang="en-US" dirty="0"/>
-              <a:t>Unambiguous order</a:t>
-            </a:r>
-          </a:p>
-          <a:p>
-            <a:pPr lvl="2"/>
-            <a:r>
-              <a:rPr lang="en-US" dirty="0"/>
-              <a:t>Finite number of steps</a:t>
-            </a:r>
-          </a:p>
-          <a:p>
-            <a:pPr lvl="2"/>
-            <a:r>
-              <a:rPr lang="en-US" dirty="0"/>
-              <a:t>Terminates</a:t>
-            </a:r>
-          </a:p>
-          <a:p>
-            <a:r>
-              <a:rPr lang="en-US" dirty="0"/>
-              <a:t>Program</a:t>
+              <a:t>Searching- find a specific element in a collection</a:t>
             </a:r>
           </a:p>
           <a:p>
             <a:pPr lvl="1"/>
             <a:r>
               <a:rPr lang="en-US" dirty="0"/>
-              <a:t>Executable implementation of an algorithm in a programming language</a:t>
-            </a:r>
-          </a:p>
-          <a:p>
+              <a:t>Find a path through a maze</a:t>
+            </a:r>
+          </a:p>
+          <a:p>
+            <a:r>
+              <a:rPr lang="en-US" dirty="0"/>
+              <a:t>Instance or Case</a:t>
+            </a:r>
+          </a:p>
+          <a:p>
+            <a:pPr lvl="1"/>
+            <a:r>
+              <a:rPr lang="en-US" dirty="0"/>
+              <a:t>A set of inputs of a particular form of any size</a:t>
+            </a:r>
+          </a:p>
+          <a:p>
+            <a:pPr lvl="1"/>
+            <a:r>
+              <a:rPr lang="en-US" dirty="0"/>
+              <a:t>NOT A SPECIFIC INPUT</a:t>
+            </a:r>
+          </a:p>
+          <a:p>
+            <a:pPr lvl="1"/>
             <a:endParaRPr lang="en-US" dirty="0"/>
           </a:p>
         </p:txBody>
@@ -3868,7 +3825,7 @@
     </p:spTree>
     <p:extLst>
       <p:ext uri="{BB962C8B-B14F-4D97-AF65-F5344CB8AC3E}">
-        <p14:creationId xmlns:p14="http://schemas.microsoft.com/office/powerpoint/2010/main" val="3659503510"/>
+        <p14:creationId xmlns:p14="http://schemas.microsoft.com/office/powerpoint/2010/main" val="406340293"/>
       </p:ext>
     </p:extLst>
   </p:cSld>
@@ -3900,7 +3857,7 @@
           <p:cNvPr id="2" name="Title 1">
             <a:extLst>
               <a:ext uri="{FF2B5EF4-FFF2-40B4-BE49-F238E27FC236}">
-                <a16:creationId xmlns:a16="http://schemas.microsoft.com/office/drawing/2014/main" id="{D88262F6-2AC3-4DD1-8882-CE82FC1EE2F2}"/>
+                <a16:creationId xmlns:a16="http://schemas.microsoft.com/office/drawing/2014/main" id="{656C9E78-E976-4E60-8E97-C8670CE58C64}"/>
               </a:ext>
             </a:extLst>
           </p:cNvPr>
@@ -3925,7 +3882,7 @@
           <p:cNvPr id="3" name="Content Placeholder 2">
             <a:extLst>
               <a:ext uri="{FF2B5EF4-FFF2-40B4-BE49-F238E27FC236}">
-                <a16:creationId xmlns:a16="http://schemas.microsoft.com/office/drawing/2014/main" id="{7CE20302-4CBE-4CD2-B95F-EFD6C4B08CFA}"/>
+                <a16:creationId xmlns:a16="http://schemas.microsoft.com/office/drawing/2014/main" id="{E45D1639-842F-492B-B0F1-3EB4D39AC8CF}"/>
               </a:ext>
             </a:extLst>
           </p:cNvPr>
@@ -3943,29 +3900,79 @@
           <a:p>
             <a:r>
               <a:rPr lang="en-US" dirty="0"/>
-              <a:t>Function- a mathematical function</a:t>
+              <a:t>Algorithm </a:t>
             </a:r>
           </a:p>
           <a:p>
             <a:pPr lvl="1"/>
             <a:r>
               <a:rPr lang="en-US" dirty="0"/>
-              <a:t>Positive inputs, positive output, increasing</a:t>
-            </a:r>
-          </a:p>
-          <a:p>
-            <a:endParaRPr lang="en-US" dirty="0"/>
-          </a:p>
-          <a:p>
-            <a:endParaRPr lang="en-US" dirty="0"/>
-          </a:p>
-          <a:p>
-            <a:endParaRPr lang="en-US" dirty="0"/>
-          </a:p>
-          <a:p>
-            <a:pPr marL="0" indent="0">
-              <a:buNone/>
-            </a:pPr>
+              <a:t>How</a:t>
+            </a:r>
+          </a:p>
+          <a:p>
+            <a:pPr lvl="1"/>
+            <a:r>
+              <a:rPr lang="en-US" dirty="0"/>
+              <a:t>Many algorithms for same problem (sorting)</a:t>
+            </a:r>
+          </a:p>
+          <a:p>
+            <a:pPr lvl="1"/>
+            <a:r>
+              <a:rPr lang="en-US" dirty="0"/>
+              <a:t>Properties</a:t>
+            </a:r>
+          </a:p>
+          <a:p>
+            <a:pPr lvl="2"/>
+            <a:r>
+              <a:rPr lang="en-US" dirty="0"/>
+              <a:t>Correct</a:t>
+            </a:r>
+          </a:p>
+          <a:p>
+            <a:pPr lvl="2"/>
+            <a:r>
+              <a:rPr lang="en-US" dirty="0"/>
+              <a:t>Concrete steps (doable in finite time)</a:t>
+            </a:r>
+          </a:p>
+          <a:p>
+            <a:pPr lvl="2"/>
+            <a:r>
+              <a:rPr lang="en-US" dirty="0"/>
+              <a:t>Unambiguous order</a:t>
+            </a:r>
+          </a:p>
+          <a:p>
+            <a:pPr lvl="2"/>
+            <a:r>
+              <a:rPr lang="en-US" dirty="0"/>
+              <a:t>Finite number of steps</a:t>
+            </a:r>
+          </a:p>
+          <a:p>
+            <a:pPr lvl="2"/>
+            <a:r>
+              <a:rPr lang="en-US" dirty="0"/>
+              <a:t>Terminates</a:t>
+            </a:r>
+          </a:p>
+          <a:p>
+            <a:r>
+              <a:rPr lang="en-US" dirty="0"/>
+              <a:t>Program</a:t>
+            </a:r>
+          </a:p>
+          <a:p>
+            <a:pPr lvl="1"/>
+            <a:r>
+              <a:rPr lang="en-US" dirty="0"/>
+              <a:t>Executable implementation of an algorithm in a programming language</a:t>
+            </a:r>
+          </a:p>
+          <a:p>
             <a:endParaRPr lang="en-US" dirty="0"/>
           </a:p>
         </p:txBody>
@@ -3973,7 +3980,7 @@
     </p:spTree>
     <p:extLst>
       <p:ext uri="{BB962C8B-B14F-4D97-AF65-F5344CB8AC3E}">
-        <p14:creationId xmlns:p14="http://schemas.microsoft.com/office/powerpoint/2010/main" val="167172012"/>
+        <p14:creationId xmlns:p14="http://schemas.microsoft.com/office/powerpoint/2010/main" val="3659503510"/>
       </p:ext>
     </p:extLst>
   </p:cSld>
@@ -4005,7 +4012,7 @@
           <p:cNvPr id="2" name="Title 1">
             <a:extLst>
               <a:ext uri="{FF2B5EF4-FFF2-40B4-BE49-F238E27FC236}">
-                <a16:creationId xmlns:a16="http://schemas.microsoft.com/office/drawing/2014/main" id="{4B35A7FF-DF39-4420-A431-5C9BDAA11D11}"/>
+                <a16:creationId xmlns:a16="http://schemas.microsoft.com/office/drawing/2014/main" id="{D88262F6-2AC3-4DD1-8882-CE82FC1EE2F2}"/>
               </a:ext>
             </a:extLst>
           </p:cNvPr>
@@ -4021,10 +4028,7 @@
           <a:bodyPr/>
           <a:lstStyle/>
           <a:p>
-            <a:r>
-              <a:rPr lang="en-US" dirty="0"/>
-              <a:t>Recursion</a:t>
-            </a:r>
+            <a:endParaRPr lang="en-US"/>
           </a:p>
         </p:txBody>
       </p:sp>
@@ -4033,7 +4037,7 @@
           <p:cNvPr id="3" name="Content Placeholder 2">
             <a:extLst>
               <a:ext uri="{FF2B5EF4-FFF2-40B4-BE49-F238E27FC236}">
-                <a16:creationId xmlns:a16="http://schemas.microsoft.com/office/drawing/2014/main" id="{B3181758-222B-4A21-87BF-700926FD1DC4}"/>
+                <a16:creationId xmlns:a16="http://schemas.microsoft.com/office/drawing/2014/main" id="{7CE20302-4CBE-4CD2-B95F-EFD6C4B08CFA}"/>
               </a:ext>
             </a:extLst>
           </p:cNvPr>
@@ -4051,21 +4055,48 @@
           <a:p>
             <a:r>
               <a:rPr lang="en-US" dirty="0"/>
-              <a:t>1 or more base cases</a:t>
-            </a:r>
-          </a:p>
-          <a:p>
-            <a:r>
-              <a:rPr lang="en-US" dirty="0"/>
-              <a:t>1 or more recursive calls</a:t>
-            </a:r>
+              <a:t>Function- a mathematical function</a:t>
+            </a:r>
+          </a:p>
+          <a:p>
+            <a:pPr lvl="1"/>
+            <a:r>
+              <a:rPr lang="en-US" dirty="0"/>
+              <a:t>Positive inputs, positive output, increasing</a:t>
+            </a:r>
+          </a:p>
+          <a:p>
+            <a:pPr lvl="1"/>
+            <a:endParaRPr lang="en-US" dirty="0"/>
+          </a:p>
+          <a:p>
+            <a:pPr lvl="1"/>
+            <a:endParaRPr lang="en-US" dirty="0"/>
+          </a:p>
+          <a:p>
+            <a:pPr marL="0" indent="0">
+              <a:buNone/>
+            </a:pPr>
+            <a:endParaRPr lang="en-US" dirty="0"/>
+          </a:p>
+          <a:p>
+            <a:endParaRPr lang="en-US" dirty="0"/>
+          </a:p>
+          <a:p>
+            <a:endParaRPr lang="en-US" dirty="0"/>
+          </a:p>
+          <a:p>
+            <a:pPr marL="0" indent="0">
+              <a:buNone/>
+            </a:pPr>
+            <a:endParaRPr lang="en-US" dirty="0"/>
           </a:p>
         </p:txBody>
       </p:sp>
     </p:spTree>
     <p:extLst>
       <p:ext uri="{BB962C8B-B14F-4D97-AF65-F5344CB8AC3E}">
-        <p14:creationId xmlns:p14="http://schemas.microsoft.com/office/powerpoint/2010/main" val="1439495836"/>
+        <p14:creationId xmlns:p14="http://schemas.microsoft.com/office/powerpoint/2010/main" val="167172012"/>
       </p:ext>
     </p:extLst>
   </p:cSld>
@@ -4097,7 +4128,7 @@
           <p:cNvPr id="2" name="Title 1">
             <a:extLst>
               <a:ext uri="{FF2B5EF4-FFF2-40B4-BE49-F238E27FC236}">
-                <a16:creationId xmlns:a16="http://schemas.microsoft.com/office/drawing/2014/main" id="{A1AF49BA-BF02-4494-B95D-7C5DE90AF10B}"/>
+                <a16:creationId xmlns:a16="http://schemas.microsoft.com/office/drawing/2014/main" id="{4B35A7FF-DF39-4420-A431-5C9BDAA11D11}"/>
               </a:ext>
             </a:extLst>
           </p:cNvPr>
@@ -4114,10 +4145,9 @@
           <a:lstStyle/>
           <a:p>
             <a:r>
-              <a:rPr lang="en-US" dirty="0" err="1"/>
-              <a:t>CountX</a:t>
-            </a:r>
-            <a:endParaRPr lang="en-US" dirty="0"/>
+              <a:rPr lang="en-US" dirty="0"/>
+              <a:t>Recursion</a:t>
+            </a:r>
           </a:p>
         </p:txBody>
       </p:sp>
@@ -4126,7 +4156,7 @@
           <p:cNvPr id="3" name="Content Placeholder 2">
             <a:extLst>
               <a:ext uri="{FF2B5EF4-FFF2-40B4-BE49-F238E27FC236}">
-                <a16:creationId xmlns:a16="http://schemas.microsoft.com/office/drawing/2014/main" id="{2476E292-B848-450E-B23C-E4FF34288291}"/>
+                <a16:creationId xmlns:a16="http://schemas.microsoft.com/office/drawing/2014/main" id="{B3181758-222B-4A21-87BF-700926FD1DC4}"/>
               </a:ext>
             </a:extLst>
           </p:cNvPr>
@@ -4142,79 +4172,15 @@
           <a:bodyPr/>
           <a:lstStyle/>
           <a:p>
-            <a:pPr marL="0" indent="0">
-              <a:buNone/>
-            </a:pPr>
-            <a:r>
-              <a:rPr lang="en-US" dirty="0" err="1"/>
-              <a:t>countX</a:t>
-            </a:r>
-            <a:r>
-              <a:rPr lang="en-US" dirty="0"/>
-              <a:t>(s) =	Base Case(s):0 	if s is empty</a:t>
-            </a:r>
-          </a:p>
-          <a:p>
-            <a:pPr marL="0" indent="0">
-              <a:buNone/>
-            </a:pPr>
-            <a:r>
-              <a:rPr lang="en-US" dirty="0"/>
-              <a:t>	</a:t>
-            </a:r>
-            <a:r>
-              <a:rPr lang="en-US" dirty="0" err="1"/>
-              <a:t>Reccursive</a:t>
-            </a:r>
-            <a:r>
-              <a:rPr lang="en-US" dirty="0"/>
-              <a:t> Cases(s): 1 + </a:t>
-            </a:r>
-            <a:r>
-              <a:rPr lang="en-US" dirty="0" err="1"/>
-              <a:t>countX</a:t>
-            </a:r>
-            <a:r>
-              <a:rPr lang="en-US" dirty="0"/>
-              <a:t>(s - 1st char) 	if first char is ‘x’</a:t>
-            </a:r>
-          </a:p>
-          <a:p>
-            <a:pPr marL="0" indent="0">
-              <a:buNone/>
-            </a:pPr>
-            <a:r>
-              <a:rPr lang="en-US" dirty="0"/>
-              <a:t>				    </a:t>
-            </a:r>
-            <a:r>
-              <a:rPr lang="en-US" dirty="0" err="1"/>
-              <a:t>countX</a:t>
-            </a:r>
-            <a:r>
-              <a:rPr lang="en-US" dirty="0"/>
-              <a:t>(s - 1st char) if first char is not ‘x’ </a:t>
-            </a:r>
-          </a:p>
-          <a:p>
-            <a:endParaRPr lang="en-US" dirty="0"/>
-          </a:p>
-          <a:p>
-            <a:endParaRPr lang="en-US" dirty="0"/>
-          </a:p>
-          <a:p>
-            <a:endParaRPr lang="en-US" dirty="0"/>
-          </a:p>
-          <a:p>
-            <a:r>
-              <a:rPr lang="en-US" dirty="0"/>
-              <a:t>Theater time</a:t>
-            </a:r>
-          </a:p>
-          <a:p>
-            <a:r>
-              <a:rPr lang="en-US" dirty="0"/>
-              <a:t>Code time</a:t>
+            <a:r>
+              <a:rPr lang="en-US" dirty="0"/>
+              <a:t>1 or more base cases</a:t>
+            </a:r>
+          </a:p>
+          <a:p>
+            <a:r>
+              <a:rPr lang="en-US" dirty="0"/>
+              <a:t>1 or more recursive calls</a:t>
             </a:r>
           </a:p>
         </p:txBody>
@@ -4222,7 +4188,7 @@
     </p:spTree>
     <p:extLst>
       <p:ext uri="{BB962C8B-B14F-4D97-AF65-F5344CB8AC3E}">
-        <p14:creationId xmlns:p14="http://schemas.microsoft.com/office/powerpoint/2010/main" val="45859203"/>
+        <p14:creationId xmlns:p14="http://schemas.microsoft.com/office/powerpoint/2010/main" val="1439495836"/>
       </p:ext>
     </p:extLst>
   </p:cSld>
@@ -4254,7 +4220,7 @@
           <p:cNvPr id="2" name="Title 1">
             <a:extLst>
               <a:ext uri="{FF2B5EF4-FFF2-40B4-BE49-F238E27FC236}">
-                <a16:creationId xmlns:a16="http://schemas.microsoft.com/office/drawing/2014/main" id="{7ADB2A6B-7CBD-431A-BBEA-49353E7575F7}"/>
+                <a16:creationId xmlns:a16="http://schemas.microsoft.com/office/drawing/2014/main" id="{A1AF49BA-BF02-4494-B95D-7C5DE90AF10B}"/>
               </a:ext>
             </a:extLst>
           </p:cNvPr>
@@ -4271,9 +4237,10 @@
           <a:lstStyle/>
           <a:p>
             <a:r>
-              <a:rPr lang="en-US" dirty="0"/>
-              <a:t>Important recursive algorithms</a:t>
-            </a:r>
+              <a:rPr lang="en-US" dirty="0" err="1"/>
+              <a:t>CountX</a:t>
+            </a:r>
+            <a:endParaRPr lang="en-US" dirty="0"/>
           </a:p>
         </p:txBody>
       </p:sp>
@@ -4282,7 +4249,7 @@
           <p:cNvPr id="3" name="Content Placeholder 2">
             <a:extLst>
               <a:ext uri="{FF2B5EF4-FFF2-40B4-BE49-F238E27FC236}">
-                <a16:creationId xmlns:a16="http://schemas.microsoft.com/office/drawing/2014/main" id="{1CDEA2DF-A2F3-4477-B2E4-368488D80AC8}"/>
+                <a16:creationId xmlns:a16="http://schemas.microsoft.com/office/drawing/2014/main" id="{2476E292-B848-450E-B23C-E4FF34288291}"/>
               </a:ext>
             </a:extLst>
           </p:cNvPr>
@@ -4298,21 +4265,50 @@
           <a:bodyPr/>
           <a:lstStyle/>
           <a:p>
-            <a:r>
-              <a:rPr lang="en-US" dirty="0"/>
-              <a:t>Generate permutations</a:t>
-            </a:r>
-          </a:p>
-          <a:p>
-            <a:r>
-              <a:rPr lang="en-US" dirty="0"/>
-              <a:t>Generate subsets</a:t>
-            </a:r>
-          </a:p>
-          <a:p>
-            <a:r>
-              <a:rPr lang="en-US" dirty="0"/>
-              <a:t>Generate combinations</a:t>
+            <a:pPr marL="0" indent="0">
+              <a:buNone/>
+            </a:pPr>
+            <a:r>
+              <a:rPr lang="en-US" dirty="0" err="1"/>
+              <a:t>countX</a:t>
+            </a:r>
+            <a:r>
+              <a:rPr lang="en-US" dirty="0"/>
+              <a:t>(s) =	Base Case(s):0 	if s is empty</a:t>
+            </a:r>
+          </a:p>
+          <a:p>
+            <a:pPr marL="0" indent="0">
+              <a:buNone/>
+            </a:pPr>
+            <a:r>
+              <a:rPr lang="en-US" dirty="0"/>
+              <a:t>	Recursive Cases(s): 1 + </a:t>
+            </a:r>
+            <a:r>
+              <a:rPr lang="en-US" dirty="0" err="1"/>
+              <a:t>countX</a:t>
+            </a:r>
+            <a:r>
+              <a:rPr lang="en-US" dirty="0"/>
+              <a:t>(s - 1st char) 	if first char is ‘x’</a:t>
+            </a:r>
+          </a:p>
+          <a:p>
+            <a:pPr marL="0" indent="0">
+              <a:buNone/>
+            </a:pPr>
+            <a:r>
+              <a:rPr lang="en-US" dirty="0"/>
+              <a:t>				    </a:t>
+            </a:r>
+            <a:r>
+              <a:rPr lang="en-US" dirty="0" err="1"/>
+              <a:t>countX</a:t>
+            </a:r>
+            <a:r>
+              <a:rPr lang="en-US" dirty="0"/>
+              <a:t>(s - 1st char) if first char is not ‘x’ </a:t>
             </a:r>
           </a:p>
           <a:p>
@@ -4320,13 +4316,28 @@
           </a:p>
           <a:p>
             <a:endParaRPr lang="en-US" dirty="0"/>
+          </a:p>
+          <a:p>
+            <a:endParaRPr lang="en-US" dirty="0"/>
+          </a:p>
+          <a:p>
+            <a:r>
+              <a:rPr lang="en-US" dirty="0"/>
+              <a:t>Theater time</a:t>
+            </a:r>
+          </a:p>
+          <a:p>
+            <a:r>
+              <a:rPr lang="en-US" dirty="0"/>
+              <a:t>Code time</a:t>
+            </a:r>
           </a:p>
         </p:txBody>
       </p:sp>
     </p:spTree>
     <p:extLst>
       <p:ext uri="{BB962C8B-B14F-4D97-AF65-F5344CB8AC3E}">
-        <p14:creationId xmlns:p14="http://schemas.microsoft.com/office/powerpoint/2010/main" val="3158292533"/>
+        <p14:creationId xmlns:p14="http://schemas.microsoft.com/office/powerpoint/2010/main" val="45859203"/>
       </p:ext>
     </p:extLst>
   </p:cSld>
@@ -4358,7 +4369,7 @@
           <p:cNvPr id="2" name="Title 1">
             <a:extLst>
               <a:ext uri="{FF2B5EF4-FFF2-40B4-BE49-F238E27FC236}">
-                <a16:creationId xmlns:a16="http://schemas.microsoft.com/office/drawing/2014/main" id="{68C67571-74E9-4907-AF31-2AA9FFA8A586}"/>
+                <a16:creationId xmlns:a16="http://schemas.microsoft.com/office/drawing/2014/main" id="{7ADB2A6B-7CBD-431A-BBEA-49353E7575F7}"/>
               </a:ext>
             </a:extLst>
           </p:cNvPr>
@@ -4376,7 +4387,7 @@
           <a:p>
             <a:r>
               <a:rPr lang="en-US" dirty="0"/>
-              <a:t>Permutations</a:t>
+              <a:t>Important recursive algorithms</a:t>
             </a:r>
           </a:p>
         </p:txBody>
@@ -4386,7 +4397,7 @@
           <p:cNvPr id="3" name="Content Placeholder 2">
             <a:extLst>
               <a:ext uri="{FF2B5EF4-FFF2-40B4-BE49-F238E27FC236}">
-                <a16:creationId xmlns:a16="http://schemas.microsoft.com/office/drawing/2014/main" id="{84F37005-7360-486B-97D3-B40B3EB9D02A}"/>
+                <a16:creationId xmlns:a16="http://schemas.microsoft.com/office/drawing/2014/main" id="{1CDEA2DF-A2F3-4477-B2E4-368488D80AC8}"/>
               </a:ext>
             </a:extLst>
           </p:cNvPr>
@@ -4402,30 +4413,21 @@
           <a:bodyPr/>
           <a:lstStyle/>
           <a:p>
-            <a:pPr marL="0" indent="0">
-              <a:buNone/>
-            </a:pPr>
-            <a:r>
-              <a:rPr lang="en-US" dirty="0"/>
-              <a:t>Base Case(s): {””} if s is empty</a:t>
-            </a:r>
-          </a:p>
-          <a:p>
-            <a:pPr marL="0" indent="0">
-              <a:buNone/>
-            </a:pPr>
-            <a:r>
-              <a:rPr lang="en-US" dirty="0"/>
-              <a:t>Recursive Case(s):	for each char c in s</a:t>
-            </a:r>
-          </a:p>
-          <a:p>
-            <a:pPr marL="0" indent="0">
-              <a:buNone/>
-            </a:pPr>
-            <a:r>
-              <a:rPr lang="en-US" dirty="0"/>
-              <a:t>			     Add c prepended to permute(s-c)</a:t>
+            <a:r>
+              <a:rPr lang="en-US" dirty="0"/>
+              <a:t>Generate permutations</a:t>
+            </a:r>
+          </a:p>
+          <a:p>
+            <a:r>
+              <a:rPr lang="en-US" dirty="0"/>
+              <a:t>Generate subsets</a:t>
+            </a:r>
+          </a:p>
+          <a:p>
+            <a:r>
+              <a:rPr lang="en-US" dirty="0"/>
+              <a:t>Generate combinations</a:t>
             </a:r>
           </a:p>
           <a:p>
@@ -4439,7 +4441,7 @@
     </p:spTree>
     <p:extLst>
       <p:ext uri="{BB962C8B-B14F-4D97-AF65-F5344CB8AC3E}">
-        <p14:creationId xmlns:p14="http://schemas.microsoft.com/office/powerpoint/2010/main" val="2079353975"/>
+        <p14:creationId xmlns:p14="http://schemas.microsoft.com/office/powerpoint/2010/main" val="3158292533"/>
       </p:ext>
     </p:extLst>
   </p:cSld>
@@ -4471,7 +4473,7 @@
           <p:cNvPr id="2" name="Title 1">
             <a:extLst>
               <a:ext uri="{FF2B5EF4-FFF2-40B4-BE49-F238E27FC236}">
-                <a16:creationId xmlns:a16="http://schemas.microsoft.com/office/drawing/2014/main" id="{1BA994E3-20B0-49CF-84E5-575410F11713}"/>
+                <a16:creationId xmlns:a16="http://schemas.microsoft.com/office/drawing/2014/main" id="{68C67571-74E9-4907-AF31-2AA9FFA8A586}"/>
               </a:ext>
             </a:extLst>
           </p:cNvPr>
@@ -4488,42 +4490,71 @@
           <a:lstStyle/>
           <a:p>
             <a:r>
-              <a:rPr lang="en-US" dirty="0" err="1"/>
-              <a:t>Identicons</a:t>
-            </a:r>
+              <a:rPr lang="en-US" dirty="0"/>
+              <a:t>Permutations</a:t>
+            </a:r>
+          </a:p>
+        </p:txBody>
+      </p:sp>
+      <p:sp>
+        <p:nvSpPr>
+          <p:cNvPr id="3" name="Content Placeholder 2">
+            <a:extLst>
+              <a:ext uri="{FF2B5EF4-FFF2-40B4-BE49-F238E27FC236}">
+                <a16:creationId xmlns:a16="http://schemas.microsoft.com/office/drawing/2014/main" id="{84F37005-7360-486B-97D3-B40B3EB9D02A}"/>
+              </a:ext>
+            </a:extLst>
+          </p:cNvPr>
+          <p:cNvSpPr>
+            <a:spLocks noGrp="1"/>
+          </p:cNvSpPr>
+          <p:nvPr>
+            <p:ph idx="1"/>
+          </p:nvPr>
+        </p:nvSpPr>
+        <p:spPr/>
+        <p:txBody>
+          <a:bodyPr/>
+          <a:lstStyle/>
+          <a:p>
+            <a:pPr marL="0" indent="0">
+              <a:buNone/>
+            </a:pPr>
+            <a:r>
+              <a:rPr lang="en-US" dirty="0"/>
+              <a:t>Base Case(s): {””} if s is empty</a:t>
+            </a:r>
+          </a:p>
+          <a:p>
+            <a:pPr marL="0" indent="0">
+              <a:buNone/>
+            </a:pPr>
+            <a:r>
+              <a:rPr lang="en-US" dirty="0"/>
+              <a:t>Recursive Case(s):	for each char c in s</a:t>
+            </a:r>
+          </a:p>
+          <a:p>
+            <a:pPr marL="0" indent="0">
+              <a:buNone/>
+            </a:pPr>
+            <a:r>
+              <a:rPr lang="en-US" dirty="0"/>
+              <a:t>			     Add c prepended to permute(s-c)</a:t>
+            </a:r>
+          </a:p>
+          <a:p>
             <a:endParaRPr lang="en-US" dirty="0"/>
           </a:p>
-        </p:txBody>
-      </p:sp>
-      <p:sp>
-        <p:nvSpPr>
-          <p:cNvPr id="3" name="Content Placeholder 2">
-            <a:extLst>
-              <a:ext uri="{FF2B5EF4-FFF2-40B4-BE49-F238E27FC236}">
-                <a16:creationId xmlns:a16="http://schemas.microsoft.com/office/drawing/2014/main" id="{81437E11-398A-42AB-8ED7-4F85F8FDEFF2}"/>
-              </a:ext>
-            </a:extLst>
-          </p:cNvPr>
-          <p:cNvSpPr>
-            <a:spLocks noGrp="1"/>
-          </p:cNvSpPr>
-          <p:nvPr>
-            <p:ph idx="1"/>
-          </p:nvPr>
-        </p:nvSpPr>
-        <p:spPr/>
-        <p:txBody>
-          <a:bodyPr/>
-          <a:lstStyle/>
-          <a:p>
-            <a:endParaRPr lang="en-US"/>
+          <a:p>
+            <a:endParaRPr lang="en-US" dirty="0"/>
           </a:p>
         </p:txBody>
       </p:sp>
     </p:spTree>
     <p:extLst>
       <p:ext uri="{BB962C8B-B14F-4D97-AF65-F5344CB8AC3E}">
-        <p14:creationId xmlns:p14="http://schemas.microsoft.com/office/powerpoint/2010/main" val="1484689044"/>
+        <p14:creationId xmlns:p14="http://schemas.microsoft.com/office/powerpoint/2010/main" val="2079353975"/>
       </p:ext>
     </p:extLst>
   </p:cSld>
@@ -4555,7 +4586,7 @@
           <p:cNvPr id="2" name="Title 1">
             <a:extLst>
               <a:ext uri="{FF2B5EF4-FFF2-40B4-BE49-F238E27FC236}">
-                <a16:creationId xmlns:a16="http://schemas.microsoft.com/office/drawing/2014/main" id="{4C0F0E57-E070-45EF-B1F8-6DB332229DA1}"/>
+                <a16:creationId xmlns:a16="http://schemas.microsoft.com/office/drawing/2014/main" id="{1BA994E3-20B0-49CF-84E5-575410F11713}"/>
               </a:ext>
             </a:extLst>
           </p:cNvPr>
@@ -4572,9 +4603,10 @@
           <a:lstStyle/>
           <a:p>
             <a:r>
-              <a:rPr lang="en-US" dirty="0"/>
-              <a:t>Subsets</a:t>
-            </a:r>
+              <a:rPr lang="en-US" dirty="0" err="1"/>
+              <a:t>Identicons</a:t>
+            </a:r>
+            <a:endParaRPr lang="en-US" dirty="0"/>
           </a:p>
         </p:txBody>
       </p:sp>
@@ -4583,7 +4615,7 @@
           <p:cNvPr id="3" name="Content Placeholder 2">
             <a:extLst>
               <a:ext uri="{FF2B5EF4-FFF2-40B4-BE49-F238E27FC236}">
-                <a16:creationId xmlns:a16="http://schemas.microsoft.com/office/drawing/2014/main" id="{219EDF09-02C8-40BB-9A61-85E28D12D1CE}"/>
+                <a16:creationId xmlns:a16="http://schemas.microsoft.com/office/drawing/2014/main" id="{81437E11-398A-42AB-8ED7-4F85F8FDEFF2}"/>
               </a:ext>
             </a:extLst>
           </p:cNvPr>
@@ -4596,76 +4628,17 @@
         </p:nvSpPr>
         <p:spPr/>
         <p:txBody>
-          <a:bodyPr>
-            <a:normAutofit/>
-          </a:bodyPr>
-          <a:lstStyle/>
-          <a:p>
-            <a:pPr marL="0" indent="0">
-              <a:buNone/>
-            </a:pPr>
-            <a:r>
-              <a:rPr lang="en-US" dirty="0"/>
-              <a:t>Base Case(s): if rest is empty-&gt; {prefix}</a:t>
-            </a:r>
-          </a:p>
-          <a:p>
-            <a:pPr marL="0" indent="0">
-              <a:buNone/>
-            </a:pPr>
-            <a:r>
-              <a:rPr lang="en-US" dirty="0"/>
-              <a:t>Recursive Case(s):	Move first char of rest into prefix.</a:t>
-            </a:r>
-          </a:p>
-          <a:p>
-            <a:pPr marL="0" indent="0">
-              <a:buNone/>
-            </a:pPr>
-            <a:r>
-              <a:rPr lang="en-US" dirty="0"/>
-              <a:t>			Add all subsets of rest prefixed by prefix.</a:t>
-            </a:r>
-          </a:p>
-          <a:p>
-            <a:pPr marL="0" indent="0">
-              <a:buNone/>
-            </a:pPr>
-            <a:r>
-              <a:rPr lang="en-US" dirty="0"/>
-              <a:t>AND</a:t>
-            </a:r>
-          </a:p>
-          <a:p>
-            <a:pPr marL="0" indent="0">
-              <a:buNone/>
-            </a:pPr>
-            <a:r>
-              <a:rPr lang="en-US" dirty="0"/>
-              <a:t>			Remove first char of rest.</a:t>
-            </a:r>
-          </a:p>
-          <a:p>
-            <a:pPr marL="0" indent="0">
-              <a:buNone/>
-            </a:pPr>
-            <a:r>
-              <a:rPr lang="en-US" dirty="0"/>
-              <a:t>			Add a subsets of rest prefixed by prefix.</a:t>
-            </a:r>
-          </a:p>
-          <a:p>
-            <a:pPr marL="0" indent="0">
-              <a:buNone/>
-            </a:pPr>
-            <a:endParaRPr lang="en-US" dirty="0"/>
+          <a:bodyPr/>
+          <a:lstStyle/>
+          <a:p>
+            <a:endParaRPr lang="en-US"/>
           </a:p>
         </p:txBody>
       </p:sp>
     </p:spTree>
     <p:extLst>
       <p:ext uri="{BB962C8B-B14F-4D97-AF65-F5344CB8AC3E}">
-        <p14:creationId xmlns:p14="http://schemas.microsoft.com/office/powerpoint/2010/main" val="4125527948"/>
+        <p14:creationId xmlns:p14="http://schemas.microsoft.com/office/powerpoint/2010/main" val="1484689044"/>
       </p:ext>
     </p:extLst>
   </p:cSld>
@@ -4774,7 +4747,7 @@
           <p:cNvPr id="2" name="Title 1">
             <a:extLst>
               <a:ext uri="{FF2B5EF4-FFF2-40B4-BE49-F238E27FC236}">
-                <a16:creationId xmlns:a16="http://schemas.microsoft.com/office/drawing/2014/main" id="{E9EBC2A2-5223-4E7B-A28A-9104170F91E8}"/>
+                <a16:creationId xmlns:a16="http://schemas.microsoft.com/office/drawing/2014/main" id="{4C0F0E57-E070-45EF-B1F8-6DB332229DA1}"/>
               </a:ext>
             </a:extLst>
           </p:cNvPr>
@@ -4792,7 +4765,7 @@
           <a:p>
             <a:r>
               <a:rPr lang="en-US" dirty="0"/>
-              <a:t>Combinations</a:t>
+              <a:t>Subsets</a:t>
             </a:r>
           </a:p>
         </p:txBody>
@@ -4802,7 +4775,7 @@
           <p:cNvPr id="3" name="Content Placeholder 2">
             <a:extLst>
               <a:ext uri="{FF2B5EF4-FFF2-40B4-BE49-F238E27FC236}">
-                <a16:creationId xmlns:a16="http://schemas.microsoft.com/office/drawing/2014/main" id="{3D99E6A9-E8D6-46AE-A893-034B09E91BFE}"/>
+                <a16:creationId xmlns:a16="http://schemas.microsoft.com/office/drawing/2014/main" id="{219EDF09-02C8-40BB-9A61-85E28D12D1CE}"/>
               </a:ext>
             </a:extLst>
           </p:cNvPr>
@@ -4815,17 +4788,76 @@
         </p:nvSpPr>
         <p:spPr/>
         <p:txBody>
-          <a:bodyPr/>
-          <a:lstStyle/>
-          <a:p>
-            <a:endParaRPr lang="en-US"/>
+          <a:bodyPr>
+            <a:normAutofit/>
+          </a:bodyPr>
+          <a:lstStyle/>
+          <a:p>
+            <a:pPr marL="0" indent="0">
+              <a:buNone/>
+            </a:pPr>
+            <a:r>
+              <a:rPr lang="en-US" dirty="0"/>
+              <a:t>Base Case(s): if rest is empty-&gt; {prefix}</a:t>
+            </a:r>
+          </a:p>
+          <a:p>
+            <a:pPr marL="0" indent="0">
+              <a:buNone/>
+            </a:pPr>
+            <a:r>
+              <a:rPr lang="en-US" dirty="0"/>
+              <a:t>Recursive Case(s):	Move first char of rest into prefix.</a:t>
+            </a:r>
+          </a:p>
+          <a:p>
+            <a:pPr marL="0" indent="0">
+              <a:buNone/>
+            </a:pPr>
+            <a:r>
+              <a:rPr lang="en-US" dirty="0"/>
+              <a:t>			Add all subsets of rest prefixed by prefix.</a:t>
+            </a:r>
+          </a:p>
+          <a:p>
+            <a:pPr marL="0" indent="0">
+              <a:buNone/>
+            </a:pPr>
+            <a:r>
+              <a:rPr lang="en-US" dirty="0"/>
+              <a:t>AND</a:t>
+            </a:r>
+          </a:p>
+          <a:p>
+            <a:pPr marL="0" indent="0">
+              <a:buNone/>
+            </a:pPr>
+            <a:r>
+              <a:rPr lang="en-US" dirty="0"/>
+              <a:t>			Remove first char of rest.</a:t>
+            </a:r>
+          </a:p>
+          <a:p>
+            <a:pPr marL="0" indent="0">
+              <a:buNone/>
+            </a:pPr>
+            <a:r>
+              <a:rPr lang="en-US" dirty="0"/>
+              <a:t>			Add a subsets of rest prefixed by prefix.</a:t>
+            </a:r>
+          </a:p>
+          <a:p>
+            <a:pPr marL="0" indent="0">
+              <a:buNone/>
+            </a:pPr>
+            <a:endParaRPr lang="en-US" dirty="0"/>
           </a:p>
         </p:txBody>
       </p:sp>
     </p:spTree>
     <p:extLst>
       <p:ext uri="{BB962C8B-B14F-4D97-AF65-F5344CB8AC3E}">
-        <p14:creationId xmlns:p14="http://schemas.microsoft.com/office/powerpoint/2010/main" val="41245227"/>
+        <p14:creationId xmlns:p14="http://schemas.microsoft.com/office/powerpoint/2010/main" val="4125527948"/>
       </p:ext>
     </p:extLst>
   </p:cSld>
@@ -4857,7 +4889,7 @@
           <p:cNvPr id="2" name="Title 1">
             <a:extLst>
               <a:ext uri="{FF2B5EF4-FFF2-40B4-BE49-F238E27FC236}">
-                <a16:creationId xmlns:a16="http://schemas.microsoft.com/office/drawing/2014/main" id="{2718247E-E51B-4AEC-927B-8B7916F42968}"/>
+                <a16:creationId xmlns:a16="http://schemas.microsoft.com/office/drawing/2014/main" id="{E9EBC2A2-5223-4E7B-A28A-9104170F91E8}"/>
               </a:ext>
             </a:extLst>
           </p:cNvPr>
@@ -4875,7 +4907,7 @@
           <a:p>
             <a:r>
               <a:rPr lang="en-US" dirty="0"/>
-              <a:t>Recursive backtracking</a:t>
+              <a:t>Combinations</a:t>
             </a:r>
           </a:p>
         </p:txBody>
@@ -4885,7 +4917,7 @@
           <p:cNvPr id="3" name="Content Placeholder 2">
             <a:extLst>
               <a:ext uri="{FF2B5EF4-FFF2-40B4-BE49-F238E27FC236}">
-                <a16:creationId xmlns:a16="http://schemas.microsoft.com/office/drawing/2014/main" id="{D75858E6-EE6B-4ADF-86CD-F85F59D29711}"/>
+                <a16:creationId xmlns:a16="http://schemas.microsoft.com/office/drawing/2014/main" id="{3D99E6A9-E8D6-46AE-A893-034B09E91BFE}"/>
               </a:ext>
             </a:extLst>
           </p:cNvPr>
@@ -4901,17 +4933,14 @@
           <a:bodyPr/>
           <a:lstStyle/>
           <a:p>
-            <a:r>
-              <a:rPr lang="en-US" dirty="0"/>
-              <a:t>Maze solving</a:t>
-            </a:r>
+            <a:endParaRPr lang="en-US"/>
           </a:p>
         </p:txBody>
       </p:sp>
     </p:spTree>
     <p:extLst>
       <p:ext uri="{BB962C8B-B14F-4D97-AF65-F5344CB8AC3E}">
-        <p14:creationId xmlns:p14="http://schemas.microsoft.com/office/powerpoint/2010/main" val="318988732"/>
+        <p14:creationId xmlns:p14="http://schemas.microsoft.com/office/powerpoint/2010/main" val="41245227"/>
       </p:ext>
     </p:extLst>
   </p:cSld>
@@ -4943,6 +4972,92 @@
           <p:cNvPr id="2" name="Title 1">
             <a:extLst>
               <a:ext uri="{FF2B5EF4-FFF2-40B4-BE49-F238E27FC236}">
+                <a16:creationId xmlns:a16="http://schemas.microsoft.com/office/drawing/2014/main" id="{2718247E-E51B-4AEC-927B-8B7916F42968}"/>
+              </a:ext>
+            </a:extLst>
+          </p:cNvPr>
+          <p:cNvSpPr>
+            <a:spLocks noGrp="1"/>
+          </p:cNvSpPr>
+          <p:nvPr>
+            <p:ph type="title"/>
+          </p:nvPr>
+        </p:nvSpPr>
+        <p:spPr/>
+        <p:txBody>
+          <a:bodyPr/>
+          <a:lstStyle/>
+          <a:p>
+            <a:r>
+              <a:rPr lang="en-US" dirty="0"/>
+              <a:t>Recursive backtracking</a:t>
+            </a:r>
+          </a:p>
+        </p:txBody>
+      </p:sp>
+      <p:sp>
+        <p:nvSpPr>
+          <p:cNvPr id="3" name="Content Placeholder 2">
+            <a:extLst>
+              <a:ext uri="{FF2B5EF4-FFF2-40B4-BE49-F238E27FC236}">
+                <a16:creationId xmlns:a16="http://schemas.microsoft.com/office/drawing/2014/main" id="{D75858E6-EE6B-4ADF-86CD-F85F59D29711}"/>
+              </a:ext>
+            </a:extLst>
+          </p:cNvPr>
+          <p:cNvSpPr>
+            <a:spLocks noGrp="1"/>
+          </p:cNvSpPr>
+          <p:nvPr>
+            <p:ph idx="1"/>
+          </p:nvPr>
+        </p:nvSpPr>
+        <p:spPr/>
+        <p:txBody>
+          <a:bodyPr/>
+          <a:lstStyle/>
+          <a:p>
+            <a:r>
+              <a:rPr lang="en-US" dirty="0"/>
+              <a:t>Maze solving</a:t>
+            </a:r>
+          </a:p>
+        </p:txBody>
+      </p:sp>
+    </p:spTree>
+    <p:extLst>
+      <p:ext uri="{BB962C8B-B14F-4D97-AF65-F5344CB8AC3E}">
+        <p14:creationId xmlns:p14="http://schemas.microsoft.com/office/powerpoint/2010/main" val="318988732"/>
+      </p:ext>
+    </p:extLst>
+  </p:cSld>
+  <p:clrMapOvr>
+    <a:masterClrMapping/>
+  </p:clrMapOvr>
+</p:sld>
+</file>
+
+<file path=ppt/slides/slide23.xml><?xml version="1.0" encoding="utf-8"?>
+<p:sld xmlns:a="http://schemas.openxmlformats.org/drawingml/2006/main" xmlns:r="http://schemas.openxmlformats.org/officeDocument/2006/relationships" xmlns:p="http://schemas.openxmlformats.org/presentationml/2006/main">
+  <p:cSld>
+    <p:spTree>
+      <p:nvGrpSpPr>
+        <p:cNvPr id="1" name=""/>
+        <p:cNvGrpSpPr/>
+        <p:nvPr/>
+      </p:nvGrpSpPr>
+      <p:grpSpPr>
+        <a:xfrm>
+          <a:off x="0" y="0"/>
+          <a:ext cx="0" cy="0"/>
+          <a:chOff x="0" y="0"/>
+          <a:chExt cx="0" cy="0"/>
+        </a:xfrm>
+      </p:grpSpPr>
+      <p:sp>
+        <p:nvSpPr>
+          <p:cNvPr id="2" name="Title 1">
+            <a:extLst>
+              <a:ext uri="{FF2B5EF4-FFF2-40B4-BE49-F238E27FC236}">
                 <a16:creationId xmlns:a16="http://schemas.microsoft.com/office/drawing/2014/main" id="{E955ACA9-9B3B-498B-A523-078AD701DBDB}"/>
               </a:ext>
             </a:extLst>
@@ -5093,7 +5208,7 @@
 </p:sld>
 </file>
 
-<file path=ppt/slides/slide23.xml><?xml version="1.0" encoding="utf-8"?>
+<file path=ppt/slides/slide24.xml><?xml version="1.0" encoding="utf-8"?>
 <p:sld xmlns:a="http://schemas.openxmlformats.org/drawingml/2006/main" xmlns:r="http://schemas.openxmlformats.org/officeDocument/2006/relationships" xmlns:p="http://schemas.openxmlformats.org/presentationml/2006/main">
   <p:cSld>
     <p:spTree>

</xml_diff>

<commit_message>
updated notes for lab day
</commit_message>
<xml_diff>
--- a/notes.pptx
+++ b/notes.pptx
@@ -35,6 +35,7 @@
     <p:sldId id="283" r:id="rId29"/>
     <p:sldId id="284" r:id="rId30"/>
     <p:sldId id="285" r:id="rId31"/>
+    <p:sldId id="287" r:id="rId32"/>
   </p:sldIdLst>
   <p:sldSz cx="12192000" cy="6858000"/>
   <p:notesSz cx="6858000" cy="9144000"/>
@@ -288,7 +289,7 @@
           <a:p>
             <a:fld id="{DE176E02-7D44-4713-8078-8E0963CF8DDB}" type="datetimeFigureOut">
               <a:rPr lang="en-US" smtClean="0"/>
-              <a:t>9/9/19</a:t>
+              <a:t>9/11/2019</a:t>
             </a:fld>
             <a:endParaRPr lang="en-US"/>
           </a:p>
@@ -486,7 +487,7 @@
           <a:p>
             <a:fld id="{DE176E02-7D44-4713-8078-8E0963CF8DDB}" type="datetimeFigureOut">
               <a:rPr lang="en-US" smtClean="0"/>
-              <a:t>9/9/19</a:t>
+              <a:t>9/11/2019</a:t>
             </a:fld>
             <a:endParaRPr lang="en-US"/>
           </a:p>
@@ -694,7 +695,7 @@
           <a:p>
             <a:fld id="{DE176E02-7D44-4713-8078-8E0963CF8DDB}" type="datetimeFigureOut">
               <a:rPr lang="en-US" smtClean="0"/>
-              <a:t>9/9/19</a:t>
+              <a:t>9/11/2019</a:t>
             </a:fld>
             <a:endParaRPr lang="en-US"/>
           </a:p>
@@ -892,7 +893,7 @@
           <a:p>
             <a:fld id="{DE176E02-7D44-4713-8078-8E0963CF8DDB}" type="datetimeFigureOut">
               <a:rPr lang="en-US" smtClean="0"/>
-              <a:t>9/9/19</a:t>
+              <a:t>9/11/2019</a:t>
             </a:fld>
             <a:endParaRPr lang="en-US"/>
           </a:p>
@@ -1167,7 +1168,7 @@
           <a:p>
             <a:fld id="{DE176E02-7D44-4713-8078-8E0963CF8DDB}" type="datetimeFigureOut">
               <a:rPr lang="en-US" smtClean="0"/>
-              <a:t>9/9/19</a:t>
+              <a:t>9/11/2019</a:t>
             </a:fld>
             <a:endParaRPr lang="en-US"/>
           </a:p>
@@ -1432,7 +1433,7 @@
           <a:p>
             <a:fld id="{DE176E02-7D44-4713-8078-8E0963CF8DDB}" type="datetimeFigureOut">
               <a:rPr lang="en-US" smtClean="0"/>
-              <a:t>9/9/19</a:t>
+              <a:t>9/11/2019</a:t>
             </a:fld>
             <a:endParaRPr lang="en-US"/>
           </a:p>
@@ -1844,7 +1845,7 @@
           <a:p>
             <a:fld id="{DE176E02-7D44-4713-8078-8E0963CF8DDB}" type="datetimeFigureOut">
               <a:rPr lang="en-US" smtClean="0"/>
-              <a:t>9/9/19</a:t>
+              <a:t>9/11/2019</a:t>
             </a:fld>
             <a:endParaRPr lang="en-US"/>
           </a:p>
@@ -1985,7 +1986,7 @@
           <a:p>
             <a:fld id="{DE176E02-7D44-4713-8078-8E0963CF8DDB}" type="datetimeFigureOut">
               <a:rPr lang="en-US" smtClean="0"/>
-              <a:t>9/9/19</a:t>
+              <a:t>9/11/2019</a:t>
             </a:fld>
             <a:endParaRPr lang="en-US"/>
           </a:p>
@@ -2098,7 +2099,7 @@
           <a:p>
             <a:fld id="{DE176E02-7D44-4713-8078-8E0963CF8DDB}" type="datetimeFigureOut">
               <a:rPr lang="en-US" smtClean="0"/>
-              <a:t>9/9/19</a:t>
+              <a:t>9/11/2019</a:t>
             </a:fld>
             <a:endParaRPr lang="en-US"/>
           </a:p>
@@ -2409,7 +2410,7 @@
           <a:p>
             <a:fld id="{DE176E02-7D44-4713-8078-8E0963CF8DDB}" type="datetimeFigureOut">
               <a:rPr lang="en-US" smtClean="0"/>
-              <a:t>9/9/19</a:t>
+              <a:t>9/11/2019</a:t>
             </a:fld>
             <a:endParaRPr lang="en-US"/>
           </a:p>
@@ -2697,7 +2698,7 @@
           <a:p>
             <a:fld id="{DE176E02-7D44-4713-8078-8E0963CF8DDB}" type="datetimeFigureOut">
               <a:rPr lang="en-US" smtClean="0"/>
-              <a:t>9/9/19</a:t>
+              <a:t>9/11/2019</a:t>
             </a:fld>
             <a:endParaRPr lang="en-US"/>
           </a:p>
@@ -2938,7 +2939,7 @@
           <a:p>
             <a:fld id="{DE176E02-7D44-4713-8078-8E0963CF8DDB}" type="datetimeFigureOut">
               <a:rPr lang="en-US" smtClean="0"/>
-              <a:t>9/9/19</a:t>
+              <a:t>9/11/2019</a:t>
             </a:fld>
             <a:endParaRPr lang="en-US"/>
           </a:p>
@@ -6019,6 +6020,178 @@
 </p:sld>
 </file>
 
+<file path=ppt/slides/slide31.xml><?xml version="1.0" encoding="utf-8"?>
+<p:sld xmlns:a="http://schemas.openxmlformats.org/drawingml/2006/main" xmlns:r="http://schemas.openxmlformats.org/officeDocument/2006/relationships" xmlns:p="http://schemas.openxmlformats.org/presentationml/2006/main">
+  <p:cSld>
+    <p:spTree>
+      <p:nvGrpSpPr>
+        <p:cNvPr id="1" name=""/>
+        <p:cNvGrpSpPr/>
+        <p:nvPr/>
+      </p:nvGrpSpPr>
+      <p:grpSpPr>
+        <a:xfrm>
+          <a:off x="0" y="0"/>
+          <a:ext cx="0" cy="0"/>
+          <a:chOff x="0" y="0"/>
+          <a:chExt cx="0" cy="0"/>
+        </a:xfrm>
+      </p:grpSpPr>
+      <p:sp>
+        <p:nvSpPr>
+          <p:cNvPr id="2" name="Title 1">
+            <a:extLst>
+              <a:ext uri="{FF2B5EF4-FFF2-40B4-BE49-F238E27FC236}">
+                <a16:creationId xmlns:a16="http://schemas.microsoft.com/office/drawing/2014/main" id="{95A2E308-98F7-4B42-BCB1-1FBE13BD6D8E}"/>
+              </a:ext>
+            </a:extLst>
+          </p:cNvPr>
+          <p:cNvSpPr>
+            <a:spLocks noGrp="1"/>
+          </p:cNvSpPr>
+          <p:nvPr>
+            <p:ph type="title"/>
+          </p:nvPr>
+        </p:nvSpPr>
+        <p:spPr>
+          <a:xfrm>
+            <a:off x="838200" y="0"/>
+            <a:ext cx="10515600" cy="1325563"/>
+          </a:xfrm>
+        </p:spPr>
+        <p:txBody>
+          <a:bodyPr/>
+          <a:lstStyle/>
+          <a:p>
+            <a:r>
+              <a:rPr lang="en-US" dirty="0"/>
+              <a:t>Goals for today</a:t>
+            </a:r>
+          </a:p>
+        </p:txBody>
+      </p:sp>
+      <p:sp>
+        <p:nvSpPr>
+          <p:cNvPr id="3" name="Content Placeholder 2">
+            <a:extLst>
+              <a:ext uri="{FF2B5EF4-FFF2-40B4-BE49-F238E27FC236}">
+                <a16:creationId xmlns:a16="http://schemas.microsoft.com/office/drawing/2014/main" id="{412A0075-2F2C-492E-9895-1DA0CA0669EF}"/>
+              </a:ext>
+            </a:extLst>
+          </p:cNvPr>
+          <p:cNvSpPr>
+            <a:spLocks noGrp="1"/>
+          </p:cNvSpPr>
+          <p:nvPr>
+            <p:ph idx="1"/>
+          </p:nvPr>
+        </p:nvSpPr>
+        <p:spPr>
+          <a:xfrm>
+            <a:off x="838200" y="1009650"/>
+            <a:ext cx="10515600" cy="5167313"/>
+          </a:xfrm>
+        </p:spPr>
+        <p:txBody>
+          <a:bodyPr>
+            <a:normAutofit/>
+          </a:bodyPr>
+          <a:lstStyle/>
+          <a:p>
+            <a:r>
+              <a:rPr lang="en-US" dirty="0"/>
+              <a:t>Get the course repository on your machine and running in Eclipse.</a:t>
+            </a:r>
+          </a:p>
+          <a:p>
+            <a:r>
+              <a:rPr lang="en-US" dirty="0"/>
+              <a:t>Get your homework repository on your machine and running in Eclipse.</a:t>
+            </a:r>
+          </a:p>
+          <a:p>
+            <a:r>
+              <a:rPr lang="en-US" dirty="0"/>
+              <a:t>Make a text file for your written responses to homework 1 in your homework 1 folder.  </a:t>
+            </a:r>
+          </a:p>
+          <a:p>
+            <a:r>
+              <a:rPr lang="en-US" dirty="0"/>
+              <a:t>Get a </a:t>
+            </a:r>
+            <a:r>
+              <a:rPr lang="en-US" dirty="0" err="1"/>
+              <a:t>hackerrank</a:t>
+            </a:r>
+            <a:r>
+              <a:rPr lang="en-US" dirty="0"/>
+              <a:t> user name.</a:t>
+            </a:r>
+          </a:p>
+          <a:p>
+            <a:r>
+              <a:rPr lang="en-US" dirty="0"/>
+              <a:t>Submit your </a:t>
+            </a:r>
+            <a:r>
+              <a:rPr lang="en-US" dirty="0" err="1"/>
+              <a:t>hackerrank</a:t>
+            </a:r>
+            <a:r>
+              <a:rPr lang="en-US" dirty="0"/>
+              <a:t> username to </a:t>
+            </a:r>
+            <a:r>
+              <a:rPr lang="en-US" dirty="0" err="1"/>
+              <a:t>moodle</a:t>
+            </a:r>
+            <a:r>
+              <a:rPr lang="en-US" dirty="0"/>
+              <a:t>.  </a:t>
+            </a:r>
+          </a:p>
+          <a:p>
+            <a:r>
+              <a:rPr lang="en-US" dirty="0"/>
+              <a:t>Create a labs package in your homework repository in eclipse.</a:t>
+            </a:r>
+          </a:p>
+          <a:p>
+            <a:r>
+              <a:rPr lang="en-US" dirty="0"/>
+              <a:t>Do the “solve me first” problem in that folder, with test cases.  </a:t>
+            </a:r>
+          </a:p>
+          <a:p>
+            <a:r>
+              <a:rPr lang="en-US" dirty="0"/>
+              <a:t>Submit a solution to “solve me first” on </a:t>
+            </a:r>
+            <a:r>
+              <a:rPr lang="en-US" dirty="0" err="1"/>
+              <a:t>hackerrank</a:t>
+            </a:r>
+            <a:r>
+              <a:rPr lang="en-US" dirty="0"/>
+              <a:t>.  </a:t>
+            </a:r>
+          </a:p>
+        </p:txBody>
+      </p:sp>
+    </p:spTree>
+    <p:extLst>
+      <p:ext uri="{BB962C8B-B14F-4D97-AF65-F5344CB8AC3E}">
+        <p14:creationId xmlns:p14="http://schemas.microsoft.com/office/powerpoint/2010/main" val="2440214003"/>
+      </p:ext>
+    </p:extLst>
+  </p:cSld>
+  <p:clrMapOvr>
+    <a:masterClrMapping/>
+  </p:clrMapOvr>
+</p:sld>
+</file>
+
 <file path=ppt/slides/slide4.xml><?xml version="1.0" encoding="utf-8"?>
 <p:sld xmlns:a="http://schemas.openxmlformats.org/drawingml/2006/main" xmlns:r="http://schemas.openxmlformats.org/officeDocument/2006/relationships" xmlns:p="http://schemas.openxmlformats.org/presentationml/2006/main">
   <p:cSld>

</xml_diff>

<commit_message>
updated notes with more analysis
</commit_message>
<xml_diff>
--- a/notes.pptx
+++ b/notes.pptx
@@ -47,7 +47,15 @@
     <p:sldId id="291" r:id="rId41"/>
     <p:sldId id="293" r:id="rId42"/>
     <p:sldId id="292" r:id="rId43"/>
-    <p:sldId id="299" r:id="rId44"/>
+    <p:sldId id="306" r:id="rId44"/>
+    <p:sldId id="299" r:id="rId45"/>
+    <p:sldId id="301" r:id="rId46"/>
+    <p:sldId id="303" r:id="rId47"/>
+    <p:sldId id="307" r:id="rId48"/>
+    <p:sldId id="302" r:id="rId49"/>
+    <p:sldId id="308" r:id="rId50"/>
+    <p:sldId id="304" r:id="rId51"/>
+    <p:sldId id="309" r:id="rId52"/>
   </p:sldIdLst>
   <p:sldSz cx="12192000" cy="6858000"/>
   <p:notesSz cx="6858000" cy="9144000"/>
@@ -301,7 +309,7 @@
           <a:p>
             <a:fld id="{DE176E02-7D44-4713-8078-8E0963CF8DDB}" type="datetimeFigureOut">
               <a:rPr lang="en-US" smtClean="0"/>
-              <a:t>9/13/2019</a:t>
+              <a:t>9/16/2019</a:t>
             </a:fld>
             <a:endParaRPr lang="en-US"/>
           </a:p>
@@ -499,7 +507,7 @@
           <a:p>
             <a:fld id="{DE176E02-7D44-4713-8078-8E0963CF8DDB}" type="datetimeFigureOut">
               <a:rPr lang="en-US" smtClean="0"/>
-              <a:t>9/13/2019</a:t>
+              <a:t>9/16/2019</a:t>
             </a:fld>
             <a:endParaRPr lang="en-US"/>
           </a:p>
@@ -707,7 +715,7 @@
           <a:p>
             <a:fld id="{DE176E02-7D44-4713-8078-8E0963CF8DDB}" type="datetimeFigureOut">
               <a:rPr lang="en-US" smtClean="0"/>
-              <a:t>9/13/2019</a:t>
+              <a:t>9/16/2019</a:t>
             </a:fld>
             <a:endParaRPr lang="en-US"/>
           </a:p>
@@ -2385,7 +2393,7 @@
           <a:p>
             <a:fld id="{DE176E02-7D44-4713-8078-8E0963CF8DDB}" type="datetimeFigureOut">
               <a:rPr lang="en-US" smtClean="0"/>
-              <a:t>9/13/2019</a:t>
+              <a:t>9/16/2019</a:t>
             </a:fld>
             <a:endParaRPr lang="en-US"/>
           </a:p>
@@ -3064,7 +3072,7 @@
           <a:p>
             <a:fld id="{DE176E02-7D44-4713-8078-8E0963CF8DDB}" type="datetimeFigureOut">
               <a:rPr lang="en-US" smtClean="0"/>
-              <a:t>9/13/2019</a:t>
+              <a:t>9/16/2019</a:t>
             </a:fld>
             <a:endParaRPr lang="en-US"/>
           </a:p>
@@ -3329,7 +3337,7 @@
           <a:p>
             <a:fld id="{DE176E02-7D44-4713-8078-8E0963CF8DDB}" type="datetimeFigureOut">
               <a:rPr lang="en-US" smtClean="0"/>
-              <a:t>9/13/2019</a:t>
+              <a:t>9/16/2019</a:t>
             </a:fld>
             <a:endParaRPr lang="en-US"/>
           </a:p>
@@ -3741,7 +3749,7 @@
           <a:p>
             <a:fld id="{DE176E02-7D44-4713-8078-8E0963CF8DDB}" type="datetimeFigureOut">
               <a:rPr lang="en-US" smtClean="0"/>
-              <a:t>9/13/2019</a:t>
+              <a:t>9/16/2019</a:t>
             </a:fld>
             <a:endParaRPr lang="en-US"/>
           </a:p>
@@ -3882,7 +3890,7 @@
           <a:p>
             <a:fld id="{DE176E02-7D44-4713-8078-8E0963CF8DDB}" type="datetimeFigureOut">
               <a:rPr lang="en-US" smtClean="0"/>
-              <a:t>9/13/2019</a:t>
+              <a:t>9/16/2019</a:t>
             </a:fld>
             <a:endParaRPr lang="en-US"/>
           </a:p>
@@ -3995,7 +4003,7 @@
           <a:p>
             <a:fld id="{DE176E02-7D44-4713-8078-8E0963CF8DDB}" type="datetimeFigureOut">
               <a:rPr lang="en-US" smtClean="0"/>
-              <a:t>9/13/2019</a:t>
+              <a:t>9/16/2019</a:t>
             </a:fld>
             <a:endParaRPr lang="en-US"/>
           </a:p>
@@ -4306,7 +4314,7 @@
           <a:p>
             <a:fld id="{DE176E02-7D44-4713-8078-8E0963CF8DDB}" type="datetimeFigureOut">
               <a:rPr lang="en-US" smtClean="0"/>
-              <a:t>9/13/2019</a:t>
+              <a:t>9/16/2019</a:t>
             </a:fld>
             <a:endParaRPr lang="en-US"/>
           </a:p>
@@ -4594,7 +4602,7 @@
           <a:p>
             <a:fld id="{DE176E02-7D44-4713-8078-8E0963CF8DDB}" type="datetimeFigureOut">
               <a:rPr lang="en-US" smtClean="0"/>
-              <a:t>9/13/2019</a:t>
+              <a:t>9/16/2019</a:t>
             </a:fld>
             <a:endParaRPr lang="en-US"/>
           </a:p>
@@ -4835,7 +4843,7 @@
           <a:p>
             <a:fld id="{DE176E02-7D44-4713-8078-8E0963CF8DDB}" type="datetimeFigureOut">
               <a:rPr lang="en-US" smtClean="0"/>
-              <a:t>9/13/2019</a:t>
+              <a:t>9/16/2019</a:t>
             </a:fld>
             <a:endParaRPr lang="en-US"/>
           </a:p>
@@ -12387,8 +12395,8 @@
           </a:p>
         </p:txBody>
       </p:sp>
-      <mc:AlternateContent xmlns:mc="http://schemas.openxmlformats.org/markup-compatibility/2006">
-        <mc:Choice xmlns:a14="http://schemas.microsoft.com/office/drawing/2010/main" Requires="a14">
+      <mc:AlternateContent xmlns:mc="http://schemas.openxmlformats.org/markup-compatibility/2006" xmlns:a14="http://schemas.microsoft.com/office/drawing/2010/main">
+        <mc:Choice Requires="a14">
           <p:sp>
             <p:nvSpPr>
               <p:cNvPr id="3" name="Content Placeholder 2">
@@ -12938,7 +12946,7 @@
             </p:txBody>
           </p:sp>
         </mc:Choice>
-        <mc:Fallback>
+        <mc:Fallback xmlns="">
           <p:sp>
             <p:nvSpPr>
               <p:cNvPr id="3" name="Content Placeholder 2">
@@ -13337,6 +13345,158 @@
           <p:cNvPr id="2" name="Title 1">
             <a:extLst>
               <a:ext uri="{FF2B5EF4-FFF2-40B4-BE49-F238E27FC236}">
+                <a16:creationId xmlns:a16="http://schemas.microsoft.com/office/drawing/2014/main" id="{68635563-E2D4-4349-A584-74F819D57645}"/>
+              </a:ext>
+            </a:extLst>
+          </p:cNvPr>
+          <p:cNvSpPr>
+            <a:spLocks noGrp="1"/>
+          </p:cNvSpPr>
+          <p:nvPr>
+            <p:ph type="title"/>
+          </p:nvPr>
+        </p:nvSpPr>
+        <p:spPr>
+          <a:xfrm>
+            <a:off x="1016000" y="0"/>
+            <a:ext cx="10972800" cy="643855"/>
+          </a:xfrm>
+        </p:spPr>
+        <p:txBody>
+          <a:bodyPr/>
+          <a:lstStyle/>
+          <a:p>
+            <a:r>
+              <a:rPr lang="en-US" dirty="0"/>
+              <a:t>Priestley lecture </a:t>
+            </a:r>
+            <a:r>
+              <a:rPr lang="en-US"/>
+              <a:t>(Wednesday 7pm, ATS)</a:t>
+            </a:r>
+            <a:endParaRPr lang="en-US" dirty="0"/>
+          </a:p>
+        </p:txBody>
+      </p:sp>
+      <p:sp>
+        <p:nvSpPr>
+          <p:cNvPr id="3" name="Content Placeholder 2">
+            <a:extLst>
+              <a:ext uri="{FF2B5EF4-FFF2-40B4-BE49-F238E27FC236}">
+                <a16:creationId xmlns:a16="http://schemas.microsoft.com/office/drawing/2014/main" id="{0D952D99-BA68-446F-9AEC-CF5CF7970391}"/>
+              </a:ext>
+            </a:extLst>
+          </p:cNvPr>
+          <p:cNvSpPr>
+            <a:spLocks noGrp="1"/>
+          </p:cNvSpPr>
+          <p:nvPr>
+            <p:ph idx="1"/>
+          </p:nvPr>
+        </p:nvSpPr>
+        <p:spPr>
+          <a:xfrm>
+            <a:off x="1016000" y="538992"/>
+            <a:ext cx="10972800" cy="5610138"/>
+          </a:xfrm>
+        </p:spPr>
+        <p:txBody>
+          <a:bodyPr/>
+          <a:lstStyle/>
+          <a:p>
+            <a:r>
+              <a:rPr lang="en-US" dirty="0"/>
+              <a:t>Gowers (2014)- Fields Medalist</a:t>
+            </a:r>
+          </a:p>
+          <a:p>
+            <a:r>
+              <a:rPr lang="en-US" dirty="0"/>
+              <a:t>James Hansen (2013)- discoverer of global warming</a:t>
+            </a:r>
+          </a:p>
+          <a:p>
+            <a:r>
+              <a:rPr lang="en-US" dirty="0"/>
+              <a:t>Vinton Cerf (2007)- invented the internet</a:t>
+            </a:r>
+          </a:p>
+          <a:p>
+            <a:r>
+              <a:rPr lang="en-US" dirty="0"/>
+              <a:t>John Conway (2001)</a:t>
+            </a:r>
+          </a:p>
+          <a:p>
+            <a:r>
+              <a:rPr lang="en-US" dirty="0"/>
+              <a:t>Marvin Minsky (1995)- invented AI</a:t>
+            </a:r>
+          </a:p>
+          <a:p>
+            <a:r>
+              <a:rPr lang="en-US" dirty="0"/>
+              <a:t>Francis Crick (1988)- discoverer of DNA</a:t>
+            </a:r>
+          </a:p>
+          <a:p>
+            <a:r>
+              <a:rPr lang="en-US" dirty="0"/>
+              <a:t>Donald Knuth (1982)- cs demigod</a:t>
+            </a:r>
+          </a:p>
+          <a:p>
+            <a:r>
+              <a:rPr lang="en-US" dirty="0"/>
+              <a:t>Carl Sagan (1975)</a:t>
+            </a:r>
+          </a:p>
+          <a:p>
+            <a:r>
+              <a:rPr lang="en-US" dirty="0"/>
+              <a:t>Margaret Mead (1972)- invented anthropology </a:t>
+            </a:r>
+          </a:p>
+          <a:p>
+            <a:endParaRPr lang="en-US" dirty="0"/>
+          </a:p>
+        </p:txBody>
+      </p:sp>
+    </p:spTree>
+    <p:extLst>
+      <p:ext uri="{BB962C8B-B14F-4D97-AF65-F5344CB8AC3E}">
+        <p14:creationId xmlns:p14="http://schemas.microsoft.com/office/powerpoint/2010/main" val="2108199785"/>
+      </p:ext>
+    </p:extLst>
+  </p:cSld>
+  <p:clrMapOvr>
+    <a:masterClrMapping/>
+  </p:clrMapOvr>
+</p:sld>
+</file>
+
+<file path=ppt/slides/slide43.xml><?xml version="1.0" encoding="utf-8"?>
+<p:sld xmlns:a="http://schemas.openxmlformats.org/drawingml/2006/main" xmlns:r="http://schemas.openxmlformats.org/officeDocument/2006/relationships" xmlns:p="http://schemas.openxmlformats.org/presentationml/2006/main">
+  <p:cSld>
+    <p:spTree>
+      <p:nvGrpSpPr>
+        <p:cNvPr id="1" name=""/>
+        <p:cNvGrpSpPr/>
+        <p:nvPr/>
+      </p:nvGrpSpPr>
+      <p:grpSpPr>
+        <a:xfrm>
+          <a:off x="0" y="0"/>
+          <a:ext cx="0" cy="0"/>
+          <a:chOff x="0" y="0"/>
+          <a:chExt cx="0" cy="0"/>
+        </a:xfrm>
+      </p:grpSpPr>
+      <p:sp>
+        <p:nvSpPr>
+          <p:cNvPr id="2" name="Title 1">
+            <a:extLst>
+              <a:ext uri="{FF2B5EF4-FFF2-40B4-BE49-F238E27FC236}">
                 <a16:creationId xmlns:a16="http://schemas.microsoft.com/office/drawing/2014/main" id="{6637B71F-A9B5-447B-91B5-D76097F8F6CB}"/>
               </a:ext>
             </a:extLst>
@@ -13480,6 +13640,1151 @@
     <p:extLst>
       <p:ext uri="{BB962C8B-B14F-4D97-AF65-F5344CB8AC3E}">
         <p14:creationId xmlns:p14="http://schemas.microsoft.com/office/powerpoint/2010/main" val="1614241920"/>
+      </p:ext>
+    </p:extLst>
+  </p:cSld>
+  <p:clrMapOvr>
+    <a:masterClrMapping/>
+  </p:clrMapOvr>
+</p:sld>
+</file>
+
+<file path=ppt/slides/slide44.xml><?xml version="1.0" encoding="utf-8"?>
+<p:sld xmlns:a="http://schemas.openxmlformats.org/drawingml/2006/main" xmlns:r="http://schemas.openxmlformats.org/officeDocument/2006/relationships" xmlns:p="http://schemas.openxmlformats.org/presentationml/2006/main">
+  <p:cSld>
+    <p:spTree>
+      <p:nvGrpSpPr>
+        <p:cNvPr id="1" name=""/>
+        <p:cNvGrpSpPr/>
+        <p:nvPr/>
+      </p:nvGrpSpPr>
+      <p:grpSpPr>
+        <a:xfrm>
+          <a:off x="0" y="0"/>
+          <a:ext cx="0" cy="0"/>
+          <a:chOff x="0" y="0"/>
+          <a:chExt cx="0" cy="0"/>
+        </a:xfrm>
+      </p:grpSpPr>
+      <p:sp>
+        <p:nvSpPr>
+          <p:cNvPr id="2" name="Title 1">
+            <a:extLst>
+              <a:ext uri="{FF2B5EF4-FFF2-40B4-BE49-F238E27FC236}">
+                <a16:creationId xmlns:a16="http://schemas.microsoft.com/office/drawing/2014/main" id="{4F9647B6-28B1-4A66-A7FC-D2B518182745}"/>
+              </a:ext>
+            </a:extLst>
+          </p:cNvPr>
+          <p:cNvSpPr>
+            <a:spLocks noGrp="1"/>
+          </p:cNvSpPr>
+          <p:nvPr>
+            <p:ph type="title"/>
+          </p:nvPr>
+        </p:nvSpPr>
+        <p:spPr/>
+        <p:txBody>
+          <a:bodyPr/>
+          <a:lstStyle/>
+          <a:p>
+            <a:r>
+              <a:rPr lang="en-US" dirty="0"/>
+              <a:t>More examples</a:t>
+            </a:r>
+          </a:p>
+        </p:txBody>
+      </p:sp>
+      <p:sp>
+        <p:nvSpPr>
+          <p:cNvPr id="3" name="Content Placeholder 2">
+            <a:extLst>
+              <a:ext uri="{FF2B5EF4-FFF2-40B4-BE49-F238E27FC236}">
+                <a16:creationId xmlns:a16="http://schemas.microsoft.com/office/drawing/2014/main" id="{59B0F491-27BA-4C80-8527-DFBEAB6E3F32}"/>
+              </a:ext>
+            </a:extLst>
+          </p:cNvPr>
+          <p:cNvSpPr>
+            <a:spLocks noGrp="1"/>
+          </p:cNvSpPr>
+          <p:nvPr>
+            <p:ph idx="1"/>
+          </p:nvPr>
+        </p:nvSpPr>
+        <p:spPr/>
+        <p:txBody>
+          <a:bodyPr/>
+          <a:lstStyle/>
+          <a:p>
+            <a:r>
+              <a:rPr lang="en-US" dirty="0"/>
+              <a:t>replace first x</a:t>
+            </a:r>
+          </a:p>
+          <a:p>
+            <a:pPr lvl="1"/>
+            <a:r>
+              <a:rPr lang="en-US" dirty="0"/>
+              <a:t>Input is an </a:t>
+            </a:r>
+            <a:r>
+              <a:rPr lang="en-US" dirty="0" err="1"/>
+              <a:t>arraylist</a:t>
+            </a:r>
+            <a:r>
+              <a:rPr lang="en-US" dirty="0"/>
+              <a:t> of Character</a:t>
+            </a:r>
+          </a:p>
+          <a:p>
+            <a:pPr lvl="1"/>
+            <a:r>
+              <a:rPr lang="en-US" dirty="0"/>
+              <a:t>Change the first ‘x’ to a ‘y’ and stop</a:t>
+            </a:r>
+          </a:p>
+          <a:p>
+            <a:r>
+              <a:rPr lang="en-US" dirty="0"/>
+              <a:t>count 0s in 2d array</a:t>
+            </a:r>
+          </a:p>
+          <a:p>
+            <a:pPr lvl="1"/>
+            <a:r>
+              <a:rPr lang="en-US" dirty="0"/>
+              <a:t>Input is an </a:t>
+            </a:r>
+            <a:r>
+              <a:rPr lang="en-US" dirty="0" err="1"/>
+              <a:t>nxn</a:t>
+            </a:r>
+            <a:r>
+              <a:rPr lang="en-US" dirty="0"/>
+              <a:t> 2d array of int</a:t>
+            </a:r>
+          </a:p>
+          <a:p>
+            <a:pPr lvl="1"/>
+            <a:r>
+              <a:rPr lang="en-US" dirty="0"/>
+              <a:t>Output is the number of 0s in the 2d array</a:t>
+            </a:r>
+          </a:p>
+        </p:txBody>
+      </p:sp>
+    </p:spTree>
+    <p:extLst>
+      <p:ext uri="{BB962C8B-B14F-4D97-AF65-F5344CB8AC3E}">
+        <p14:creationId xmlns:p14="http://schemas.microsoft.com/office/powerpoint/2010/main" val="562775151"/>
+      </p:ext>
+    </p:extLst>
+  </p:cSld>
+  <p:clrMapOvr>
+    <a:masterClrMapping/>
+  </p:clrMapOvr>
+</p:sld>
+</file>
+
+<file path=ppt/slides/slide45.xml><?xml version="1.0" encoding="utf-8"?>
+<p:sld xmlns:a="http://schemas.openxmlformats.org/drawingml/2006/main" xmlns:r="http://schemas.openxmlformats.org/officeDocument/2006/relationships" xmlns:p="http://schemas.openxmlformats.org/presentationml/2006/main">
+  <p:cSld>
+    <p:spTree>
+      <p:nvGrpSpPr>
+        <p:cNvPr id="1" name=""/>
+        <p:cNvGrpSpPr/>
+        <p:nvPr/>
+      </p:nvGrpSpPr>
+      <p:grpSpPr>
+        <a:xfrm>
+          <a:off x="0" y="0"/>
+          <a:ext cx="0" cy="0"/>
+          <a:chOff x="0" y="0"/>
+          <a:chExt cx="0" cy="0"/>
+        </a:xfrm>
+      </p:grpSpPr>
+      <p:sp>
+        <p:nvSpPr>
+          <p:cNvPr id="2" name="Title 1">
+            <a:extLst>
+              <a:ext uri="{FF2B5EF4-FFF2-40B4-BE49-F238E27FC236}">
+                <a16:creationId xmlns:a16="http://schemas.microsoft.com/office/drawing/2014/main" id="{4615EE08-1BB7-46FF-81CC-ECE11F7D78C3}"/>
+              </a:ext>
+            </a:extLst>
+          </p:cNvPr>
+          <p:cNvSpPr>
+            <a:spLocks noGrp="1"/>
+          </p:cNvSpPr>
+          <p:nvPr>
+            <p:ph type="title"/>
+          </p:nvPr>
+        </p:nvSpPr>
+        <p:spPr/>
+        <p:txBody>
+          <a:bodyPr/>
+          <a:lstStyle/>
+          <a:p>
+            <a:r>
+              <a:rPr lang="en-US" dirty="0"/>
+              <a:t>Actual Iterative Algorithms Process</a:t>
+            </a:r>
+          </a:p>
+        </p:txBody>
+      </p:sp>
+      <p:sp>
+        <p:nvSpPr>
+          <p:cNvPr id="3" name="Content Placeholder 2">
+            <a:extLst>
+              <a:ext uri="{FF2B5EF4-FFF2-40B4-BE49-F238E27FC236}">
+                <a16:creationId xmlns:a16="http://schemas.microsoft.com/office/drawing/2014/main" id="{08307A17-FF84-4170-941D-769D77C55D7A}"/>
+              </a:ext>
+            </a:extLst>
+          </p:cNvPr>
+          <p:cNvSpPr>
+            <a:spLocks noGrp="1"/>
+          </p:cNvSpPr>
+          <p:nvPr>
+            <p:ph idx="1"/>
+          </p:nvPr>
+        </p:nvSpPr>
+        <p:spPr/>
+        <p:txBody>
+          <a:bodyPr/>
+          <a:lstStyle/>
+          <a:p>
+            <a:r>
+              <a:rPr lang="en-US" dirty="0"/>
+              <a:t>Pick an input measurement</a:t>
+            </a:r>
+          </a:p>
+          <a:p>
+            <a:r>
+              <a:rPr lang="en-US" dirty="0"/>
+              <a:t>Pick a basic operation</a:t>
+            </a:r>
+          </a:p>
+          <a:p>
+            <a:r>
+              <a:rPr lang="en-US" dirty="0"/>
+              <a:t>Consider if there is a worst case or best case</a:t>
+            </a:r>
+          </a:p>
+          <a:p>
+            <a:r>
+              <a:rPr lang="en-US" dirty="0"/>
+              <a:t>Count how many times that operation occurs</a:t>
+            </a:r>
+          </a:p>
+        </p:txBody>
+      </p:sp>
+    </p:spTree>
+    <p:extLst>
+      <p:ext uri="{BB962C8B-B14F-4D97-AF65-F5344CB8AC3E}">
+        <p14:creationId xmlns:p14="http://schemas.microsoft.com/office/powerpoint/2010/main" val="3113539140"/>
+      </p:ext>
+    </p:extLst>
+  </p:cSld>
+  <p:clrMapOvr>
+    <a:masterClrMapping/>
+  </p:clrMapOvr>
+</p:sld>
+</file>
+
+<file path=ppt/slides/slide46.xml><?xml version="1.0" encoding="utf-8"?>
+<p:sld xmlns:a="http://schemas.openxmlformats.org/drawingml/2006/main" xmlns:r="http://schemas.openxmlformats.org/officeDocument/2006/relationships" xmlns:p="http://schemas.openxmlformats.org/presentationml/2006/main">
+  <p:cSld>
+    <p:spTree>
+      <p:nvGrpSpPr>
+        <p:cNvPr id="1" name=""/>
+        <p:cNvGrpSpPr/>
+        <p:nvPr/>
+      </p:nvGrpSpPr>
+      <p:grpSpPr>
+        <a:xfrm>
+          <a:off x="0" y="0"/>
+          <a:ext cx="0" cy="0"/>
+          <a:chOff x="0" y="0"/>
+          <a:chExt cx="0" cy="0"/>
+        </a:xfrm>
+      </p:grpSpPr>
+      <p:sp>
+        <p:nvSpPr>
+          <p:cNvPr id="2" name="Title 1">
+            <a:extLst>
+              <a:ext uri="{FF2B5EF4-FFF2-40B4-BE49-F238E27FC236}">
+                <a16:creationId xmlns:a16="http://schemas.microsoft.com/office/drawing/2014/main" id="{37937A87-8BA8-44B5-B196-754C26A5278A}"/>
+              </a:ext>
+            </a:extLst>
+          </p:cNvPr>
+          <p:cNvSpPr>
+            <a:spLocks noGrp="1"/>
+          </p:cNvSpPr>
+          <p:nvPr>
+            <p:ph type="title"/>
+          </p:nvPr>
+        </p:nvSpPr>
+        <p:spPr/>
+        <p:txBody>
+          <a:bodyPr/>
+          <a:lstStyle/>
+          <a:p>
+            <a:r>
+              <a:rPr lang="en-US" dirty="0"/>
+              <a:t>Best case and worst case discussion</a:t>
+            </a:r>
+          </a:p>
+        </p:txBody>
+      </p:sp>
+      <p:sp>
+        <p:nvSpPr>
+          <p:cNvPr id="3" name="Content Placeholder 2">
+            <a:extLst>
+              <a:ext uri="{FF2B5EF4-FFF2-40B4-BE49-F238E27FC236}">
+                <a16:creationId xmlns:a16="http://schemas.microsoft.com/office/drawing/2014/main" id="{9EB00CCE-84B1-4358-9D2C-7573D16FDA49}"/>
+              </a:ext>
+            </a:extLst>
+          </p:cNvPr>
+          <p:cNvSpPr>
+            <a:spLocks noGrp="1"/>
+          </p:cNvSpPr>
+          <p:nvPr>
+            <p:ph idx="1"/>
+          </p:nvPr>
+        </p:nvSpPr>
+        <p:spPr/>
+        <p:txBody>
+          <a:bodyPr/>
+          <a:lstStyle/>
+          <a:p>
+            <a:r>
+              <a:rPr lang="en-US" dirty="0"/>
+              <a:t>Best case vs worst case vs algorithm</a:t>
+            </a:r>
+          </a:p>
+        </p:txBody>
+      </p:sp>
+    </p:spTree>
+    <p:extLst>
+      <p:ext uri="{BB962C8B-B14F-4D97-AF65-F5344CB8AC3E}">
+        <p14:creationId xmlns:p14="http://schemas.microsoft.com/office/powerpoint/2010/main" val="2828200275"/>
+      </p:ext>
+    </p:extLst>
+  </p:cSld>
+  <p:clrMapOvr>
+    <a:masterClrMapping/>
+  </p:clrMapOvr>
+</p:sld>
+</file>
+
+<file path=ppt/slides/slide47.xml><?xml version="1.0" encoding="utf-8"?>
+<p:sld xmlns:a="http://schemas.openxmlformats.org/drawingml/2006/main" xmlns:r="http://schemas.openxmlformats.org/officeDocument/2006/relationships" xmlns:p="http://schemas.openxmlformats.org/presentationml/2006/main">
+  <p:cSld>
+    <p:spTree>
+      <p:nvGrpSpPr>
+        <p:cNvPr id="1" name=""/>
+        <p:cNvGrpSpPr/>
+        <p:nvPr/>
+      </p:nvGrpSpPr>
+      <p:grpSpPr>
+        <a:xfrm>
+          <a:off x="0" y="0"/>
+          <a:ext cx="0" cy="0"/>
+          <a:chOff x="0" y="0"/>
+          <a:chExt cx="0" cy="0"/>
+        </a:xfrm>
+      </p:grpSpPr>
+      <p:sp>
+        <p:nvSpPr>
+          <p:cNvPr id="2" name="Title 1">
+            <a:extLst>
+              <a:ext uri="{FF2B5EF4-FFF2-40B4-BE49-F238E27FC236}">
+                <a16:creationId xmlns:a16="http://schemas.microsoft.com/office/drawing/2014/main" id="{36F03DDD-4313-46EF-868F-FC10ECD55815}"/>
+              </a:ext>
+            </a:extLst>
+          </p:cNvPr>
+          <p:cNvSpPr>
+            <a:spLocks noGrp="1"/>
+          </p:cNvSpPr>
+          <p:nvPr>
+            <p:ph type="title"/>
+          </p:nvPr>
+        </p:nvSpPr>
+        <p:spPr/>
+        <p:txBody>
+          <a:bodyPr/>
+          <a:lstStyle/>
+          <a:p>
+            <a:r>
+              <a:rPr lang="en-US" dirty="0"/>
+              <a:t>Upper triangular sum</a:t>
+            </a:r>
+          </a:p>
+        </p:txBody>
+      </p:sp>
+      <p:sp>
+        <p:nvSpPr>
+          <p:cNvPr id="3" name="Content Placeholder 2">
+            <a:extLst>
+              <a:ext uri="{FF2B5EF4-FFF2-40B4-BE49-F238E27FC236}">
+                <a16:creationId xmlns:a16="http://schemas.microsoft.com/office/drawing/2014/main" id="{09428412-693F-4E8A-A1E0-9D8F95748990}"/>
+              </a:ext>
+            </a:extLst>
+          </p:cNvPr>
+          <p:cNvSpPr>
+            <a:spLocks noGrp="1"/>
+          </p:cNvSpPr>
+          <p:nvPr>
+            <p:ph idx="1"/>
+          </p:nvPr>
+        </p:nvSpPr>
+        <p:spPr/>
+        <p:txBody>
+          <a:bodyPr/>
+          <a:lstStyle/>
+          <a:p>
+            <a:r>
+              <a:rPr lang="en-US" dirty="0"/>
+              <a:t>Given a 2d array, find the sum of elements in the upper right side</a:t>
+            </a:r>
+          </a:p>
+        </p:txBody>
+      </p:sp>
+    </p:spTree>
+    <p:extLst>
+      <p:ext uri="{BB962C8B-B14F-4D97-AF65-F5344CB8AC3E}">
+        <p14:creationId xmlns:p14="http://schemas.microsoft.com/office/powerpoint/2010/main" val="559284376"/>
+      </p:ext>
+    </p:extLst>
+  </p:cSld>
+  <p:clrMapOvr>
+    <a:masterClrMapping/>
+  </p:clrMapOvr>
+</p:sld>
+</file>
+
+<file path=ppt/slides/slide48.xml><?xml version="1.0" encoding="utf-8"?>
+<p:sld xmlns:a="http://schemas.openxmlformats.org/drawingml/2006/main" xmlns:r="http://schemas.openxmlformats.org/officeDocument/2006/relationships" xmlns:p="http://schemas.openxmlformats.org/presentationml/2006/main">
+  <p:cSld>
+    <p:spTree>
+      <p:nvGrpSpPr>
+        <p:cNvPr id="1" name=""/>
+        <p:cNvGrpSpPr/>
+        <p:nvPr/>
+      </p:nvGrpSpPr>
+      <p:grpSpPr>
+        <a:xfrm>
+          <a:off x="0" y="0"/>
+          <a:ext cx="0" cy="0"/>
+          <a:chOff x="0" y="0"/>
+          <a:chExt cx="0" cy="0"/>
+        </a:xfrm>
+      </p:grpSpPr>
+      <p:sp>
+        <p:nvSpPr>
+          <p:cNvPr id="2" name="Title 1">
+            <a:extLst>
+              <a:ext uri="{FF2B5EF4-FFF2-40B4-BE49-F238E27FC236}">
+                <a16:creationId xmlns:a16="http://schemas.microsoft.com/office/drawing/2014/main" id="{AD97AD3C-A9A4-48E2-B9D3-5093A99F3643}"/>
+              </a:ext>
+            </a:extLst>
+          </p:cNvPr>
+          <p:cNvSpPr>
+            <a:spLocks noGrp="1"/>
+          </p:cNvSpPr>
+          <p:nvPr>
+            <p:ph type="title"/>
+          </p:nvPr>
+        </p:nvSpPr>
+        <p:spPr/>
+        <p:txBody>
+          <a:bodyPr/>
+          <a:lstStyle/>
+          <a:p>
+            <a:endParaRPr lang="en-US"/>
+          </a:p>
+        </p:txBody>
+      </p:sp>
+      <mc:AlternateContent xmlns:mc="http://schemas.openxmlformats.org/markup-compatibility/2006">
+        <mc:Choice xmlns:a14="http://schemas.microsoft.com/office/drawing/2010/main" Requires="a14">
+          <p:sp>
+            <p:nvSpPr>
+              <p:cNvPr id="3" name="Content Placeholder 2">
+                <a:extLst>
+                  <a:ext uri="{FF2B5EF4-FFF2-40B4-BE49-F238E27FC236}">
+                    <a16:creationId xmlns:a16="http://schemas.microsoft.com/office/drawing/2014/main" id="{32FD0C7F-1110-48CC-8049-940405E26940}"/>
+                  </a:ext>
+                </a:extLst>
+              </p:cNvPr>
+              <p:cNvSpPr>
+                <a:spLocks noGrp="1"/>
+              </p:cNvSpPr>
+              <p:nvPr>
+                <p:ph idx="1"/>
+              </p:nvPr>
+            </p:nvSpPr>
+            <p:spPr/>
+            <p:txBody>
+              <a:bodyPr/>
+              <a:lstStyle/>
+              <a:p>
+                <a14:m>
+                  <m:oMath xmlns:m="http://schemas.openxmlformats.org/officeDocument/2006/math">
+                    <m:nary>
+                      <m:naryPr>
+                        <m:chr m:val="∑"/>
+                        <m:ctrlPr>
+                          <a:rPr lang="en-US" i="1" smtClean="0">
+                            <a:latin typeface="Cambria Math" panose="02040503050406030204" pitchFamily="18" charset="0"/>
+                          </a:rPr>
+                        </m:ctrlPr>
+                      </m:naryPr>
+                      <m:sub>
+                        <m:r>
+                          <m:rPr>
+                            <m:brk m:alnAt="23"/>
+                          </m:rPr>
+                          <a:rPr lang="en-US" i="1">
+                            <a:latin typeface="Cambria Math" panose="02040503050406030204" pitchFamily="18" charset="0"/>
+                          </a:rPr>
+                          <m:t>𝑖</m:t>
+                        </m:r>
+                        <m:r>
+                          <a:rPr lang="en-US" i="1">
+                            <a:latin typeface="Cambria Math" panose="02040503050406030204" pitchFamily="18" charset="0"/>
+                          </a:rPr>
+                          <m:t>=0</m:t>
+                        </m:r>
+                      </m:sub>
+                      <m:sup>
+                        <m:r>
+                          <a:rPr lang="en-US" i="1">
+                            <a:latin typeface="Cambria Math" panose="02040503050406030204" pitchFamily="18" charset="0"/>
+                          </a:rPr>
+                          <m:t>𝑛</m:t>
+                        </m:r>
+                      </m:sup>
+                      <m:e>
+                        <m:r>
+                          <a:rPr lang="en-US" b="0" i="1" smtClean="0">
+                            <a:latin typeface="Cambria Math" panose="02040503050406030204" pitchFamily="18" charset="0"/>
+                          </a:rPr>
+                          <m:t>𝑖</m:t>
+                        </m:r>
+                        <m:r>
+                          <a:rPr lang="en-US" b="0" i="1" smtClean="0">
+                            <a:latin typeface="Cambria Math" panose="02040503050406030204" pitchFamily="18" charset="0"/>
+                          </a:rPr>
+                          <m:t>=1+2+3+…+</m:t>
+                        </m:r>
+                        <m:r>
+                          <a:rPr lang="en-US" b="0" i="1" smtClean="0">
+                            <a:latin typeface="Cambria Math" panose="02040503050406030204" pitchFamily="18" charset="0"/>
+                          </a:rPr>
+                          <m:t>𝑛</m:t>
+                        </m:r>
+                        <m:r>
+                          <a:rPr lang="en-US" b="0" i="1" smtClean="0">
+                            <a:latin typeface="Cambria Math" panose="02040503050406030204" pitchFamily="18" charset="0"/>
+                          </a:rPr>
+                          <m:t>=</m:t>
+                        </m:r>
+                      </m:e>
+                    </m:nary>
+                    <m:r>
+                      <m:rPr>
+                        <m:sty m:val="p"/>
+                      </m:rPr>
+                      <a:rPr lang="en-US" b="0" i="0" smtClean="0">
+                        <a:latin typeface="Cambria Math" panose="02040503050406030204" pitchFamily="18" charset="0"/>
+                        <a:ea typeface="Cambria Math" panose="02040503050406030204" pitchFamily="18" charset="0"/>
+                      </a:rPr>
+                      <m:t>n</m:t>
+                    </m:r>
+                    <m:r>
+                      <a:rPr lang="en-US" b="0" i="0" smtClean="0">
+                        <a:latin typeface="Cambria Math" panose="02040503050406030204" pitchFamily="18" charset="0"/>
+                        <a:ea typeface="Cambria Math" panose="02040503050406030204" pitchFamily="18" charset="0"/>
+                      </a:rPr>
+                      <m:t>(</m:t>
+                    </m:r>
+                    <m:r>
+                      <m:rPr>
+                        <m:sty m:val="p"/>
+                      </m:rPr>
+                      <a:rPr lang="en-US" b="0" i="0" smtClean="0">
+                        <a:latin typeface="Cambria Math" panose="02040503050406030204" pitchFamily="18" charset="0"/>
+                        <a:ea typeface="Cambria Math" panose="02040503050406030204" pitchFamily="18" charset="0"/>
+                      </a:rPr>
+                      <m:t>n</m:t>
+                    </m:r>
+                    <m:r>
+                      <a:rPr lang="en-US" b="0" i="0" smtClean="0">
+                        <a:latin typeface="Cambria Math" panose="02040503050406030204" pitchFamily="18" charset="0"/>
+                        <a:ea typeface="Cambria Math" panose="02040503050406030204" pitchFamily="18" charset="0"/>
+                      </a:rPr>
+                      <m:t>+1)/2</m:t>
+                    </m:r>
+                  </m:oMath>
+                </a14:m>
+                <a:endParaRPr lang="en-US" dirty="0"/>
+              </a:p>
+              <a:p>
+                <a14:m>
+                  <m:oMath xmlns:m="http://schemas.openxmlformats.org/officeDocument/2006/math">
+                    <m:nary>
+                      <m:naryPr>
+                        <m:chr m:val="∑"/>
+                        <m:ctrlPr>
+                          <a:rPr lang="en-US" i="1" smtClean="0">
+                            <a:latin typeface="Cambria Math" panose="02040503050406030204" pitchFamily="18" charset="0"/>
+                          </a:rPr>
+                        </m:ctrlPr>
+                      </m:naryPr>
+                      <m:sub>
+                        <m:r>
+                          <m:rPr>
+                            <m:brk m:alnAt="23"/>
+                          </m:rPr>
+                          <a:rPr lang="en-US" i="1">
+                            <a:latin typeface="Cambria Math" panose="02040503050406030204" pitchFamily="18" charset="0"/>
+                          </a:rPr>
+                          <m:t>𝑖</m:t>
+                        </m:r>
+                        <m:r>
+                          <a:rPr lang="en-US" i="1">
+                            <a:latin typeface="Cambria Math" panose="02040503050406030204" pitchFamily="18" charset="0"/>
+                          </a:rPr>
+                          <m:t>=0</m:t>
+                        </m:r>
+                      </m:sub>
+                      <m:sup>
+                        <m:r>
+                          <a:rPr lang="en-US" i="1">
+                            <a:latin typeface="Cambria Math" panose="02040503050406030204" pitchFamily="18" charset="0"/>
+                          </a:rPr>
+                          <m:t>𝑛</m:t>
+                        </m:r>
+                      </m:sup>
+                      <m:e>
+                        <m:sSup>
+                          <m:sSupPr>
+                            <m:ctrlPr>
+                              <a:rPr lang="en-US" i="1" smtClean="0">
+                                <a:latin typeface="Cambria Math" panose="02040503050406030204" pitchFamily="18" charset="0"/>
+                              </a:rPr>
+                            </m:ctrlPr>
+                          </m:sSupPr>
+                          <m:e>
+                            <m:r>
+                              <a:rPr lang="en-US" b="0" i="1" smtClean="0">
+                                <a:latin typeface="Cambria Math" panose="02040503050406030204" pitchFamily="18" charset="0"/>
+                              </a:rPr>
+                              <m:t>𝑖</m:t>
+                            </m:r>
+                          </m:e>
+                          <m:sup>
+                            <m:r>
+                              <a:rPr lang="en-US" b="0" i="1" smtClean="0">
+                                <a:latin typeface="Cambria Math" panose="02040503050406030204" pitchFamily="18" charset="0"/>
+                              </a:rPr>
+                              <m:t>2</m:t>
+                            </m:r>
+                          </m:sup>
+                        </m:sSup>
+                      </m:e>
+                    </m:nary>
+                    <m:r>
+                      <a:rPr lang="en-US" b="0" i="0" smtClean="0">
+                        <a:latin typeface="Cambria Math" panose="02040503050406030204" pitchFamily="18" charset="0"/>
+                      </a:rPr>
+                      <m:t>=?</m:t>
+                    </m:r>
+                  </m:oMath>
+                </a14:m>
+                <a:endParaRPr lang="en-US" b="0" dirty="0"/>
+              </a:p>
+              <a:p>
+                <a14:m>
+                  <m:oMath xmlns:m="http://schemas.openxmlformats.org/officeDocument/2006/math">
+                    <m:nary>
+                      <m:naryPr>
+                        <m:chr m:val="∑"/>
+                        <m:ctrlPr>
+                          <a:rPr lang="en-US" i="1">
+                            <a:latin typeface="Cambria Math" panose="02040503050406030204" pitchFamily="18" charset="0"/>
+                          </a:rPr>
+                        </m:ctrlPr>
+                      </m:naryPr>
+                      <m:sub>
+                        <m:r>
+                          <m:rPr>
+                            <m:brk m:alnAt="23"/>
+                          </m:rPr>
+                          <a:rPr lang="en-US" i="1">
+                            <a:latin typeface="Cambria Math" panose="02040503050406030204" pitchFamily="18" charset="0"/>
+                          </a:rPr>
+                          <m:t>𝑖</m:t>
+                        </m:r>
+                        <m:r>
+                          <a:rPr lang="en-US" i="1">
+                            <a:latin typeface="Cambria Math" panose="02040503050406030204" pitchFamily="18" charset="0"/>
+                          </a:rPr>
+                          <m:t>=0</m:t>
+                        </m:r>
+                      </m:sub>
+                      <m:sup>
+                        <m:r>
+                          <a:rPr lang="en-US" i="1">
+                            <a:latin typeface="Cambria Math" panose="02040503050406030204" pitchFamily="18" charset="0"/>
+                          </a:rPr>
+                          <m:t>𝑛</m:t>
+                        </m:r>
+                      </m:sup>
+                      <m:e>
+                        <m:r>
+                          <m:rPr>
+                            <m:sty m:val="p"/>
+                          </m:rPr>
+                          <a:rPr lang="en-US">
+                            <a:latin typeface="Cambria Math" panose="02040503050406030204" pitchFamily="18" charset="0"/>
+                          </a:rPr>
+                          <m:t>ln</m:t>
+                        </m:r>
+                        <m:r>
+                          <a:rPr lang="en-US" i="1">
+                            <a:latin typeface="Cambria Math" panose="02040503050406030204" pitchFamily="18" charset="0"/>
+                          </a:rPr>
+                          <m:t>⁡(</m:t>
+                        </m:r>
+                        <m:r>
+                          <a:rPr lang="en-US" i="1">
+                            <a:latin typeface="Cambria Math" panose="02040503050406030204" pitchFamily="18" charset="0"/>
+                          </a:rPr>
+                          <m:t>𝑖</m:t>
+                        </m:r>
+                        <m:r>
+                          <a:rPr lang="en-US" i="1">
+                            <a:latin typeface="Cambria Math" panose="02040503050406030204" pitchFamily="18" charset="0"/>
+                          </a:rPr>
+                          <m:t>)</m:t>
+                        </m:r>
+                      </m:e>
+                    </m:nary>
+                    <m:r>
+                      <a:rPr lang="en-US">
+                        <a:latin typeface="Cambria Math" panose="02040503050406030204" pitchFamily="18" charset="0"/>
+                      </a:rPr>
+                      <m:t>=?</m:t>
+                    </m:r>
+                  </m:oMath>
+                </a14:m>
+                <a:endParaRPr lang="en-US" dirty="0"/>
+              </a:p>
+              <a:p>
+                <a14:m>
+                  <m:oMath xmlns:m="http://schemas.openxmlformats.org/officeDocument/2006/math">
+                    <m:nary>
+                      <m:naryPr>
+                        <m:chr m:val="∑"/>
+                        <m:ctrlPr>
+                          <a:rPr lang="en-US" i="1">
+                            <a:latin typeface="Cambria Math" panose="02040503050406030204" pitchFamily="18" charset="0"/>
+                          </a:rPr>
+                        </m:ctrlPr>
+                      </m:naryPr>
+                      <m:sub>
+                        <m:r>
+                          <m:rPr>
+                            <m:brk m:alnAt="23"/>
+                          </m:rPr>
+                          <a:rPr lang="en-US" i="1">
+                            <a:latin typeface="Cambria Math" panose="02040503050406030204" pitchFamily="18" charset="0"/>
+                          </a:rPr>
+                          <m:t>𝑖</m:t>
+                        </m:r>
+                        <m:r>
+                          <a:rPr lang="en-US" i="1">
+                            <a:latin typeface="Cambria Math" panose="02040503050406030204" pitchFamily="18" charset="0"/>
+                          </a:rPr>
+                          <m:t>=0</m:t>
+                        </m:r>
+                      </m:sub>
+                      <m:sup>
+                        <m:r>
+                          <a:rPr lang="en-US" i="1">
+                            <a:latin typeface="Cambria Math" panose="02040503050406030204" pitchFamily="18" charset="0"/>
+                          </a:rPr>
+                          <m:t>𝑛</m:t>
+                        </m:r>
+                      </m:sup>
+                      <m:e>
+                        <m:f>
+                          <m:fPr>
+                            <m:ctrlPr>
+                              <a:rPr lang="en-US" i="1" smtClean="0">
+                                <a:latin typeface="Cambria Math" panose="02040503050406030204" pitchFamily="18" charset="0"/>
+                              </a:rPr>
+                            </m:ctrlPr>
+                          </m:fPr>
+                          <m:num>
+                            <m:r>
+                              <a:rPr lang="en-US" b="0" i="1" smtClean="0">
+                                <a:latin typeface="Cambria Math" panose="02040503050406030204" pitchFamily="18" charset="0"/>
+                              </a:rPr>
+                              <m:t>1</m:t>
+                            </m:r>
+                          </m:num>
+                          <m:den>
+                            <m:r>
+                              <a:rPr lang="en-US" b="0" i="1" smtClean="0">
+                                <a:latin typeface="Cambria Math" panose="02040503050406030204" pitchFamily="18" charset="0"/>
+                              </a:rPr>
+                              <m:t>𝑖</m:t>
+                            </m:r>
+                          </m:den>
+                        </m:f>
+                      </m:e>
+                    </m:nary>
+                    <m:r>
+                      <a:rPr lang="en-US">
+                        <a:latin typeface="Cambria Math" panose="02040503050406030204" pitchFamily="18" charset="0"/>
+                      </a:rPr>
+                      <m:t>=?</m:t>
+                    </m:r>
+                  </m:oMath>
+                </a14:m>
+                <a:endParaRPr lang="en-US" dirty="0"/>
+              </a:p>
+              <a:p>
+                <a:endParaRPr lang="en-US" dirty="0"/>
+              </a:p>
+            </p:txBody>
+          </p:sp>
+        </mc:Choice>
+        <mc:Fallback>
+          <p:sp>
+            <p:nvSpPr>
+              <p:cNvPr id="3" name="Content Placeholder 2">
+                <a:extLst>
+                  <a:ext uri="{FF2B5EF4-FFF2-40B4-BE49-F238E27FC236}">
+                    <a16:creationId xmlns:a16="http://schemas.microsoft.com/office/drawing/2014/main" id="{32FD0C7F-1110-48CC-8049-940405E26940}"/>
+                  </a:ext>
+                </a:extLst>
+              </p:cNvPr>
+              <p:cNvSpPr>
+                <a:spLocks noGrp="1" noRot="1" noChangeAspect="1" noMove="1" noResize="1" noEditPoints="1" noAdjustHandles="1" noChangeArrowheads="1" noChangeShapeType="1" noTextEdit="1"/>
+              </p:cNvSpPr>
+              <p:nvPr>
+                <p:ph idx="1"/>
+              </p:nvPr>
+            </p:nvSpPr>
+            <p:spPr>
+              <a:blipFill>
+                <a:blip r:embed="rId2"/>
+                <a:stretch>
+                  <a:fillRect/>
+                </a:stretch>
+              </a:blipFill>
+            </p:spPr>
+            <p:txBody>
+              <a:bodyPr/>
+              <a:lstStyle/>
+              <a:p>
+                <a:r>
+                  <a:rPr lang="en-US">
+                    <a:noFill/>
+                  </a:rPr>
+                  <a:t> </a:t>
+                </a:r>
+              </a:p>
+            </p:txBody>
+          </p:sp>
+        </mc:Fallback>
+      </mc:AlternateContent>
+    </p:spTree>
+    <p:extLst>
+      <p:ext uri="{BB962C8B-B14F-4D97-AF65-F5344CB8AC3E}">
+        <p14:creationId xmlns:p14="http://schemas.microsoft.com/office/powerpoint/2010/main" val="3737423005"/>
+      </p:ext>
+    </p:extLst>
+  </p:cSld>
+  <p:clrMapOvr>
+    <a:masterClrMapping/>
+  </p:clrMapOvr>
+</p:sld>
+</file>
+
+<file path=ppt/slides/slide49.xml><?xml version="1.0" encoding="utf-8"?>
+<p:sld xmlns:a="http://schemas.openxmlformats.org/drawingml/2006/main" xmlns:r="http://schemas.openxmlformats.org/officeDocument/2006/relationships" xmlns:p="http://schemas.openxmlformats.org/presentationml/2006/main">
+  <p:cSld>
+    <p:spTree>
+      <p:nvGrpSpPr>
+        <p:cNvPr id="1" name=""/>
+        <p:cNvGrpSpPr/>
+        <p:nvPr/>
+      </p:nvGrpSpPr>
+      <p:grpSpPr>
+        <a:xfrm>
+          <a:off x="0" y="0"/>
+          <a:ext cx="0" cy="0"/>
+          <a:chOff x="0" y="0"/>
+          <a:chExt cx="0" cy="0"/>
+        </a:xfrm>
+      </p:grpSpPr>
+      <p:sp>
+        <p:nvSpPr>
+          <p:cNvPr id="2" name="Title 1">
+            <a:extLst>
+              <a:ext uri="{FF2B5EF4-FFF2-40B4-BE49-F238E27FC236}">
+                <a16:creationId xmlns:a16="http://schemas.microsoft.com/office/drawing/2014/main" id="{139CCC5C-A56E-4C05-AF98-D8E2CD60EFB3}"/>
+              </a:ext>
+            </a:extLst>
+          </p:cNvPr>
+          <p:cNvSpPr>
+            <a:spLocks noGrp="1"/>
+          </p:cNvSpPr>
+          <p:nvPr>
+            <p:ph type="title"/>
+          </p:nvPr>
+        </p:nvSpPr>
+        <p:spPr/>
+        <p:txBody>
+          <a:bodyPr/>
+          <a:lstStyle/>
+          <a:p>
+            <a:r>
+              <a:rPr lang="en-US" dirty="0"/>
+              <a:t>Summation </a:t>
+            </a:r>
+          </a:p>
+        </p:txBody>
+      </p:sp>
+      <mc:AlternateContent xmlns:mc="http://schemas.openxmlformats.org/markup-compatibility/2006">
+        <mc:Choice xmlns:a14="http://schemas.microsoft.com/office/drawing/2010/main" Requires="a14">
+          <p:sp>
+            <p:nvSpPr>
+              <p:cNvPr id="3" name="Content Placeholder 2">
+                <a:extLst>
+                  <a:ext uri="{FF2B5EF4-FFF2-40B4-BE49-F238E27FC236}">
+                    <a16:creationId xmlns:a16="http://schemas.microsoft.com/office/drawing/2014/main" id="{49C75E4A-6D62-438B-9D96-45E4EE21E698}"/>
+                  </a:ext>
+                </a:extLst>
+              </p:cNvPr>
+              <p:cNvSpPr>
+                <a:spLocks noGrp="1"/>
+              </p:cNvSpPr>
+              <p:nvPr>
+                <p:ph idx="1"/>
+              </p:nvPr>
+            </p:nvSpPr>
+            <p:spPr/>
+            <p:txBody>
+              <a:bodyPr/>
+              <a:lstStyle/>
+              <a:p>
+                <a14:m>
+                  <m:oMath xmlns:m="http://schemas.openxmlformats.org/officeDocument/2006/math">
+                    <m:nary>
+                      <m:naryPr>
+                        <m:chr m:val="∑"/>
+                        <m:ctrlPr>
+                          <a:rPr lang="en-US" i="1" smtClean="0">
+                            <a:latin typeface="Cambria Math" panose="02040503050406030204" pitchFamily="18" charset="0"/>
+                          </a:rPr>
+                        </m:ctrlPr>
+                      </m:naryPr>
+                      <m:sub>
+                        <m:r>
+                          <m:rPr>
+                            <m:brk m:alnAt="23"/>
+                          </m:rPr>
+                          <a:rPr lang="en-US" b="0" i="1" smtClean="0">
+                            <a:latin typeface="Cambria Math" panose="02040503050406030204" pitchFamily="18" charset="0"/>
+                          </a:rPr>
+                          <m:t>𝑖</m:t>
+                        </m:r>
+                        <m:r>
+                          <a:rPr lang="en-US" b="0" i="1" smtClean="0">
+                            <a:latin typeface="Cambria Math" panose="02040503050406030204" pitchFamily="18" charset="0"/>
+                          </a:rPr>
+                          <m:t>=0</m:t>
+                        </m:r>
+                      </m:sub>
+                      <m:sup>
+                        <m:r>
+                          <a:rPr lang="en-US" b="0" i="1" smtClean="0">
+                            <a:latin typeface="Cambria Math" panose="02040503050406030204" pitchFamily="18" charset="0"/>
+                          </a:rPr>
+                          <m:t>𝑛</m:t>
+                        </m:r>
+                      </m:sup>
+                      <m:e>
+                        <m:r>
+                          <a:rPr lang="en-US" b="0" i="1" smtClean="0">
+                            <a:latin typeface="Cambria Math" panose="02040503050406030204" pitchFamily="18" charset="0"/>
+                          </a:rPr>
+                          <m:t>𝑓</m:t>
+                        </m:r>
+                        <m:r>
+                          <a:rPr lang="en-US" b="0" i="1" smtClean="0">
+                            <a:latin typeface="Cambria Math" panose="02040503050406030204" pitchFamily="18" charset="0"/>
+                          </a:rPr>
+                          <m:t>(</m:t>
+                        </m:r>
+                        <m:r>
+                          <a:rPr lang="en-US" b="0" i="1" smtClean="0">
+                            <a:latin typeface="Cambria Math" panose="02040503050406030204" pitchFamily="18" charset="0"/>
+                          </a:rPr>
+                          <m:t>𝑖</m:t>
+                        </m:r>
+                        <m:r>
+                          <a:rPr lang="en-US" b="0" i="1" smtClean="0">
+                            <a:latin typeface="Cambria Math" panose="02040503050406030204" pitchFamily="18" charset="0"/>
+                          </a:rPr>
+                          <m:t>)∈</m:t>
+                        </m:r>
+                        <m:r>
+                          <a:rPr lang="en-US" b="0" i="1" smtClean="0">
+                            <a:latin typeface="Cambria Math" panose="02040503050406030204" pitchFamily="18" charset="0"/>
+                            <a:ea typeface="Cambria Math" panose="02040503050406030204" pitchFamily="18" charset="0"/>
+                          </a:rPr>
+                          <m:t>𝜃</m:t>
+                        </m:r>
+                        <m:r>
+                          <a:rPr lang="en-US" b="0" i="1" smtClean="0">
+                            <a:latin typeface="Cambria Math" panose="02040503050406030204" pitchFamily="18" charset="0"/>
+                            <a:ea typeface="Cambria Math" panose="02040503050406030204" pitchFamily="18" charset="0"/>
+                          </a:rPr>
+                          <m:t>(</m:t>
+                        </m:r>
+                        <m:nary>
+                          <m:naryPr>
+                            <m:ctrlPr>
+                              <a:rPr lang="en-US" b="0" i="1" smtClean="0">
+                                <a:latin typeface="Cambria Math" panose="02040503050406030204" pitchFamily="18" charset="0"/>
+                                <a:ea typeface="Cambria Math" panose="02040503050406030204" pitchFamily="18" charset="0"/>
+                              </a:rPr>
+                            </m:ctrlPr>
+                          </m:naryPr>
+                          <m:sub>
+                            <m:r>
+                              <m:rPr>
+                                <m:brk m:alnAt="23"/>
+                              </m:rPr>
+                              <a:rPr lang="en-US" b="0" i="1" smtClean="0">
+                                <a:latin typeface="Cambria Math" panose="02040503050406030204" pitchFamily="18" charset="0"/>
+                                <a:ea typeface="Cambria Math" panose="02040503050406030204" pitchFamily="18" charset="0"/>
+                              </a:rPr>
+                              <m:t>0</m:t>
+                            </m:r>
+                          </m:sub>
+                          <m:sup>
+                            <m:r>
+                              <a:rPr lang="en-US" b="0" i="1" smtClean="0">
+                                <a:latin typeface="Cambria Math" panose="02040503050406030204" pitchFamily="18" charset="0"/>
+                                <a:ea typeface="Cambria Math" panose="02040503050406030204" pitchFamily="18" charset="0"/>
+                              </a:rPr>
+                              <m:t>𝑛</m:t>
+                            </m:r>
+                          </m:sup>
+                          <m:e>
+                            <m:r>
+                              <a:rPr lang="en-US" b="0" i="1" smtClean="0">
+                                <a:latin typeface="Cambria Math" panose="02040503050406030204" pitchFamily="18" charset="0"/>
+                                <a:ea typeface="Cambria Math" panose="02040503050406030204" pitchFamily="18" charset="0"/>
+                              </a:rPr>
+                              <m:t>𝑓</m:t>
+                            </m:r>
+                            <m:r>
+                              <a:rPr lang="en-US" b="0" i="1" smtClean="0">
+                                <a:latin typeface="Cambria Math" panose="02040503050406030204" pitchFamily="18" charset="0"/>
+                                <a:ea typeface="Cambria Math" panose="02040503050406030204" pitchFamily="18" charset="0"/>
+                              </a:rPr>
+                              <m:t>(</m:t>
+                            </m:r>
+                            <m:r>
+                              <a:rPr lang="en-US" b="0" i="1" smtClean="0">
+                                <a:latin typeface="Cambria Math" panose="02040503050406030204" pitchFamily="18" charset="0"/>
+                                <a:ea typeface="Cambria Math" panose="02040503050406030204" pitchFamily="18" charset="0"/>
+                              </a:rPr>
+                              <m:t>𝑖</m:t>
+                            </m:r>
+                            <m:r>
+                              <a:rPr lang="en-US" b="0" i="1" smtClean="0">
+                                <a:latin typeface="Cambria Math" panose="02040503050406030204" pitchFamily="18" charset="0"/>
+                                <a:ea typeface="Cambria Math" panose="02040503050406030204" pitchFamily="18" charset="0"/>
+                              </a:rPr>
+                              <m:t>)</m:t>
+                            </m:r>
+                          </m:e>
+                        </m:nary>
+                      </m:e>
+                    </m:nary>
+                    <m:r>
+                      <m:rPr>
+                        <m:sty m:val="p"/>
+                      </m:rPr>
+                      <a:rPr lang="en-US" b="0" i="0" smtClean="0">
+                        <a:latin typeface="Cambria Math" panose="02040503050406030204" pitchFamily="18" charset="0"/>
+                      </a:rPr>
+                      <m:t>di</m:t>
+                    </m:r>
+                    <m:r>
+                      <a:rPr lang="en-US" b="0" i="0" smtClean="0">
+                        <a:latin typeface="Cambria Math" panose="02040503050406030204" pitchFamily="18" charset="0"/>
+                      </a:rPr>
+                      <m:t>)</m:t>
+                    </m:r>
+                  </m:oMath>
+                </a14:m>
+                <a:endParaRPr lang="en-US" dirty="0"/>
+              </a:p>
+            </p:txBody>
+          </p:sp>
+        </mc:Choice>
+        <mc:Fallback>
+          <p:sp>
+            <p:nvSpPr>
+              <p:cNvPr id="3" name="Content Placeholder 2">
+                <a:extLst>
+                  <a:ext uri="{FF2B5EF4-FFF2-40B4-BE49-F238E27FC236}">
+                    <a16:creationId xmlns:a16="http://schemas.microsoft.com/office/drawing/2014/main" id="{49C75E4A-6D62-438B-9D96-45E4EE21E698}"/>
+                  </a:ext>
+                </a:extLst>
+              </p:cNvPr>
+              <p:cNvSpPr>
+                <a:spLocks noGrp="1" noRot="1" noChangeAspect="1" noMove="1" noResize="1" noEditPoints="1" noAdjustHandles="1" noChangeArrowheads="1" noChangeShapeType="1" noTextEdit="1"/>
+              </p:cNvSpPr>
+              <p:nvPr>
+                <p:ph idx="1"/>
+              </p:nvPr>
+            </p:nvSpPr>
+            <p:spPr>
+              <a:blipFill>
+                <a:blip r:embed="rId2"/>
+                <a:stretch>
+                  <a:fillRect/>
+                </a:stretch>
+              </a:blipFill>
+            </p:spPr>
+            <p:txBody>
+              <a:bodyPr/>
+              <a:lstStyle/>
+              <a:p>
+                <a:r>
+                  <a:rPr lang="en-US">
+                    <a:noFill/>
+                  </a:rPr>
+                  <a:t> </a:t>
+                </a:r>
+              </a:p>
+            </p:txBody>
+          </p:sp>
+        </mc:Fallback>
+      </mc:AlternateContent>
+    </p:spTree>
+    <p:extLst>
+      <p:ext uri="{BB962C8B-B14F-4D97-AF65-F5344CB8AC3E}">
+        <p14:creationId xmlns:p14="http://schemas.microsoft.com/office/powerpoint/2010/main" val="1453506552"/>
       </p:ext>
     </p:extLst>
   </p:cSld>
@@ -13598,6 +14903,93 @@
     <p:extLst>
       <p:ext uri="{BB962C8B-B14F-4D97-AF65-F5344CB8AC3E}">
         <p14:creationId xmlns:p14="http://schemas.microsoft.com/office/powerpoint/2010/main" val="724140241"/>
+      </p:ext>
+    </p:extLst>
+  </p:cSld>
+  <p:clrMapOvr>
+    <a:masterClrMapping/>
+  </p:clrMapOvr>
+</p:sld>
+</file>
+
+<file path=ppt/slides/slide50.xml><?xml version="1.0" encoding="utf-8"?>
+<p:sld xmlns:a="http://schemas.openxmlformats.org/drawingml/2006/main" xmlns:r="http://schemas.openxmlformats.org/officeDocument/2006/relationships" xmlns:p="http://schemas.openxmlformats.org/presentationml/2006/main">
+  <p:cSld>
+    <p:spTree>
+      <p:nvGrpSpPr>
+        <p:cNvPr id="1" name=""/>
+        <p:cNvGrpSpPr/>
+        <p:nvPr/>
+      </p:nvGrpSpPr>
+      <p:grpSpPr>
+        <a:xfrm>
+          <a:off x="0" y="0"/>
+          <a:ext cx="0" cy="0"/>
+          <a:chOff x="0" y="0"/>
+          <a:chExt cx="0" cy="0"/>
+        </a:xfrm>
+      </p:grpSpPr>
+      <p:sp>
+        <p:nvSpPr>
+          <p:cNvPr id="2" name="Title 1">
+            <a:extLst>
+              <a:ext uri="{FF2B5EF4-FFF2-40B4-BE49-F238E27FC236}">
+                <a16:creationId xmlns:a16="http://schemas.microsoft.com/office/drawing/2014/main" id="{810A74EC-2BC5-4A86-9ED2-119A7F7D1CF8}"/>
+              </a:ext>
+            </a:extLst>
+          </p:cNvPr>
+          <p:cNvSpPr>
+            <a:spLocks noGrp="1"/>
+          </p:cNvSpPr>
+          <p:nvPr>
+            <p:ph type="title"/>
+          </p:nvPr>
+        </p:nvSpPr>
+        <p:spPr/>
+        <p:txBody>
+          <a:bodyPr/>
+          <a:lstStyle/>
+          <a:p>
+            <a:r>
+              <a:rPr lang="en-US" dirty="0"/>
+              <a:t>Average case</a:t>
+            </a:r>
+          </a:p>
+        </p:txBody>
+      </p:sp>
+      <p:sp>
+        <p:nvSpPr>
+          <p:cNvPr id="3" name="Content Placeholder 2">
+            <a:extLst>
+              <a:ext uri="{FF2B5EF4-FFF2-40B4-BE49-F238E27FC236}">
+                <a16:creationId xmlns:a16="http://schemas.microsoft.com/office/drawing/2014/main" id="{FE15C81B-49B1-485E-867E-F8DD9501D075}"/>
+              </a:ext>
+            </a:extLst>
+          </p:cNvPr>
+          <p:cNvSpPr>
+            <a:spLocks noGrp="1"/>
+          </p:cNvSpPr>
+          <p:nvPr>
+            <p:ph idx="1"/>
+          </p:nvPr>
+        </p:nvSpPr>
+        <p:spPr/>
+        <p:txBody>
+          <a:bodyPr/>
+          <a:lstStyle/>
+          <a:p>
+            <a:r>
+              <a:rPr lang="en-US" dirty="0" err="1"/>
+              <a:t>indexOf</a:t>
+            </a:r>
+            <a:endParaRPr lang="en-US" dirty="0"/>
+          </a:p>
+        </p:txBody>
+      </p:sp>
+    </p:spTree>
+    <p:extLst>
+      <p:ext uri="{BB962C8B-B14F-4D97-AF65-F5344CB8AC3E}">
+        <p14:creationId xmlns:p14="http://schemas.microsoft.com/office/powerpoint/2010/main" val="3141695297"/>
       </p:ext>
     </p:extLst>
   </p:cSld>
@@ -14610,7 +16002,7 @@
         <a:effectLst/>
         <a:extLst>
           <a:ext uri="{AF507438-7753-43e0-B8FC-AC1667EBCBE1}">
-            <a14:hiddenEffects xmlns="" xmlns:a14="http://schemas.microsoft.com/office/drawing/2010/main">
+            <a14:hiddenEffects xmlns:a14="http://schemas.microsoft.com/office/drawing/2010/main" xmlns="">
               <a:effectLst>
                 <a:outerShdw blurRad="63500" dist="35921" dir="2700000" algn="ctr" rotWithShape="0">
                   <a:schemeClr val="bg2"/>
@@ -14684,7 +16076,7 @@
         <a:effectLst/>
         <a:extLst>
           <a:ext uri="{AF507438-7753-43e0-B8FC-AC1667EBCBE1}">
-            <a14:hiddenEffects xmlns="" xmlns:a14="http://schemas.microsoft.com/office/drawing/2010/main">
+            <a14:hiddenEffects xmlns:a14="http://schemas.microsoft.com/office/drawing/2010/main" xmlns="">
               <a:effectLst>
                 <a:outerShdw blurRad="63500" dist="35921" dir="2700000" algn="ctr" rotWithShape="0">
                   <a:schemeClr val="bg2"/>

</xml_diff>

<commit_message>
added more opcount examples
</commit_message>
<xml_diff>
--- a/notes.pptx
+++ b/notes.pptx
@@ -309,7 +309,7 @@
           <a:p>
             <a:fld id="{DE176E02-7D44-4713-8078-8E0963CF8DDB}" type="datetimeFigureOut">
               <a:rPr lang="en-US" smtClean="0"/>
-              <a:t>9/16/2019</a:t>
+              <a:t>9/16/19</a:t>
             </a:fld>
             <a:endParaRPr lang="en-US"/>
           </a:p>
@@ -507,7 +507,7 @@
           <a:p>
             <a:fld id="{DE176E02-7D44-4713-8078-8E0963CF8DDB}" type="datetimeFigureOut">
               <a:rPr lang="en-US" smtClean="0"/>
-              <a:t>9/16/2019</a:t>
+              <a:t>9/16/19</a:t>
             </a:fld>
             <a:endParaRPr lang="en-US"/>
           </a:p>
@@ -715,7 +715,7 @@
           <a:p>
             <a:fld id="{DE176E02-7D44-4713-8078-8E0963CF8DDB}" type="datetimeFigureOut">
               <a:rPr lang="en-US" smtClean="0"/>
-              <a:t>9/16/2019</a:t>
+              <a:t>9/16/19</a:t>
             </a:fld>
             <a:endParaRPr lang="en-US"/>
           </a:p>
@@ -2393,7 +2393,7 @@
           <a:p>
             <a:fld id="{DE176E02-7D44-4713-8078-8E0963CF8DDB}" type="datetimeFigureOut">
               <a:rPr lang="en-US" smtClean="0"/>
-              <a:t>9/16/2019</a:t>
+              <a:t>9/16/19</a:t>
             </a:fld>
             <a:endParaRPr lang="en-US"/>
           </a:p>
@@ -3072,7 +3072,7 @@
           <a:p>
             <a:fld id="{DE176E02-7D44-4713-8078-8E0963CF8DDB}" type="datetimeFigureOut">
               <a:rPr lang="en-US" smtClean="0"/>
-              <a:t>9/16/2019</a:t>
+              <a:t>9/16/19</a:t>
             </a:fld>
             <a:endParaRPr lang="en-US"/>
           </a:p>
@@ -3337,7 +3337,7 @@
           <a:p>
             <a:fld id="{DE176E02-7D44-4713-8078-8E0963CF8DDB}" type="datetimeFigureOut">
               <a:rPr lang="en-US" smtClean="0"/>
-              <a:t>9/16/2019</a:t>
+              <a:t>9/16/19</a:t>
             </a:fld>
             <a:endParaRPr lang="en-US"/>
           </a:p>
@@ -3749,7 +3749,7 @@
           <a:p>
             <a:fld id="{DE176E02-7D44-4713-8078-8E0963CF8DDB}" type="datetimeFigureOut">
               <a:rPr lang="en-US" smtClean="0"/>
-              <a:t>9/16/2019</a:t>
+              <a:t>9/16/19</a:t>
             </a:fld>
             <a:endParaRPr lang="en-US"/>
           </a:p>
@@ -3890,7 +3890,7 @@
           <a:p>
             <a:fld id="{DE176E02-7D44-4713-8078-8E0963CF8DDB}" type="datetimeFigureOut">
               <a:rPr lang="en-US" smtClean="0"/>
-              <a:t>9/16/2019</a:t>
+              <a:t>9/16/19</a:t>
             </a:fld>
             <a:endParaRPr lang="en-US"/>
           </a:p>
@@ -4003,7 +4003,7 @@
           <a:p>
             <a:fld id="{DE176E02-7D44-4713-8078-8E0963CF8DDB}" type="datetimeFigureOut">
               <a:rPr lang="en-US" smtClean="0"/>
-              <a:t>9/16/2019</a:t>
+              <a:t>9/16/19</a:t>
             </a:fld>
             <a:endParaRPr lang="en-US"/>
           </a:p>
@@ -4314,7 +4314,7 @@
           <a:p>
             <a:fld id="{DE176E02-7D44-4713-8078-8E0963CF8DDB}" type="datetimeFigureOut">
               <a:rPr lang="en-US" smtClean="0"/>
-              <a:t>9/16/2019</a:t>
+              <a:t>9/16/19</a:t>
             </a:fld>
             <a:endParaRPr lang="en-US"/>
           </a:p>
@@ -4602,7 +4602,7 @@
           <a:p>
             <a:fld id="{DE176E02-7D44-4713-8078-8E0963CF8DDB}" type="datetimeFigureOut">
               <a:rPr lang="en-US" smtClean="0"/>
-              <a:t>9/16/2019</a:t>
+              <a:t>9/16/19</a:t>
             </a:fld>
             <a:endParaRPr lang="en-US"/>
           </a:p>
@@ -4843,7 +4843,7 @@
           <a:p>
             <a:fld id="{DE176E02-7D44-4713-8078-8E0963CF8DDB}" type="datetimeFigureOut">
               <a:rPr lang="en-US" smtClean="0"/>
-              <a:t>9/16/2019</a:t>
+              <a:t>9/16/19</a:t>
             </a:fld>
             <a:endParaRPr lang="en-US"/>
           </a:p>
@@ -13406,7 +13406,7 @@
           <a:p>
             <a:r>
               <a:rPr lang="en-US" dirty="0"/>
-              <a:t>Gowers (2014)- Fields Medalist</a:t>
+              <a:t>Tim Gowers (2014)- Fields Medalist</a:t>
             </a:r>
           </a:p>
           <a:p>
@@ -14103,8 +14103,8 @@
           </a:p>
         </p:txBody>
       </p:sp>
-      <mc:AlternateContent xmlns:mc="http://schemas.openxmlformats.org/markup-compatibility/2006">
-        <mc:Choice xmlns:a14="http://schemas.microsoft.com/office/drawing/2010/main" Requires="a14">
+      <mc:AlternateContent xmlns:mc="http://schemas.openxmlformats.org/markup-compatibility/2006" xmlns:a14="http://schemas.microsoft.com/office/drawing/2010/main">
+        <mc:Choice Requires="a14">
           <p:sp>
             <p:nvSpPr>
               <p:cNvPr id="3" name="Content Placeholder 2">
@@ -14460,7 +14460,7 @@
             </p:txBody>
           </p:sp>
         </mc:Choice>
-        <mc:Fallback>
+        <mc:Fallback xmlns="">
           <p:sp>
             <p:nvSpPr>
               <p:cNvPr id="3" name="Content Placeholder 2">
@@ -14558,8 +14558,8 @@
           </a:p>
         </p:txBody>
       </p:sp>
-      <mc:AlternateContent xmlns:mc="http://schemas.openxmlformats.org/markup-compatibility/2006">
-        <mc:Choice xmlns:a14="http://schemas.microsoft.com/office/drawing/2010/main" Requires="a14">
+      <mc:AlternateContent xmlns:mc="http://schemas.openxmlformats.org/markup-compatibility/2006" xmlns:a14="http://schemas.microsoft.com/office/drawing/2010/main">
+        <mc:Choice Requires="a14">
           <p:sp>
             <p:nvSpPr>
               <p:cNvPr id="3" name="Content Placeholder 2">
@@ -14741,7 +14741,7 @@
             </p:txBody>
           </p:sp>
         </mc:Choice>
-        <mc:Fallback>
+        <mc:Fallback xmlns="">
           <p:sp>
             <p:nvSpPr>
               <p:cNvPr id="3" name="Content Placeholder 2">
@@ -16002,7 +16002,7 @@
         <a:effectLst/>
         <a:extLst>
           <a:ext uri="{AF507438-7753-43e0-B8FC-AC1667EBCBE1}">
-            <a14:hiddenEffects xmlns:a14="http://schemas.microsoft.com/office/drawing/2010/main" xmlns="">
+            <a14:hiddenEffects xmlns="" xmlns:a14="http://schemas.microsoft.com/office/drawing/2010/main">
               <a:effectLst>
                 <a:outerShdw blurRad="63500" dist="35921" dir="2700000" algn="ctr" rotWithShape="0">
                   <a:schemeClr val="bg2"/>
@@ -16076,7 +16076,7 @@
         <a:effectLst/>
         <a:extLst>
           <a:ext uri="{AF507438-7753-43e0-B8FC-AC1667EBCBE1}">
-            <a14:hiddenEffects xmlns:a14="http://schemas.microsoft.com/office/drawing/2010/main" xmlns="">
+            <a14:hiddenEffects xmlns="" xmlns:a14="http://schemas.microsoft.com/office/drawing/2010/main">
               <a:effectLst>
                 <a:outerShdw blurRad="63500" dist="35921" dir="2700000" algn="ctr" rotWithShape="0">
                   <a:schemeClr val="bg2"/>

</xml_diff>

<commit_message>
added add to arraylist
</commit_message>
<xml_diff>
--- a/notes.pptx
+++ b/notes.pptx
@@ -320,7 +320,7 @@
           <a:p>
             <a:fld id="{DE176E02-7D44-4713-8078-8E0963CF8DDB}" type="datetimeFigureOut">
               <a:rPr lang="en-US" smtClean="0"/>
-              <a:t>9/20/2019</a:t>
+              <a:t>9/23/19</a:t>
             </a:fld>
             <a:endParaRPr lang="en-US"/>
           </a:p>
@@ -518,7 +518,7 @@
           <a:p>
             <a:fld id="{DE176E02-7D44-4713-8078-8E0963CF8DDB}" type="datetimeFigureOut">
               <a:rPr lang="en-US" smtClean="0"/>
-              <a:t>9/20/2019</a:t>
+              <a:t>9/23/19</a:t>
             </a:fld>
             <a:endParaRPr lang="en-US"/>
           </a:p>
@@ -726,7 +726,7 @@
           <a:p>
             <a:fld id="{DE176E02-7D44-4713-8078-8E0963CF8DDB}" type="datetimeFigureOut">
               <a:rPr lang="en-US" smtClean="0"/>
-              <a:t>9/20/2019</a:t>
+              <a:t>9/23/19</a:t>
             </a:fld>
             <a:endParaRPr lang="en-US"/>
           </a:p>
@@ -2404,7 +2404,7 @@
           <a:p>
             <a:fld id="{DE176E02-7D44-4713-8078-8E0963CF8DDB}" type="datetimeFigureOut">
               <a:rPr lang="en-US" smtClean="0"/>
-              <a:t>9/20/2019</a:t>
+              <a:t>9/23/19</a:t>
             </a:fld>
             <a:endParaRPr lang="en-US"/>
           </a:p>
@@ -3083,7 +3083,7 @@
           <a:p>
             <a:fld id="{DE176E02-7D44-4713-8078-8E0963CF8DDB}" type="datetimeFigureOut">
               <a:rPr lang="en-US" smtClean="0"/>
-              <a:t>9/20/2019</a:t>
+              <a:t>9/23/19</a:t>
             </a:fld>
             <a:endParaRPr lang="en-US"/>
           </a:p>
@@ -3348,7 +3348,7 @@
           <a:p>
             <a:fld id="{DE176E02-7D44-4713-8078-8E0963CF8DDB}" type="datetimeFigureOut">
               <a:rPr lang="en-US" smtClean="0"/>
-              <a:t>9/20/2019</a:t>
+              <a:t>9/23/19</a:t>
             </a:fld>
             <a:endParaRPr lang="en-US"/>
           </a:p>
@@ -3760,7 +3760,7 @@
           <a:p>
             <a:fld id="{DE176E02-7D44-4713-8078-8E0963CF8DDB}" type="datetimeFigureOut">
               <a:rPr lang="en-US" smtClean="0"/>
-              <a:t>9/20/2019</a:t>
+              <a:t>9/23/19</a:t>
             </a:fld>
             <a:endParaRPr lang="en-US"/>
           </a:p>
@@ -3901,7 +3901,7 @@
           <a:p>
             <a:fld id="{DE176E02-7D44-4713-8078-8E0963CF8DDB}" type="datetimeFigureOut">
               <a:rPr lang="en-US" smtClean="0"/>
-              <a:t>9/20/2019</a:t>
+              <a:t>9/23/19</a:t>
             </a:fld>
             <a:endParaRPr lang="en-US"/>
           </a:p>
@@ -4014,7 +4014,7 @@
           <a:p>
             <a:fld id="{DE176E02-7D44-4713-8078-8E0963CF8DDB}" type="datetimeFigureOut">
               <a:rPr lang="en-US" smtClean="0"/>
-              <a:t>9/20/2019</a:t>
+              <a:t>9/23/19</a:t>
             </a:fld>
             <a:endParaRPr lang="en-US"/>
           </a:p>
@@ -4325,7 +4325,7 @@
           <a:p>
             <a:fld id="{DE176E02-7D44-4713-8078-8E0963CF8DDB}" type="datetimeFigureOut">
               <a:rPr lang="en-US" smtClean="0"/>
-              <a:t>9/20/2019</a:t>
+              <a:t>9/23/19</a:t>
             </a:fld>
             <a:endParaRPr lang="en-US"/>
           </a:p>
@@ -4613,7 +4613,7 @@
           <a:p>
             <a:fld id="{DE176E02-7D44-4713-8078-8E0963CF8DDB}" type="datetimeFigureOut">
               <a:rPr lang="en-US" smtClean="0"/>
-              <a:t>9/20/2019</a:t>
+              <a:t>9/23/19</a:t>
             </a:fld>
             <a:endParaRPr lang="en-US"/>
           </a:p>
@@ -4854,7 +4854,7 @@
           <a:p>
             <a:fld id="{DE176E02-7D44-4713-8078-8E0963CF8DDB}" type="datetimeFigureOut">
               <a:rPr lang="en-US" smtClean="0"/>
-              <a:t>9/20/2019</a:t>
+              <a:t>9/23/19</a:t>
             </a:fld>
             <a:endParaRPr lang="en-US"/>
           </a:p>
@@ -15703,6 +15703,13 @@
             </a:r>
           </a:p>
           <a:p>
+            <a:r>
+              <a:rPr lang="en-US"/>
+              <a:t>Demonstrate pull</a:t>
+            </a:r>
+            <a:endParaRPr lang="en-US" dirty="0"/>
+          </a:p>
+          <a:p>
             <a:pPr marL="0" indent="0">
               <a:buNone/>
             </a:pPr>
@@ -17159,7 +17166,7 @@
         <a:effectLst/>
         <a:extLst>
           <a:ext uri="{AF507438-7753-43e0-B8FC-AC1667EBCBE1}">
-            <a14:hiddenEffects xmlns:a14="http://schemas.microsoft.com/office/drawing/2010/main" xmlns="">
+            <a14:hiddenEffects xmlns="" xmlns:a14="http://schemas.microsoft.com/office/drawing/2010/main">
               <a:effectLst>
                 <a:outerShdw blurRad="63500" dist="35921" dir="2700000" algn="ctr" rotWithShape="0">
                   <a:schemeClr val="bg2"/>
@@ -17233,7 +17240,7 @@
         <a:effectLst/>
         <a:extLst>
           <a:ext uri="{AF507438-7753-43e0-B8FC-AC1667EBCBE1}">
-            <a14:hiddenEffects xmlns:a14="http://schemas.microsoft.com/office/drawing/2010/main" xmlns="">
+            <a14:hiddenEffects xmlns="" xmlns:a14="http://schemas.microsoft.com/office/drawing/2010/main">
               <a:effectLst>
                 <a:outerShdw blurRad="63500" dist="35921" dir="2700000" algn="ctr" rotWithShape="0">
                   <a:schemeClr val="bg2"/>

</xml_diff>